<commit_message>
📝 Poster sections & images
</commit_message>
<xml_diff>
--- a/docs/Poster/Poster.pptx
+++ b/docs/Poster/Poster.pptx
@@ -104,6 +104,11 @@
       </a:defRPr>
     </a:lvl9pPr>
   </p:defaultTextStyle>
+  <p:extLst>
+    <p:ext uri="{EFAFB233-063F-42B5-8137-9DF3F51BA10A}">
+      <p15:sldGuideLst xmlns:p15="http://schemas.microsoft.com/office/powerpoint/2012/main"/>
+    </p:ext>
+  </p:extLst>
 </p:presentation>
 </file>
 
@@ -238,7 +243,7 @@
           <a:p>
             <a:fld id="{70533FD3-F370-458C-BCE8-160857C0EEE2}" type="datetimeFigureOut">
               <a:rPr lang="fr-FR" smtClean="0"/>
-              <a:t>30/04/2024</a:t>
+              <a:t>02/05/2024</a:t>
             </a:fld>
             <a:endParaRPr lang="fr-FR"/>
           </a:p>
@@ -408,7 +413,7 @@
           <a:p>
             <a:fld id="{70533FD3-F370-458C-BCE8-160857C0EEE2}" type="datetimeFigureOut">
               <a:rPr lang="fr-FR" smtClean="0"/>
-              <a:t>30/04/2024</a:t>
+              <a:t>02/05/2024</a:t>
             </a:fld>
             <a:endParaRPr lang="fr-FR"/>
           </a:p>
@@ -588,7 +593,7 @@
           <a:p>
             <a:fld id="{70533FD3-F370-458C-BCE8-160857C0EEE2}" type="datetimeFigureOut">
               <a:rPr lang="fr-FR" smtClean="0"/>
-              <a:t>30/04/2024</a:t>
+              <a:t>02/05/2024</a:t>
             </a:fld>
             <a:endParaRPr lang="fr-FR"/>
           </a:p>
@@ -758,7 +763,7 @@
           <a:p>
             <a:fld id="{70533FD3-F370-458C-BCE8-160857C0EEE2}" type="datetimeFigureOut">
               <a:rPr lang="fr-FR" smtClean="0"/>
-              <a:t>30/04/2024</a:t>
+              <a:t>02/05/2024</a:t>
             </a:fld>
             <a:endParaRPr lang="fr-FR"/>
           </a:p>
@@ -1004,7 +1009,7 @@
           <a:p>
             <a:fld id="{70533FD3-F370-458C-BCE8-160857C0EEE2}" type="datetimeFigureOut">
               <a:rPr lang="fr-FR" smtClean="0"/>
-              <a:t>30/04/2024</a:t>
+              <a:t>02/05/2024</a:t>
             </a:fld>
             <a:endParaRPr lang="fr-FR"/>
           </a:p>
@@ -1236,7 +1241,7 @@
           <a:p>
             <a:fld id="{70533FD3-F370-458C-BCE8-160857C0EEE2}" type="datetimeFigureOut">
               <a:rPr lang="fr-FR" smtClean="0"/>
-              <a:t>30/04/2024</a:t>
+              <a:t>02/05/2024</a:t>
             </a:fld>
             <a:endParaRPr lang="fr-FR"/>
           </a:p>
@@ -1603,7 +1608,7 @@
           <a:p>
             <a:fld id="{70533FD3-F370-458C-BCE8-160857C0EEE2}" type="datetimeFigureOut">
               <a:rPr lang="fr-FR" smtClean="0"/>
-              <a:t>30/04/2024</a:t>
+              <a:t>02/05/2024</a:t>
             </a:fld>
             <a:endParaRPr lang="fr-FR"/>
           </a:p>
@@ -1721,7 +1726,7 @@
           <a:p>
             <a:fld id="{70533FD3-F370-458C-BCE8-160857C0EEE2}" type="datetimeFigureOut">
               <a:rPr lang="fr-FR" smtClean="0"/>
-              <a:t>30/04/2024</a:t>
+              <a:t>02/05/2024</a:t>
             </a:fld>
             <a:endParaRPr lang="fr-FR"/>
           </a:p>
@@ -1816,7 +1821,7 @@
           <a:p>
             <a:fld id="{70533FD3-F370-458C-BCE8-160857C0EEE2}" type="datetimeFigureOut">
               <a:rPr lang="fr-FR" smtClean="0"/>
-              <a:t>30/04/2024</a:t>
+              <a:t>02/05/2024</a:t>
             </a:fld>
             <a:endParaRPr lang="fr-FR"/>
           </a:p>
@@ -2093,7 +2098,7 @@
           <a:p>
             <a:fld id="{70533FD3-F370-458C-BCE8-160857C0EEE2}" type="datetimeFigureOut">
               <a:rPr lang="fr-FR" smtClean="0"/>
-              <a:t>30/04/2024</a:t>
+              <a:t>02/05/2024</a:t>
             </a:fld>
             <a:endParaRPr lang="fr-FR"/>
           </a:p>
@@ -2350,7 +2355,7 @@
           <a:p>
             <a:fld id="{70533FD3-F370-458C-BCE8-160857C0EEE2}" type="datetimeFigureOut">
               <a:rPr lang="fr-FR" smtClean="0"/>
-              <a:t>30/04/2024</a:t>
+              <a:t>02/05/2024</a:t>
             </a:fld>
             <a:endParaRPr lang="fr-FR"/>
           </a:p>
@@ -2563,7 +2568,7 @@
           <a:p>
             <a:fld id="{70533FD3-F370-458C-BCE8-160857C0EEE2}" type="datetimeFigureOut">
               <a:rPr lang="fr-FR" smtClean="0"/>
-              <a:t>30/04/2024</a:t>
+              <a:t>02/05/2024</a:t>
             </a:fld>
             <a:endParaRPr lang="fr-FR"/>
           </a:p>
@@ -2976,6 +2981,262 @@
           <a:chExt cx="0" cy="0"/>
         </a:xfrm>
       </p:grpSpPr>
+      <p:sp>
+        <p:nvSpPr>
+          <p:cNvPr id="5" name="Rectangle : coins arrondis 4">
+            <a:extLst>
+              <a:ext uri="{FF2B5EF4-FFF2-40B4-BE49-F238E27FC236}">
+                <a16:creationId xmlns:a16="http://schemas.microsoft.com/office/drawing/2014/main" id="{FB511331-6DB4-D732-29C5-1F788BAFE694}"/>
+              </a:ext>
+            </a:extLst>
+          </p:cNvPr>
+          <p:cNvSpPr>
+            <a:spLocks/>
+          </p:cNvSpPr>
+          <p:nvPr/>
+        </p:nvSpPr>
+        <p:spPr>
+          <a:xfrm>
+            <a:off x="623629" y="25682742"/>
+            <a:ext cx="10064094" cy="10202409"/>
+          </a:xfrm>
+          <a:prstGeom prst="roundRect">
+            <a:avLst/>
+          </a:prstGeom>
+          <a:solidFill>
+            <a:srgbClr val="E7E1D5"/>
+          </a:solidFill>
+          <a:ln>
+            <a:noFill/>
+          </a:ln>
+        </p:spPr>
+        <p:style>
+          <a:lnRef idx="2">
+            <a:schemeClr val="accent1">
+              <a:shade val="15000"/>
+            </a:schemeClr>
+          </a:lnRef>
+          <a:fillRef idx="1">
+            <a:schemeClr val="accent1"/>
+          </a:fillRef>
+          <a:effectRef idx="0">
+            <a:schemeClr val="accent1"/>
+          </a:effectRef>
+          <a:fontRef idx="minor">
+            <a:schemeClr val="lt1"/>
+          </a:fontRef>
+        </p:style>
+        <p:txBody>
+          <a:bodyPr rtlCol="0" anchor="t"/>
+          <a:lstStyle/>
+          <a:p>
+            <a:pPr marL="0" marR="0" lvl="0" indent="0" algn="ctr" defTabSz="457200" rtl="0" eaLnBrk="1" fontAlgn="auto" latinLnBrk="0" hangingPunct="1">
+              <a:lnSpc>
+                <a:spcPct val="100000"/>
+              </a:lnSpc>
+              <a:spcBef>
+                <a:spcPts val="0"/>
+              </a:spcBef>
+              <a:spcAft>
+                <a:spcPts val="0"/>
+              </a:spcAft>
+              <a:buClrTx/>
+              <a:buSzTx/>
+              <a:buFontTx/>
+              <a:buNone/>
+              <a:tabLst/>
+              <a:defRPr/>
+            </a:pPr>
+            <a:r>
+              <a:rPr kumimoji="0" lang="fr-FR" sz="5000" b="0" i="0" u="none" strike="noStrike" kern="1200" cap="none" spc="0" normalizeH="0" baseline="0" noProof="0" dirty="0" err="1">
+                <a:ln>
+                  <a:noFill/>
+                </a:ln>
+                <a:solidFill>
+                  <a:srgbClr val="37322F"/>
+                </a:solidFill>
+                <a:effectLst/>
+                <a:uLnTx/>
+                <a:uFillTx/>
+                <a:latin typeface="Gill Sans Nova" panose="020B0602020104020203" pitchFamily="34" charset="0"/>
+                <a:ea typeface="+mn-ea"/>
+                <a:cs typeface="Aharoni" panose="020F0502020204030204" pitchFamily="2" charset="-79"/>
+              </a:rPr>
+              <a:t>Thermo-optic</a:t>
+            </a:r>
+            <a:r>
+              <a:rPr kumimoji="0" lang="fr-FR" sz="5000" b="0" i="0" u="none" strike="noStrike" kern="1200" cap="none" spc="0" normalizeH="0" baseline="0" noProof="0" dirty="0">
+                <a:ln>
+                  <a:noFill/>
+                </a:ln>
+                <a:solidFill>
+                  <a:srgbClr val="37322F"/>
+                </a:solidFill>
+                <a:effectLst/>
+                <a:uLnTx/>
+                <a:uFillTx/>
+                <a:latin typeface="Gill Sans Nova" panose="020B0602020104020203" pitchFamily="34" charset="0"/>
+                <a:ea typeface="+mn-ea"/>
+                <a:cs typeface="Aharoni" panose="020F0502020204030204" pitchFamily="2" charset="-79"/>
+              </a:rPr>
+              <a:t> phase </a:t>
+            </a:r>
+            <a:r>
+              <a:rPr kumimoji="0" lang="fr-FR" sz="5000" b="0" i="0" u="none" strike="noStrike" kern="1200" cap="none" spc="0" normalizeH="0" baseline="0" noProof="0" dirty="0" err="1">
+                <a:ln>
+                  <a:noFill/>
+                </a:ln>
+                <a:solidFill>
+                  <a:srgbClr val="37322F"/>
+                </a:solidFill>
+                <a:effectLst/>
+                <a:uLnTx/>
+                <a:uFillTx/>
+                <a:latin typeface="Gill Sans Nova" panose="020B0602020104020203" pitchFamily="34" charset="0"/>
+                <a:ea typeface="+mn-ea"/>
+                <a:cs typeface="Aharoni" panose="020F0502020204030204" pitchFamily="2" charset="-79"/>
+              </a:rPr>
+              <a:t>shifter</a:t>
+            </a:r>
+            <a:r>
+              <a:rPr kumimoji="0" lang="fr-FR" sz="5000" b="0" i="0" u="none" strike="noStrike" kern="1200" cap="none" spc="0" normalizeH="0" baseline="0" noProof="0" dirty="0">
+                <a:ln>
+                  <a:noFill/>
+                </a:ln>
+                <a:solidFill>
+                  <a:srgbClr val="37322F"/>
+                </a:solidFill>
+                <a:effectLst/>
+                <a:uLnTx/>
+                <a:uFillTx/>
+                <a:latin typeface="Gill Sans Nova" panose="020B0602020104020203" pitchFamily="34" charset="0"/>
+                <a:ea typeface="+mn-ea"/>
+                <a:cs typeface="Aharoni" panose="020F0502020204030204" pitchFamily="2" charset="-79"/>
+              </a:rPr>
+              <a:t> 🌡️</a:t>
+            </a:r>
+            <a:endParaRPr kumimoji="0" lang="en-US" sz="5000" b="0" i="0" u="none" strike="noStrike" kern="1200" cap="none" spc="0" normalizeH="0" baseline="0" noProof="0" dirty="0">
+              <a:ln>
+                <a:noFill/>
+              </a:ln>
+              <a:solidFill>
+                <a:srgbClr val="37322F"/>
+              </a:solidFill>
+              <a:effectLst/>
+              <a:uLnTx/>
+              <a:uFillTx/>
+              <a:latin typeface="Gill Sans Nova" panose="020B0602020104020203" pitchFamily="34" charset="0"/>
+              <a:ea typeface="+mn-ea"/>
+              <a:cs typeface="Aharoni" panose="020F0502020204030204" pitchFamily="2" charset="-79"/>
+            </a:endParaRPr>
+          </a:p>
+          <a:p>
+            <a:pPr marL="0" marR="0" lvl="0" indent="0" algn="ctr" defTabSz="457200" rtl="0" eaLnBrk="1" fontAlgn="auto" latinLnBrk="0" hangingPunct="1">
+              <a:lnSpc>
+                <a:spcPct val="100000"/>
+              </a:lnSpc>
+              <a:spcBef>
+                <a:spcPts val="0"/>
+              </a:spcBef>
+              <a:spcAft>
+                <a:spcPts val="0"/>
+              </a:spcAft>
+              <a:buClrTx/>
+              <a:buSzTx/>
+              <a:buFontTx/>
+              <a:buNone/>
+              <a:tabLst/>
+              <a:defRPr/>
+            </a:pPr>
+            <a:r>
+              <a:rPr kumimoji="0" lang="en-US" sz="2000" b="0" i="0" u="sng" strike="noStrike" kern="1200" cap="none" spc="0" normalizeH="0" baseline="0" noProof="0" dirty="0">
+                <a:ln>
+                  <a:noFill/>
+                </a:ln>
+                <a:solidFill>
+                  <a:srgbClr val="37322F"/>
+                </a:solidFill>
+                <a:effectLst/>
+                <a:uLnTx/>
+                <a:uFillTx/>
+                <a:latin typeface="Gill Sans Nova" panose="020B0602020104020203" pitchFamily="34" charset="0"/>
+                <a:ea typeface="+mn-ea"/>
+                <a:cs typeface="Aharoni" panose="020F0502020204030204" pitchFamily="2" charset="-79"/>
+              </a:rPr>
+              <a:t> </a:t>
+            </a:r>
+          </a:p>
+          <a:p>
+            <a:pPr marL="0" marR="0" lvl="0" indent="0" algn="l" defTabSz="457200" rtl="0" eaLnBrk="1" fontAlgn="auto" latinLnBrk="0" hangingPunct="1">
+              <a:lnSpc>
+                <a:spcPct val="100000"/>
+              </a:lnSpc>
+              <a:spcBef>
+                <a:spcPts val="0"/>
+              </a:spcBef>
+              <a:spcAft>
+                <a:spcPts val="0"/>
+              </a:spcAft>
+              <a:buClrTx/>
+              <a:buSzTx/>
+              <a:buFontTx/>
+              <a:buNone/>
+              <a:tabLst/>
+              <a:defRPr/>
+            </a:pPr>
+            <a:r>
+              <a:rPr kumimoji="0" lang="fr-FR" sz="3200" b="0" i="0" u="none" strike="noStrike" kern="1200" cap="none" spc="0" normalizeH="0" baseline="0" noProof="0" dirty="0">
+                <a:ln>
+                  <a:noFill/>
+                </a:ln>
+                <a:solidFill>
+                  <a:srgbClr val="37322F"/>
+                </a:solidFill>
+                <a:effectLst/>
+                <a:uLnTx/>
+                <a:uFillTx/>
+                <a:latin typeface="Gill Sans Nova" panose="020B0602020104020203" pitchFamily="34" charset="0"/>
+                <a:ea typeface="+mn-ea"/>
+                <a:cs typeface="+mn-cs"/>
+              </a:rPr>
+              <a:t>Blablabla</a:t>
+            </a:r>
+          </a:p>
+          <a:p>
+            <a:pPr marL="0" marR="0" lvl="0" indent="0" algn="ctr" defTabSz="457200" rtl="0" eaLnBrk="1" fontAlgn="auto" latinLnBrk="0" hangingPunct="1">
+              <a:lnSpc>
+                <a:spcPct val="100000"/>
+              </a:lnSpc>
+              <a:spcBef>
+                <a:spcPts val="0"/>
+              </a:spcBef>
+              <a:spcAft>
+                <a:spcPts val="0"/>
+              </a:spcAft>
+              <a:buClrTx/>
+              <a:buSzTx/>
+              <a:buFontTx/>
+              <a:buNone/>
+              <a:tabLst/>
+              <a:defRPr/>
+            </a:pPr>
+            <a:endParaRPr kumimoji="0" lang="fr-FR" sz="1800" b="0" i="0" u="none" strike="noStrike" kern="1200" cap="none" spc="0" normalizeH="0" baseline="0" noProof="0" dirty="0">
+              <a:ln>
+                <a:noFill/>
+              </a:ln>
+              <a:solidFill>
+                <a:srgbClr val="37322F"/>
+              </a:solidFill>
+              <a:effectLst/>
+              <a:uLnTx/>
+              <a:uFillTx/>
+              <a:latin typeface="Aptos" panose="02110004020202020204"/>
+              <a:ea typeface="+mn-ea"/>
+              <a:cs typeface="+mn-cs"/>
+            </a:endParaRPr>
+          </a:p>
+        </p:txBody>
+      </p:sp>
       <p:grpSp>
         <p:nvGrpSpPr>
           <p:cNvPr id="15" name="Groupe 14">
@@ -3064,7 +3325,7 @@
               </a:extLst>
             </p:cNvPr>
             <p:cNvSpPr>
-              <a:spLocks/>
+              <a:spLocks noGrp="1"/>
             </p:cNvSpPr>
             <p:nvPr>
               <p:ph type="ctrTitle"/>
@@ -3563,10 +3824,10 @@
         </p:nvGrpSpPr>
         <p:grpSpPr>
           <a:xfrm>
-            <a:off x="442452" y="9259890"/>
-            <a:ext cx="31355070" cy="26625261"/>
-            <a:chOff x="442452" y="9259890"/>
-            <a:chExt cx="31355070" cy="26625261"/>
+            <a:off x="442451" y="9259890"/>
+            <a:ext cx="31355071" cy="26625261"/>
+            <a:chOff x="442451" y="9259890"/>
+            <a:chExt cx="31355071" cy="26625261"/>
           </a:xfrm>
         </p:grpSpPr>
         <p:grpSp>
@@ -3583,10 +3844,10 @@
           </p:nvGrpSpPr>
           <p:grpSpPr>
             <a:xfrm>
-              <a:off x="442452" y="9259890"/>
-              <a:ext cx="31355070" cy="26625261"/>
-              <a:chOff x="522108" y="7597170"/>
-              <a:chExt cx="31355070" cy="26749973"/>
+              <a:off x="442451" y="9259890"/>
+              <a:ext cx="31355071" cy="15919712"/>
+              <a:chOff x="522107" y="7597170"/>
+              <a:chExt cx="31355071" cy="15994279"/>
             </a:xfrm>
           </p:grpSpPr>
           <p:grpSp>
@@ -3604,9 +3865,9 @@
             <p:grpSpPr>
               <a:xfrm>
                 <a:off x="522108" y="7597170"/>
-                <a:ext cx="31355070" cy="26749973"/>
+                <a:ext cx="31355070" cy="15264866"/>
                 <a:chOff x="244827" y="7313550"/>
-                <a:chExt cx="28424036" cy="6584345"/>
+                <a:chExt cx="28424036" cy="3757355"/>
               </a:xfrm>
             </p:grpSpPr>
             <p:sp>
@@ -3626,7 +3887,7 @@
               <p:spPr>
                 <a:xfrm>
                   <a:off x="244827" y="7313550"/>
-                  <a:ext cx="9123315" cy="2256456"/>
+                  <a:ext cx="18491684" cy="1194463"/>
                 </a:xfrm>
                 <a:prstGeom prst="roundRect">
                   <a:avLst/>
@@ -3660,26 +3921,36 @@
                 <a:p>
                   <a:pPr algn="ctr"/>
                   <a:r>
-                    <a:rPr lang="en-US" sz="6000" dirty="0">
+                    <a:rPr lang="fr-FR" sz="5000" dirty="0">
                       <a:solidFill>
                         <a:srgbClr val="37322F"/>
                       </a:solidFill>
                       <a:latin typeface="Gill Sans Nova" panose="020B0602020104020203" pitchFamily="34" charset="0"/>
                       <a:cs typeface="Aharoni" panose="020F0502020204030204" pitchFamily="2" charset="-79"/>
                     </a:rPr>
-                    <a:t>Abstract </a:t>
+                    <a:t>In a </a:t>
                   </a:r>
                   <a:r>
-                    <a:rPr lang="fr-FR" sz="6000" dirty="0">
+                    <a:rPr lang="fr-FR" sz="5000" dirty="0" err="1">
                       <a:solidFill>
                         <a:srgbClr val="37322F"/>
                       </a:solidFill>
                       <a:latin typeface="Gill Sans Nova" panose="020B0602020104020203" pitchFamily="34" charset="0"/>
                       <a:cs typeface="Aharoni" panose="020F0502020204030204" pitchFamily="2" charset="-79"/>
                     </a:rPr>
-                    <a:t>🔎</a:t>
+                    <a:t>nutshell</a:t>
                   </a:r>
-                  <a:endParaRPr lang="en-US" sz="6000" dirty="0">
+                  <a:r>
+                    <a:rPr lang="fr-FR" sz="5000" dirty="0">
+                      <a:solidFill>
+                        <a:srgbClr val="37322F"/>
+                      </a:solidFill>
+                      <a:latin typeface="Gill Sans Nova" panose="020B0602020104020203" pitchFamily="34" charset="0"/>
+                      <a:cs typeface="Aharoni" panose="020F0502020204030204" pitchFamily="2" charset="-79"/>
+                    </a:rPr>
+                    <a:t> 🥜</a:t>
+                  </a:r>
+                  <a:endParaRPr lang="en-US" sz="5000" dirty="0">
                     <a:solidFill>
                       <a:srgbClr val="37322F"/>
                     </a:solidFill>
@@ -3757,8 +4028,8 @@
               </p:nvSpPr>
               <p:spPr>
                 <a:xfrm>
-                  <a:off x="9895188" y="8591476"/>
-                  <a:ext cx="9123315" cy="5306419"/>
+                  <a:off x="9895188" y="8632438"/>
+                  <a:ext cx="9123315" cy="2438467"/>
                 </a:xfrm>
                 <a:prstGeom prst="roundRect">
                   <a:avLst/>
@@ -3792,24 +4063,16 @@
                 <a:p>
                   <a:pPr algn="ctr"/>
                   <a:r>
-                    <a:rPr lang="fr-FR" sz="6000" dirty="0" err="1">
+                    <a:rPr lang="fr-FR" sz="5000" dirty="0">
                       <a:solidFill>
                         <a:srgbClr val="37322F"/>
                       </a:solidFill>
                       <a:latin typeface="Gill Sans Nova" panose="020B0602020104020203" pitchFamily="34" charset="0"/>
+                      <a:cs typeface="Aharoni" panose="020F0502020204030204" pitchFamily="2" charset="-79"/>
                     </a:rPr>
-                    <a:t>Methodology</a:t>
+                    <a:t>Calibration algorithme 🗜️</a:t>
                   </a:r>
-                  <a:r>
-                    <a:rPr lang="fr-FR" sz="6000" dirty="0">
-                      <a:solidFill>
-                        <a:srgbClr val="37322F"/>
-                      </a:solidFill>
-                      <a:latin typeface="Gill Sans Nova" panose="020B0602020104020203" pitchFamily="34" charset="0"/>
-                    </a:rPr>
-                    <a:t> 🪛</a:t>
-                  </a:r>
-                  <a:endParaRPr lang="en-US" sz="9600" dirty="0">
+                  <a:endParaRPr lang="en-US" sz="5000" dirty="0">
                     <a:solidFill>
                       <a:srgbClr val="37322F"/>
                     </a:solidFill>
@@ -3820,7 +4083,7 @@
                 <a:p>
                   <a:pPr algn="ctr"/>
                   <a:r>
-                    <a:rPr lang="en-US" sz="1000" u="sng" dirty="0">
+                    <a:rPr lang="en-US" sz="2000" u="sng" dirty="0">
                       <a:solidFill>
                         <a:srgbClr val="37322F"/>
                       </a:solidFill>
@@ -3859,8 +4122,8 @@
               </p:nvSpPr>
               <p:spPr>
                 <a:xfrm>
-                  <a:off x="19545548" y="7313550"/>
-                  <a:ext cx="9123315" cy="2760256"/>
+                  <a:off x="19545548" y="8632438"/>
+                  <a:ext cx="9123315" cy="2161824"/>
                 </a:xfrm>
                 <a:prstGeom prst="roundRect">
                   <a:avLst/>
@@ -3910,7 +4173,7 @@
                     <a:defRPr/>
                   </a:pPr>
                   <a:r>
-                    <a:rPr kumimoji="0" lang="en-US" sz="6000" b="0" i="0" u="none" strike="noStrike" kern="1200" cap="none" spc="0" normalizeH="0" baseline="0" noProof="0" dirty="0">
+                    <a:rPr kumimoji="0" lang="fr-FR" sz="5000" b="0" i="0" u="none" strike="noStrike" kern="1200" cap="none" spc="0" normalizeH="0" baseline="0" noProof="0" dirty="0" err="1">
                       <a:ln>
                         <a:noFill/>
                       </a:ln>
@@ -3924,26 +4187,39 @@
                       <a:ea typeface="+mn-ea"/>
                       <a:cs typeface="Aharoni" panose="020F0502020204030204" pitchFamily="2" charset="-79"/>
                     </a:rPr>
-                    <a:t>Results </a:t>
+                    <a:t>Statistical</a:t>
                   </a:r>
                   <a:r>
-                    <a:rPr kumimoji="0" lang="fr-FR" sz="6000" b="0" i="0" u="none" strike="noStrike" kern="1200" cap="none" spc="0" normalizeH="0" baseline="0" noProof="0" dirty="0">
-                      <a:ln>
-                        <a:noFill/>
-                      </a:ln>
+                    <a:rPr lang="fr-FR" sz="5000" dirty="0">
                       <a:solidFill>
                         <a:srgbClr val="37322F"/>
                       </a:solidFill>
-                      <a:effectLst/>
-                      <a:uLnTx/>
-                      <a:uFillTx/>
                       <a:latin typeface="Gill Sans Nova" panose="020B0602020104020203" pitchFamily="34" charset="0"/>
-                      <a:ea typeface="+mn-ea"/>
                       <a:cs typeface="Aharoni" panose="020F0502020204030204" pitchFamily="2" charset="-79"/>
                     </a:rPr>
-                    <a:t>📊</a:t>
+                    <a:t> </a:t>
                   </a:r>
-                  <a:endParaRPr kumimoji="0" lang="en-US" sz="6000" b="0" i="0" u="none" strike="noStrike" kern="1200" cap="none" spc="0" normalizeH="0" baseline="0" noProof="0" dirty="0">
+                  <a:r>
+                    <a:rPr lang="fr-FR" sz="5000" dirty="0" err="1">
+                      <a:solidFill>
+                        <a:srgbClr val="37322F"/>
+                      </a:solidFill>
+                      <a:latin typeface="Gill Sans Nova" panose="020B0602020104020203" pitchFamily="34" charset="0"/>
+                      <a:cs typeface="Aharoni" panose="020F0502020204030204" pitchFamily="2" charset="-79"/>
+                    </a:rPr>
+                    <a:t>analysis</a:t>
+                  </a:r>
+                  <a:r>
+                    <a:rPr lang="fr-FR" sz="5000" dirty="0">
+                      <a:solidFill>
+                        <a:srgbClr val="37322F"/>
+                      </a:solidFill>
+                      <a:latin typeface="Gill Sans Nova" panose="020B0602020104020203" pitchFamily="34" charset="0"/>
+                      <a:cs typeface="Aharoni" panose="020F0502020204030204" pitchFamily="2" charset="-79"/>
+                    </a:rPr>
+                    <a:t> 📊</a:t>
+                  </a:r>
+                  <a:endParaRPr kumimoji="0" lang="en-US" sz="5000" b="0" i="0" u="none" strike="noStrike" kern="1200" cap="none" spc="0" normalizeH="0" baseline="0" noProof="0" dirty="0">
                     <a:ln>
                       <a:noFill/>
                     </a:ln>
@@ -3977,7 +4253,7 @@
                     <a:defRPr/>
                   </a:pPr>
                   <a:r>
-                    <a:rPr kumimoji="0" lang="en-US" sz="1000" b="0" i="0" u="sng" strike="noStrike" kern="1200" cap="none" spc="0" normalizeH="0" baseline="0" noProof="0" dirty="0">
+                    <a:rPr kumimoji="0" lang="en-US" sz="2000" b="0" i="0" u="sng" strike="noStrike" kern="1200" cap="none" spc="0" normalizeH="0" baseline="0" noProof="0" dirty="0">
                       <a:ln>
                         <a:noFill/>
                       </a:ln>
@@ -4057,7 +4333,7 @@
             </p:nvSpPr>
             <p:spPr>
               <a:xfrm>
-                <a:off x="522108" y="17229437"/>
+                <a:off x="522107" y="12955368"/>
                 <a:ext cx="10064094" cy="10636081"/>
               </a:xfrm>
               <a:prstGeom prst="roundRect">
@@ -4108,7 +4384,7 @@
                   <a:defRPr/>
                 </a:pPr>
                 <a:r>
-                  <a:rPr kumimoji="0" lang="en-US" sz="6000" b="0" i="0" u="none" strike="noStrike" kern="1200" cap="none" spc="0" normalizeH="0" baseline="0" noProof="0" dirty="0">
+                  <a:rPr kumimoji="0" lang="en-US" sz="5000" b="0" i="0" u="none" strike="noStrike" kern="1200" cap="none" spc="0" normalizeH="0" baseline="0" noProof="0" dirty="0" err="1">
                     <a:ln>
                       <a:noFill/>
                     </a:ln>
@@ -4122,26 +4398,29 @@
                     <a:ea typeface="+mn-ea"/>
                     <a:cs typeface="Aharoni" panose="020F0502020204030204" pitchFamily="2" charset="-79"/>
                   </a:rPr>
-                  <a:t>Introduction </a:t>
+                  <a:t>Nullin</a:t>
                 </a:r>
                 <a:r>
-                  <a:rPr kumimoji="0" lang="fr-FR" sz="6000" b="0" i="0" u="none" strike="noStrike" kern="1200" cap="none" spc="0" normalizeH="0" baseline="0" noProof="0" dirty="0">
-                    <a:ln>
-                      <a:noFill/>
-                    </a:ln>
+                  <a:rPr lang="en-US" sz="5000" dirty="0">
                     <a:solidFill>
                       <a:srgbClr val="37322F"/>
                     </a:solidFill>
-                    <a:effectLst/>
-                    <a:uLnTx/>
-                    <a:uFillTx/>
                     <a:latin typeface="Gill Sans Nova" panose="020B0602020104020203" pitchFamily="34" charset="0"/>
-                    <a:ea typeface="+mn-ea"/>
                     <a:cs typeface="Aharoni" panose="020F0502020204030204" pitchFamily="2" charset="-79"/>
                   </a:rPr>
-                  <a:t>👋</a:t>
+                  <a:t>g interferometry </a:t>
                 </a:r>
-                <a:endParaRPr kumimoji="0" lang="en-US" sz="6000" b="0" i="0" u="none" strike="noStrike" kern="1200" cap="none" spc="0" normalizeH="0" baseline="0" noProof="0" dirty="0">
+                <a:r>
+                  <a:rPr lang="fr-FR" sz="5000" dirty="0">
+                    <a:solidFill>
+                      <a:srgbClr val="37322F"/>
+                    </a:solidFill>
+                    <a:latin typeface="Gill Sans Nova" panose="020B0602020104020203" pitchFamily="34" charset="0"/>
+                    <a:cs typeface="Aharoni" panose="020F0502020204030204" pitchFamily="2" charset="-79"/>
+                  </a:rPr>
+                  <a:t>〰️</a:t>
+                </a:r>
+                <a:endParaRPr kumimoji="0" lang="en-US" sz="5000" b="0" i="0" u="none" strike="noStrike" kern="1200" cap="none" spc="0" normalizeH="0" baseline="0" noProof="0" dirty="0">
                   <a:ln>
                     <a:noFill/>
                   </a:ln>
@@ -4175,7 +4454,7 @@
                   <a:defRPr/>
                 </a:pPr>
                 <a:r>
-                  <a:rPr kumimoji="0" lang="en-US" sz="1000" b="0" i="0" u="sng" strike="noStrike" kern="1200" cap="none" spc="0" normalizeH="0" baseline="0" noProof="0" dirty="0">
+                  <a:rPr kumimoji="0" lang="en-US" sz="2000" b="0" i="0" u="sng" strike="noStrike" kern="1200" cap="none" spc="0" normalizeH="0" baseline="0" noProof="0" dirty="0">
                     <a:ln>
                       <a:noFill/>
                     </a:ln>
@@ -4280,7 +4559,7 @@
           </p:nvSpPr>
           <p:spPr>
             <a:xfrm>
-              <a:off x="21733428" y="21077791"/>
+              <a:off x="21733428" y="23838065"/>
               <a:ext cx="10064094" cy="12047086"/>
             </a:xfrm>
             <a:prstGeom prst="roundRect">
@@ -4331,7 +4610,7 @@
                 <a:defRPr/>
               </a:pPr>
               <a:r>
-                <a:rPr kumimoji="0" lang="en-US" sz="6000" b="0" i="0" u="none" strike="noStrike" kern="1200" cap="none" spc="0" normalizeH="0" baseline="0" noProof="0" dirty="0">
+                <a:rPr kumimoji="0" lang="en-US" sz="5000" b="0" i="0" u="none" strike="noStrike" kern="1200" cap="none" spc="0" normalizeH="0" baseline="0" noProof="0" dirty="0">
                   <a:ln>
                     <a:noFill/>
                   </a:ln>
@@ -4345,10 +4624,10 @@
                   <a:ea typeface="+mn-ea"/>
                   <a:cs typeface="Aharoni" panose="020F0502020204030204" pitchFamily="2" charset="-79"/>
                 </a:rPr>
-                <a:t>Discussions </a:t>
+                <a:t>Discussions &amp; prospects </a:t>
               </a:r>
               <a:r>
-                <a:rPr kumimoji="0" lang="fr-FR" sz="6000" b="0" i="0" u="none" strike="noStrike" kern="1200" cap="none" spc="0" normalizeH="0" baseline="0" noProof="0" dirty="0">
+                <a:rPr kumimoji="0" lang="fr-FR" sz="5000" b="0" i="0" u="none" strike="noStrike" kern="1200" cap="none" spc="0" normalizeH="0" baseline="0" noProof="0" dirty="0">
                   <a:ln>
                     <a:noFill/>
                   </a:ln>
@@ -4364,7 +4643,7 @@
                 </a:rPr>
                 <a:t>💬</a:t>
               </a:r>
-              <a:endParaRPr kumimoji="0" lang="en-US" sz="6000" b="0" i="0" u="none" strike="noStrike" kern="1200" cap="none" spc="0" normalizeH="0" baseline="0" noProof="0" dirty="0">
+              <a:endParaRPr kumimoji="0" lang="en-US" sz="5000" b="0" i="0" u="none" strike="noStrike" kern="1200" cap="none" spc="0" normalizeH="0" baseline="0" noProof="0" dirty="0">
                 <a:ln>
                   <a:noFill/>
                 </a:ln>
@@ -4398,7 +4677,7 @@
                 <a:defRPr/>
               </a:pPr>
               <a:r>
-                <a:rPr kumimoji="0" lang="en-US" sz="1000" b="0" i="0" u="sng" strike="noStrike" kern="1200" cap="none" spc="0" normalizeH="0" baseline="0" noProof="0" dirty="0">
+                <a:rPr kumimoji="0" lang="en-US" sz="2000" b="0" i="0" u="sng" strike="noStrike" kern="1200" cap="none" spc="0" normalizeH="0" baseline="0" noProof="0" dirty="0">
                   <a:ln>
                     <a:noFill/>
                   </a:ln>
@@ -4574,7 +4853,7 @@
                 <a:defRPr/>
               </a:pPr>
               <a:r>
-                <a:rPr lang="en-US" sz="6000" dirty="0">
+                <a:rPr lang="en-US" sz="5000" dirty="0">
                   <a:solidFill>
                     <a:srgbClr val="37322F"/>
                   </a:solidFill>
@@ -4584,7 +4863,7 @@
                 <a:t>References </a:t>
               </a:r>
               <a:r>
-                <a:rPr lang="fr-FR" sz="6000" dirty="0">
+                <a:rPr lang="fr-FR" sz="5000" dirty="0">
                   <a:solidFill>
                     <a:srgbClr val="37322F"/>
                   </a:solidFill>
@@ -4593,7 +4872,7 @@
                 </a:rPr>
                 <a:t>📜</a:t>
               </a:r>
-              <a:endParaRPr kumimoji="0" lang="en-US" sz="6000" b="0" i="0" u="none" strike="noStrike" kern="1200" cap="none" spc="0" normalizeH="0" baseline="0" noProof="0" dirty="0">
+              <a:endParaRPr kumimoji="0" lang="en-US" sz="5000" b="0" i="0" u="none" strike="noStrike" kern="1200" cap="none" spc="0" normalizeH="0" baseline="0" noProof="0" dirty="0">
                 <a:ln>
                   <a:noFill/>
                 </a:ln>
@@ -4627,7 +4906,7 @@
                 <a:defRPr/>
               </a:pPr>
               <a:r>
-                <a:rPr kumimoji="0" lang="en-US" sz="1000" b="0" i="0" u="sng" strike="noStrike" kern="1200" cap="none" spc="0" normalizeH="0" baseline="0" noProof="0" dirty="0">
+                <a:rPr kumimoji="0" lang="en-US" sz="2000" b="0" i="0" u="sng" strike="noStrike" kern="1200" cap="none" spc="0" normalizeH="0" baseline="0" noProof="0" dirty="0">
                   <a:ln>
                     <a:noFill/>
                   </a:ln>
@@ -4790,7 +5069,7 @@
                 <a:defRPr/>
               </a:pPr>
               <a:r>
-                <a:rPr lang="en-US" sz="6000" dirty="0">
+                <a:rPr lang="en-US" sz="5000" dirty="0">
                   <a:solidFill>
                     <a:srgbClr val="37322F"/>
                   </a:solidFill>
@@ -4800,7 +5079,7 @@
                 <a:t>Acknowledgment </a:t>
               </a:r>
               <a:r>
-                <a:rPr lang="fr-FR" sz="6000" dirty="0">
+                <a:rPr lang="fr-FR" sz="5000" dirty="0">
                   <a:solidFill>
                     <a:srgbClr val="37322F"/>
                   </a:solidFill>
@@ -4809,7 +5088,7 @@
                 </a:rPr>
                 <a:t>🤝</a:t>
               </a:r>
-              <a:endParaRPr kumimoji="0" lang="en-US" sz="6000" b="0" i="0" u="none" strike="noStrike" kern="1200" cap="none" spc="0" normalizeH="0" baseline="0" noProof="0" dirty="0">
+              <a:endParaRPr kumimoji="0" lang="en-US" sz="5000" b="0" i="0" u="none" strike="noStrike" kern="1200" cap="none" spc="0" normalizeH="0" baseline="0" noProof="0" dirty="0">
                 <a:ln>
                   <a:noFill/>
                 </a:ln>
@@ -4843,7 +5122,7 @@
                 <a:defRPr/>
               </a:pPr>
               <a:r>
-                <a:rPr kumimoji="0" lang="en-US" sz="1000" b="0" i="0" u="sng" strike="noStrike" kern="1200" cap="none" spc="0" normalizeH="0" baseline="0" noProof="0" dirty="0">
+                <a:rPr kumimoji="0" lang="en-US" sz="2000" b="0" i="0" u="sng" strike="noStrike" kern="1200" cap="none" spc="0" normalizeH="0" baseline="0" noProof="0" dirty="0">
                   <a:ln>
                     <a:noFill/>
                   </a:ln>
@@ -4940,360 +5219,588 @@
           </p:txBody>
         </p:sp>
       </p:grpSp>
-      <p:pic>
-        <p:nvPicPr>
-          <p:cNvPr id="35" name="Image 34" descr="Une image contenant capture d’écran, texte&#10;&#10;Description générée automatiquement">
+      <p:grpSp>
+        <p:nvGrpSpPr>
+          <p:cNvPr id="4" name="Groupe 3">
             <a:extLst>
               <a:ext uri="{FF2B5EF4-FFF2-40B4-BE49-F238E27FC236}">
-                <a16:creationId xmlns:a16="http://schemas.microsoft.com/office/drawing/2014/main" id="{FB3F1B58-F4C2-8B25-46C5-060328F54D22}"/>
+                <a16:creationId xmlns:a16="http://schemas.microsoft.com/office/drawing/2014/main" id="{515FBFC3-547D-36BA-A66E-E6D179168B40}"/>
               </a:ext>
             </a:extLst>
           </p:cNvPr>
-          <p:cNvPicPr>
-            <a:picLocks noChangeAspect="1"/>
-          </p:cNvPicPr>
+          <p:cNvGrpSpPr/>
           <p:nvPr/>
-        </p:nvPicPr>
-        <p:blipFill>
-          <a:blip r:embed="rId6">
-            <a:extLst>
-              <a:ext uri="{28A0092B-C50C-407E-A947-70E740481C1C}">
-                <a14:useLocalDpi xmlns:a14="http://schemas.microsoft.com/office/drawing/2010/main" val="0"/>
-              </a:ext>
-            </a:extLst>
-          </a:blip>
-          <a:stretch>
-            <a:fillRect/>
-          </a:stretch>
-        </p:blipFill>
-        <p:spPr>
+        </p:nvGrpSpPr>
+        <p:grpSpPr>
           <a:xfrm>
-            <a:off x="10380480" y="9259889"/>
-            <a:ext cx="11479014" cy="4355068"/>
+            <a:off x="1504335" y="18974831"/>
+            <a:ext cx="8302682" cy="5940424"/>
+            <a:chOff x="1323157" y="29845168"/>
+            <a:chExt cx="8302682" cy="5940424"/>
           </a:xfrm>
-          <a:prstGeom prst="rect">
-            <a:avLst/>
-          </a:prstGeom>
-        </p:spPr>
-      </p:pic>
-      <p:pic>
-        <p:nvPicPr>
-          <p:cNvPr id="37" name="Image 36" descr="Une image contenant capture d’écran, art&#10;&#10;Description générée automatiquement">
+        </p:grpSpPr>
+        <p:pic>
+          <p:nvPicPr>
+            <p:cNvPr id="41" name="Image 40" descr="Une image contenant texte, Graphique, dessin, art&#10;&#10;Description générée automatiquement">
+              <a:extLst>
+                <a:ext uri="{FF2B5EF4-FFF2-40B4-BE49-F238E27FC236}">
+                  <a16:creationId xmlns:a16="http://schemas.microsoft.com/office/drawing/2014/main" id="{B88A4D61-990B-CB0F-EE15-6D4211C7D6FA}"/>
+                </a:ext>
+              </a:extLst>
+            </p:cNvPr>
+            <p:cNvPicPr>
+              <a:picLocks noChangeAspect="1"/>
+            </p:cNvPicPr>
+            <p:nvPr/>
+          </p:nvPicPr>
+          <p:blipFill>
+            <a:blip r:embed="rId6">
+              <a:extLst>
+                <a:ext uri="{28A0092B-C50C-407E-A947-70E740481C1C}">
+                  <a14:useLocalDpi xmlns:a14="http://schemas.microsoft.com/office/drawing/2010/main" val="0"/>
+                </a:ext>
+              </a:extLst>
+            </a:blip>
+            <a:stretch>
+              <a:fillRect/>
+            </a:stretch>
+          </p:blipFill>
+          <p:spPr>
+            <a:xfrm>
+              <a:off x="1617616" y="29845168"/>
+              <a:ext cx="7713766" cy="5528081"/>
+            </a:xfrm>
+            <a:prstGeom prst="rect">
+              <a:avLst/>
+            </a:prstGeom>
+            <a:ln>
+              <a:noFill/>
+            </a:ln>
+            <a:effectLst>
+              <a:outerShdw blurRad="292100" dist="139700" dir="2700000" algn="tl" rotWithShape="0">
+                <a:srgbClr val="333333">
+                  <a:alpha val="65000"/>
+                </a:srgbClr>
+              </a:outerShdw>
+            </a:effectLst>
+          </p:spPr>
+        </p:pic>
+        <p:sp>
+          <p:nvSpPr>
+            <p:cNvPr id="43" name="ZoneTexte 42">
+              <a:extLst>
+                <a:ext uri="{FF2B5EF4-FFF2-40B4-BE49-F238E27FC236}">
+                  <a16:creationId xmlns:a16="http://schemas.microsoft.com/office/drawing/2014/main" id="{167AB7C5-AC07-4D8B-418A-5264A530EC28}"/>
+                </a:ext>
+              </a:extLst>
+            </p:cNvPr>
+            <p:cNvSpPr txBox="1"/>
+            <p:nvPr/>
+          </p:nvSpPr>
+          <p:spPr>
+            <a:xfrm>
+              <a:off x="1323157" y="35323927"/>
+              <a:ext cx="8302682" cy="461665"/>
+            </a:xfrm>
+            <a:prstGeom prst="rect">
+              <a:avLst/>
+            </a:prstGeom>
+            <a:noFill/>
+          </p:spPr>
+          <p:txBody>
+            <a:bodyPr wrap="square" rtlCol="0">
+              <a:spAutoFit/>
+            </a:bodyPr>
+            <a:lstStyle/>
+            <a:p>
+              <a:pPr algn="ctr"/>
+              <a:r>
+                <a:rPr lang="fr-FR" sz="2400" dirty="0">
+                  <a:latin typeface="Gill Sans Nova" panose="020B0602020104020203" pitchFamily="34" charset="0"/>
+                </a:rPr>
+                <a:t>Figure 2: Concept of </a:t>
+              </a:r>
+              <a:r>
+                <a:rPr lang="fr-FR" sz="2400" dirty="0" err="1">
+                  <a:latin typeface="Gill Sans Nova" panose="020B0602020104020203" pitchFamily="34" charset="0"/>
+                </a:rPr>
+                <a:t>nulling</a:t>
+              </a:r>
+              <a:r>
+                <a:rPr lang="fr-FR" sz="2400" dirty="0">
+                  <a:latin typeface="Gill Sans Nova" panose="020B0602020104020203" pitchFamily="34" charset="0"/>
+                </a:rPr>
+                <a:t> </a:t>
+              </a:r>
+              <a:r>
+                <a:rPr lang="fr-FR" sz="2400" dirty="0" err="1">
+                  <a:latin typeface="Gill Sans Nova" panose="020B0602020104020203" pitchFamily="34" charset="0"/>
+                </a:rPr>
+                <a:t>interferometry</a:t>
+              </a:r>
+              <a:endParaRPr lang="fr-FR" sz="2400" dirty="0">
+                <a:latin typeface="Gill Sans Nova" panose="020B0602020104020203" pitchFamily="34" charset="0"/>
+              </a:endParaRPr>
+            </a:p>
+          </p:txBody>
+        </p:sp>
+      </p:grpSp>
+      <p:grpSp>
+        <p:nvGrpSpPr>
+          <p:cNvPr id="6" name="Groupe 5">
             <a:extLst>
               <a:ext uri="{FF2B5EF4-FFF2-40B4-BE49-F238E27FC236}">
-                <a16:creationId xmlns:a16="http://schemas.microsoft.com/office/drawing/2014/main" id="{79A08ED4-3B68-6C66-C1F8-6F09E61862BF}"/>
+                <a16:creationId xmlns:a16="http://schemas.microsoft.com/office/drawing/2014/main" id="{D1E58E74-E4F4-58FC-5A0F-94CD4B168B2D}"/>
               </a:ext>
             </a:extLst>
           </p:cNvPr>
-          <p:cNvPicPr>
-            <a:picLocks noChangeAspect="1"/>
-          </p:cNvPicPr>
+          <p:cNvGrpSpPr/>
           <p:nvPr/>
-        </p:nvPicPr>
-        <p:blipFill>
-          <a:blip r:embed="rId7">
-            <a:extLst>
-              <a:ext uri="{28A0092B-C50C-407E-A947-70E740481C1C}">
-                <a14:useLocalDpi xmlns:a14="http://schemas.microsoft.com/office/drawing/2010/main" val="0"/>
-              </a:ext>
-            </a:extLst>
-          </a:blip>
-          <a:stretch>
-            <a:fillRect/>
-          </a:stretch>
-        </p:blipFill>
-        <p:spPr>
+        </p:nvGrpSpPr>
+        <p:grpSpPr>
           <a:xfrm>
-            <a:off x="24109539" y="33403509"/>
-            <a:ext cx="5559660" cy="1969740"/>
+            <a:off x="1504335" y="33158140"/>
+            <a:ext cx="8216820" cy="2431405"/>
+            <a:chOff x="22824491" y="33403509"/>
+            <a:chExt cx="8216820" cy="2431405"/>
           </a:xfrm>
-          <a:prstGeom prst="rect">
-            <a:avLst/>
-          </a:prstGeom>
-        </p:spPr>
-      </p:pic>
-      <p:pic>
-        <p:nvPicPr>
-          <p:cNvPr id="41" name="Image 40" descr="Une image contenant texte, Graphique, dessin, art&#10;&#10;Description générée automatiquement">
+        </p:grpSpPr>
+        <p:pic>
+          <p:nvPicPr>
+            <p:cNvPr id="37" name="Image 36" descr="Une image contenant capture d’écran, art&#10;&#10;Description générée automatiquement">
+              <a:extLst>
+                <a:ext uri="{FF2B5EF4-FFF2-40B4-BE49-F238E27FC236}">
+                  <a16:creationId xmlns:a16="http://schemas.microsoft.com/office/drawing/2014/main" id="{79A08ED4-3B68-6C66-C1F8-6F09E61862BF}"/>
+                </a:ext>
+              </a:extLst>
+            </p:cNvPr>
+            <p:cNvPicPr>
+              <a:picLocks noChangeAspect="1"/>
+            </p:cNvPicPr>
+            <p:nvPr/>
+          </p:nvPicPr>
+          <p:blipFill>
+            <a:blip r:embed="rId7">
+              <a:extLst>
+                <a:ext uri="{28A0092B-C50C-407E-A947-70E740481C1C}">
+                  <a14:useLocalDpi xmlns:a14="http://schemas.microsoft.com/office/drawing/2010/main" val="0"/>
+                </a:ext>
+              </a:extLst>
+            </a:blip>
+            <a:stretch>
+              <a:fillRect/>
+            </a:stretch>
+          </p:blipFill>
+          <p:spPr>
+            <a:xfrm>
+              <a:off x="24588511" y="33403509"/>
+              <a:ext cx="5559660" cy="1969740"/>
+            </a:xfrm>
+            <a:prstGeom prst="rect">
+              <a:avLst/>
+            </a:prstGeom>
+            <a:ln>
+              <a:noFill/>
+            </a:ln>
+            <a:effectLst>
+              <a:outerShdw blurRad="292100" dist="139700" dir="2700000" algn="tl" rotWithShape="0">
+                <a:srgbClr val="333333">
+                  <a:alpha val="65000"/>
+                </a:srgbClr>
+              </a:outerShdw>
+            </a:effectLst>
+          </p:spPr>
+        </p:pic>
+        <p:sp>
+          <p:nvSpPr>
+            <p:cNvPr id="44" name="ZoneTexte 43">
+              <a:extLst>
+                <a:ext uri="{FF2B5EF4-FFF2-40B4-BE49-F238E27FC236}">
+                  <a16:creationId xmlns:a16="http://schemas.microsoft.com/office/drawing/2014/main" id="{70EA650D-34E2-29BE-F243-9ABB0087E0F2}"/>
+                </a:ext>
+              </a:extLst>
+            </p:cNvPr>
+            <p:cNvSpPr txBox="1"/>
+            <p:nvPr/>
+          </p:nvSpPr>
+          <p:spPr>
+            <a:xfrm>
+              <a:off x="22824491" y="35373249"/>
+              <a:ext cx="8216820" cy="461665"/>
+            </a:xfrm>
+            <a:prstGeom prst="rect">
+              <a:avLst/>
+            </a:prstGeom>
+            <a:noFill/>
+          </p:spPr>
+          <p:txBody>
+            <a:bodyPr wrap="square" rtlCol="0">
+              <a:spAutoFit/>
+            </a:bodyPr>
+            <a:lstStyle/>
+            <a:p>
+              <a:pPr algn="ctr"/>
+              <a:r>
+                <a:rPr lang="fr-FR" sz="2400" dirty="0">
+                  <a:latin typeface="Gill Sans Nova" panose="020B0602020104020203" pitchFamily="34" charset="0"/>
+                </a:rPr>
+                <a:t>Figure 3: Scheme of </a:t>
+              </a:r>
+              <a:r>
+                <a:rPr lang="fr-FR" sz="2400" dirty="0" err="1">
+                  <a:latin typeface="Gill Sans Nova" panose="020B0602020104020203" pitchFamily="34" charset="0"/>
+                </a:rPr>
+                <a:t>thermo-optic</a:t>
+              </a:r>
+              <a:r>
+                <a:rPr lang="fr-FR" sz="2400" dirty="0">
+                  <a:latin typeface="Gill Sans Nova" panose="020B0602020104020203" pitchFamily="34" charset="0"/>
+                </a:rPr>
+                <a:t> phase </a:t>
+              </a:r>
+              <a:r>
+                <a:rPr lang="fr-FR" sz="2400" dirty="0" err="1">
+                  <a:latin typeface="Gill Sans Nova" panose="020B0602020104020203" pitchFamily="34" charset="0"/>
+                </a:rPr>
+                <a:t>shifter</a:t>
+              </a:r>
+              <a:endParaRPr lang="fr-FR" sz="2400" dirty="0">
+                <a:latin typeface="Gill Sans Nova" panose="020B0602020104020203" pitchFamily="34" charset="0"/>
+              </a:endParaRPr>
+            </a:p>
+          </p:txBody>
+        </p:sp>
+      </p:grpSp>
+      <p:grpSp>
+        <p:nvGrpSpPr>
+          <p:cNvPr id="3" name="Groupe 2">
             <a:extLst>
               <a:ext uri="{FF2B5EF4-FFF2-40B4-BE49-F238E27FC236}">
-                <a16:creationId xmlns:a16="http://schemas.microsoft.com/office/drawing/2014/main" id="{B88A4D61-990B-CB0F-EE15-6D4211C7D6FA}"/>
+                <a16:creationId xmlns:a16="http://schemas.microsoft.com/office/drawing/2014/main" id="{09F33378-61A4-AD20-FDC4-1DE264916335}"/>
               </a:ext>
             </a:extLst>
           </p:cNvPr>
-          <p:cNvPicPr>
-            <a:picLocks noChangeAspect="1"/>
-          </p:cNvPicPr>
+          <p:cNvGrpSpPr/>
           <p:nvPr/>
-        </p:nvPicPr>
-        <p:blipFill>
-          <a:blip r:embed="rId8">
-            <a:extLst>
-              <a:ext uri="{28A0092B-C50C-407E-A947-70E740481C1C}">
-                <a14:useLocalDpi xmlns:a14="http://schemas.microsoft.com/office/drawing/2010/main" val="0"/>
-              </a:ext>
-            </a:extLst>
-          </a:blip>
-          <a:stretch>
-            <a:fillRect/>
-          </a:stretch>
-        </p:blipFill>
-        <p:spPr>
+        </p:nvGrpSpPr>
+        <p:grpSpPr>
           <a:xfrm>
-            <a:off x="1617616" y="29845168"/>
-            <a:ext cx="7713766" cy="5528081"/>
+            <a:off x="20840964" y="9273233"/>
+            <a:ext cx="11479014" cy="4816733"/>
+            <a:chOff x="10380480" y="9259889"/>
+            <a:chExt cx="11479014" cy="4816733"/>
           </a:xfrm>
-          <a:prstGeom prst="rect">
-            <a:avLst/>
-          </a:prstGeom>
-        </p:spPr>
-      </p:pic>
-      <p:sp>
-        <p:nvSpPr>
-          <p:cNvPr id="43" name="ZoneTexte 42">
+        </p:grpSpPr>
+        <p:pic>
+          <p:nvPicPr>
+            <p:cNvPr id="35" name="Image 34" descr="Une image contenant capture d’écran, texte&#10;&#10;Description générée automatiquement">
+              <a:extLst>
+                <a:ext uri="{FF2B5EF4-FFF2-40B4-BE49-F238E27FC236}">
+                  <a16:creationId xmlns:a16="http://schemas.microsoft.com/office/drawing/2014/main" id="{FB3F1B58-F4C2-8B25-46C5-060328F54D22}"/>
+                </a:ext>
+              </a:extLst>
+            </p:cNvPr>
+            <p:cNvPicPr>
+              <a:picLocks noChangeAspect="1"/>
+            </p:cNvPicPr>
+            <p:nvPr/>
+          </p:nvPicPr>
+          <p:blipFill>
+            <a:blip r:embed="rId8">
+              <a:extLst>
+                <a:ext uri="{28A0092B-C50C-407E-A947-70E740481C1C}">
+                  <a14:useLocalDpi xmlns:a14="http://schemas.microsoft.com/office/drawing/2010/main" val="0"/>
+                </a:ext>
+              </a:extLst>
+            </a:blip>
+            <a:stretch>
+              <a:fillRect/>
+            </a:stretch>
+          </p:blipFill>
+          <p:spPr>
+            <a:xfrm>
+              <a:off x="10380480" y="9259889"/>
+              <a:ext cx="11479014" cy="4355068"/>
+            </a:xfrm>
+            <a:prstGeom prst="rect">
+              <a:avLst/>
+            </a:prstGeom>
+            <a:ln>
+              <a:noFill/>
+            </a:ln>
+            <a:effectLst>
+              <a:outerShdw blurRad="292100" dist="139700" dir="2700000" algn="tl" rotWithShape="0">
+                <a:srgbClr val="333333">
+                  <a:alpha val="65000"/>
+                </a:srgbClr>
+              </a:outerShdw>
+            </a:effectLst>
+          </p:spPr>
+        </p:pic>
+        <p:sp>
+          <p:nvSpPr>
+            <p:cNvPr id="45" name="ZoneTexte 44">
+              <a:extLst>
+                <a:ext uri="{FF2B5EF4-FFF2-40B4-BE49-F238E27FC236}">
+                  <a16:creationId xmlns:a16="http://schemas.microsoft.com/office/drawing/2014/main" id="{A9BF5C81-52A0-868A-24DA-C676DB68262A}"/>
+                </a:ext>
+              </a:extLst>
+            </p:cNvPr>
+            <p:cNvSpPr txBox="1"/>
+            <p:nvPr/>
+          </p:nvSpPr>
+          <p:spPr>
+            <a:xfrm>
+              <a:off x="12011577" y="13614957"/>
+              <a:ext cx="8216820" cy="461665"/>
+            </a:xfrm>
+            <a:prstGeom prst="rect">
+              <a:avLst/>
+            </a:prstGeom>
+            <a:noFill/>
+          </p:spPr>
+          <p:txBody>
+            <a:bodyPr wrap="square" rtlCol="0">
+              <a:spAutoFit/>
+            </a:bodyPr>
+            <a:lstStyle/>
+            <a:p>
+              <a:pPr algn="ctr"/>
+              <a:r>
+                <a:rPr lang="fr-FR" sz="2400" dirty="0">
+                  <a:latin typeface="Gill Sans Nova" panose="020B0602020104020203" pitchFamily="34" charset="0"/>
+                </a:rPr>
+                <a:t>Figure 1: Scheme of </a:t>
+              </a:r>
+              <a:r>
+                <a:rPr lang="fr-FR" sz="2400" dirty="0" err="1">
+                  <a:latin typeface="Gill Sans Nova" panose="020B0602020104020203" pitchFamily="34" charset="0"/>
+                </a:rPr>
+                <a:t>our</a:t>
+              </a:r>
+              <a:r>
+                <a:rPr lang="fr-FR" sz="2400" dirty="0">
+                  <a:latin typeface="Gill Sans Nova" panose="020B0602020104020203" pitchFamily="34" charset="0"/>
+                </a:rPr>
+                <a:t> Kernel-</a:t>
+              </a:r>
+              <a:r>
+                <a:rPr lang="fr-FR" sz="2400" dirty="0" err="1">
+                  <a:latin typeface="Gill Sans Nova" panose="020B0602020104020203" pitchFamily="34" charset="0"/>
+                </a:rPr>
+                <a:t>Nulling</a:t>
+              </a:r>
+              <a:r>
+                <a:rPr lang="fr-FR" sz="2400" dirty="0">
+                  <a:latin typeface="Gill Sans Nova" panose="020B0602020104020203" pitchFamily="34" charset="0"/>
+                </a:rPr>
+                <a:t> architecture</a:t>
+              </a:r>
+            </a:p>
+          </p:txBody>
+        </p:sp>
+      </p:grpSp>
+      <p:sp>
+        <p:nvSpPr>
+          <p:cNvPr id="8" name="Rectangle : coins arrondis 7">
             <a:extLst>
               <a:ext uri="{FF2B5EF4-FFF2-40B4-BE49-F238E27FC236}">
-                <a16:creationId xmlns:a16="http://schemas.microsoft.com/office/drawing/2014/main" id="{167AB7C5-AC07-4D8B-418A-5264A530EC28}"/>
+                <a16:creationId xmlns:a16="http://schemas.microsoft.com/office/drawing/2014/main" id="{0C379A8F-C7A8-CD89-C5B7-B3D7DBC0A70B}"/>
               </a:ext>
             </a:extLst>
           </p:cNvPr>
-          <p:cNvSpPr txBox="1"/>
+          <p:cNvSpPr>
+            <a:spLocks/>
+          </p:cNvSpPr>
           <p:nvPr/>
         </p:nvSpPr>
         <p:spPr>
           <a:xfrm>
-            <a:off x="1028700" y="35423490"/>
-            <a:ext cx="8302682" cy="461665"/>
+            <a:off x="11087939" y="24956730"/>
+            <a:ext cx="10064094" cy="10928421"/>
           </a:xfrm>
-          <a:prstGeom prst="rect">
+          <a:prstGeom prst="roundRect">
             <a:avLst/>
           </a:prstGeom>
-          <a:noFill/>
+          <a:solidFill>
+            <a:srgbClr val="E7E1D5"/>
+          </a:solidFill>
+          <a:ln>
+            <a:noFill/>
+          </a:ln>
         </p:spPr>
-        <p:txBody>
-          <a:bodyPr wrap="square" rtlCol="0">
-            <a:spAutoFit/>
-          </a:bodyPr>
+        <p:style>
+          <a:lnRef idx="2">
+            <a:schemeClr val="accent1">
+              <a:shade val="15000"/>
+            </a:schemeClr>
+          </a:lnRef>
+          <a:fillRef idx="1">
+            <a:schemeClr val="accent1"/>
+          </a:fillRef>
+          <a:effectRef idx="0">
+            <a:schemeClr val="accent1"/>
+          </a:effectRef>
+          <a:fontRef idx="minor">
+            <a:schemeClr val="lt1"/>
+          </a:fontRef>
+        </p:style>
+        <p:txBody>
+          <a:bodyPr rtlCol="0" anchor="t"/>
           <a:lstStyle/>
           <a:p>
             <a:pPr algn="ctr"/>
             <a:r>
-              <a:rPr lang="fr-FR" sz="2400" dirty="0">
+              <a:rPr lang="fr-FR" sz="5000" dirty="0">
+                <a:solidFill>
+                  <a:srgbClr val="37322F"/>
+                </a:solidFill>
+                <a:latin typeface="Gill Sans Nova" panose="020B0602020104020203" pitchFamily="34" charset="0"/>
+                <a:cs typeface="Aharoni" panose="020F0502020204030204" pitchFamily="2" charset="-79"/>
+              </a:rPr>
+              <a:t>Kernels 💠</a:t>
+            </a:r>
+            <a:endParaRPr lang="en-US" sz="5000" dirty="0">
+              <a:solidFill>
+                <a:srgbClr val="37322F"/>
+              </a:solidFill>
+              <a:latin typeface="Gill Sans Nova" panose="020B0602020104020203" pitchFamily="34" charset="0"/>
+              <a:cs typeface="Aharoni" panose="020F0502020204030204" pitchFamily="2" charset="-79"/>
+            </a:endParaRPr>
+          </a:p>
+          <a:p>
+            <a:pPr algn="ctr"/>
+            <a:r>
+              <a:rPr lang="en-US" sz="2000" u="sng" dirty="0">
+                <a:solidFill>
+                  <a:srgbClr val="37322F"/>
+                </a:solidFill>
+                <a:latin typeface="Gill Sans Nova" panose="020B0602020104020203" pitchFamily="34" charset="0"/>
+                <a:cs typeface="Aharoni" panose="020F0502020204030204" pitchFamily="2" charset="-79"/>
+              </a:rPr>
+              <a:t> </a:t>
+            </a:r>
+          </a:p>
+          <a:p>
+            <a:r>
+              <a:rPr lang="fr-FR" sz="3200" dirty="0">
+                <a:solidFill>
+                  <a:srgbClr val="37322F"/>
+                </a:solidFill>
                 <a:latin typeface="Gill Sans Nova" panose="020B0602020104020203" pitchFamily="34" charset="0"/>
               </a:rPr>
-              <a:t>Figure 1: Concept of </a:t>
-            </a:r>
-            <a:r>
-              <a:rPr lang="fr-FR" sz="2400" dirty="0" err="1">
-                <a:latin typeface="Gill Sans Nova" panose="020B0602020104020203" pitchFamily="34" charset="0"/>
-              </a:rPr>
-              <a:t>nulling</a:t>
-            </a:r>
-            <a:r>
-              <a:rPr lang="fr-FR" sz="2400" dirty="0">
-                <a:latin typeface="Gill Sans Nova" panose="020B0602020104020203" pitchFamily="34" charset="0"/>
-              </a:rPr>
-              <a:t> </a:t>
-            </a:r>
-            <a:r>
-              <a:rPr lang="fr-FR" sz="2400" dirty="0" err="1">
-                <a:latin typeface="Gill Sans Nova" panose="020B0602020104020203" pitchFamily="34" charset="0"/>
-              </a:rPr>
-              <a:t>interferometry</a:t>
-            </a:r>
-            <a:endParaRPr lang="fr-FR" sz="2400" dirty="0">
-              <a:latin typeface="Gill Sans Nova" panose="020B0602020104020203" pitchFamily="34" charset="0"/>
-            </a:endParaRPr>
-          </a:p>
-        </p:txBody>
-      </p:sp>
-      <p:sp>
-        <p:nvSpPr>
-          <p:cNvPr id="44" name="ZoneTexte 43">
+              <a:t>Blablabla</a:t>
+            </a:r>
+          </a:p>
+        </p:txBody>
+      </p:sp>
+      <p:grpSp>
+        <p:nvGrpSpPr>
+          <p:cNvPr id="20" name="Groupe 19">
             <a:extLst>
               <a:ext uri="{FF2B5EF4-FFF2-40B4-BE49-F238E27FC236}">
-                <a16:creationId xmlns:a16="http://schemas.microsoft.com/office/drawing/2014/main" id="{70EA650D-34E2-29BE-F243-9ABB0087E0F2}"/>
+                <a16:creationId xmlns:a16="http://schemas.microsoft.com/office/drawing/2014/main" id="{9B8521D6-7E05-CFB1-095C-180A71EC1CA6}"/>
               </a:ext>
             </a:extLst>
           </p:cNvPr>
-          <p:cNvSpPr txBox="1"/>
+          <p:cNvGrpSpPr/>
           <p:nvPr/>
-        </p:nvSpPr>
-        <p:spPr>
+        </p:nvGrpSpPr>
+        <p:grpSpPr>
           <a:xfrm>
-            <a:off x="22472061" y="35423489"/>
-            <a:ext cx="8216820" cy="461665"/>
+            <a:off x="11474271" y="19948554"/>
+            <a:ext cx="9006921" cy="3580634"/>
+            <a:chOff x="11862888" y="18669766"/>
+            <a:chExt cx="14079915" cy="5597365"/>
           </a:xfrm>
-          <a:prstGeom prst="rect">
-            <a:avLst/>
-          </a:prstGeom>
-          <a:noFill/>
-        </p:spPr>
-        <p:txBody>
-          <a:bodyPr wrap="square" rtlCol="0">
-            <a:spAutoFit/>
-          </a:bodyPr>
-          <a:lstStyle/>
-          <a:p>
-            <a:pPr algn="ctr"/>
-            <a:r>
-              <a:rPr lang="fr-FR" sz="2400" dirty="0">
-                <a:latin typeface="Gill Sans Nova" panose="020B0602020104020203" pitchFamily="34" charset="0"/>
-              </a:rPr>
-              <a:t>Figure 3: Scheme of </a:t>
-            </a:r>
-            <a:r>
-              <a:rPr lang="fr-FR" sz="2400" dirty="0" err="1">
-                <a:latin typeface="Gill Sans Nova" panose="020B0602020104020203" pitchFamily="34" charset="0"/>
-              </a:rPr>
-              <a:t>thermo-optic</a:t>
-            </a:r>
-            <a:r>
-              <a:rPr lang="fr-FR" sz="2400" dirty="0">
-                <a:latin typeface="Gill Sans Nova" panose="020B0602020104020203" pitchFamily="34" charset="0"/>
-              </a:rPr>
-              <a:t> phase </a:t>
-            </a:r>
-            <a:r>
-              <a:rPr lang="fr-FR" sz="2400" dirty="0" err="1">
-                <a:latin typeface="Gill Sans Nova" panose="020B0602020104020203" pitchFamily="34" charset="0"/>
-              </a:rPr>
-              <a:t>shifter</a:t>
-            </a:r>
-            <a:endParaRPr lang="fr-FR" sz="2400" dirty="0">
-              <a:latin typeface="Gill Sans Nova" panose="020B0602020104020203" pitchFamily="34" charset="0"/>
-            </a:endParaRPr>
-          </a:p>
-        </p:txBody>
-      </p:sp>
-      <p:sp>
-        <p:nvSpPr>
-          <p:cNvPr id="45" name="ZoneTexte 44">
+        </p:grpSpPr>
+        <p:pic>
+          <p:nvPicPr>
+            <p:cNvPr id="17" name="Image 16">
+              <a:extLst>
+                <a:ext uri="{FF2B5EF4-FFF2-40B4-BE49-F238E27FC236}">
+                  <a16:creationId xmlns:a16="http://schemas.microsoft.com/office/drawing/2014/main" id="{29AB539B-D1D0-15B4-2D8F-B4D1AC56A684}"/>
+                </a:ext>
+              </a:extLst>
+            </p:cNvPr>
+            <p:cNvPicPr>
+              <a:picLocks noChangeAspect="1"/>
+            </p:cNvPicPr>
+            <p:nvPr/>
+          </p:nvPicPr>
+          <p:blipFill>
+            <a:blip r:embed="rId9"/>
+            <a:stretch>
+              <a:fillRect/>
+            </a:stretch>
+          </p:blipFill>
+          <p:spPr>
+            <a:xfrm>
+              <a:off x="11862888" y="18669766"/>
+              <a:ext cx="14079915" cy="2800741"/>
+            </a:xfrm>
+            <a:prstGeom prst="rect">
+              <a:avLst/>
+            </a:prstGeom>
+            <a:ln>
+              <a:noFill/>
+            </a:ln>
+            <a:effectLst>
+              <a:outerShdw blurRad="292100" dist="139700" dir="2700000" algn="tl" rotWithShape="0">
+                <a:srgbClr val="333333">
+                  <a:alpha val="65000"/>
+                </a:srgbClr>
+              </a:outerShdw>
+            </a:effectLst>
+          </p:spPr>
+        </p:pic>
+        <p:pic>
+          <p:nvPicPr>
+            <p:cNvPr id="19" name="Image 18">
+              <a:extLst>
+                <a:ext uri="{FF2B5EF4-FFF2-40B4-BE49-F238E27FC236}">
+                  <a16:creationId xmlns:a16="http://schemas.microsoft.com/office/drawing/2014/main" id="{83B1411B-2709-32D9-4E95-255B62CB4BFC}"/>
+                </a:ext>
+              </a:extLst>
+            </p:cNvPr>
+            <p:cNvPicPr>
+              <a:picLocks noChangeAspect="1"/>
+            </p:cNvPicPr>
+            <p:nvPr/>
+          </p:nvPicPr>
+          <p:blipFill>
+            <a:blip r:embed="rId10"/>
+            <a:stretch>
+              <a:fillRect/>
+            </a:stretch>
+          </p:blipFill>
+          <p:spPr>
+            <a:xfrm>
+              <a:off x="11862888" y="21466390"/>
+              <a:ext cx="14079915" cy="2800741"/>
+            </a:xfrm>
+            <a:prstGeom prst="rect">
+              <a:avLst/>
+            </a:prstGeom>
+            <a:ln>
+              <a:noFill/>
+            </a:ln>
+            <a:effectLst>
+              <a:outerShdw blurRad="292100" dist="139700" dir="2700000" algn="tl" rotWithShape="0">
+                <a:srgbClr val="333333">
+                  <a:alpha val="65000"/>
+                </a:srgbClr>
+              </a:outerShdw>
+            </a:effectLst>
+          </p:spPr>
+        </p:pic>
+      </p:grpSp>
+      <p:pic>
+        <p:nvPicPr>
+          <p:cNvPr id="24" name="Image 23">
             <a:extLst>
               <a:ext uri="{FF2B5EF4-FFF2-40B4-BE49-F238E27FC236}">
-                <a16:creationId xmlns:a16="http://schemas.microsoft.com/office/drawing/2014/main" id="{A9BF5C81-52A0-868A-24DA-C676DB68262A}"/>
-              </a:ext>
-            </a:extLst>
-          </p:cNvPr>
-          <p:cNvSpPr txBox="1"/>
-          <p:nvPr/>
-        </p:nvSpPr>
-        <p:spPr>
-          <a:xfrm>
-            <a:off x="12011577" y="13462664"/>
-            <a:ext cx="8216820" cy="461665"/>
-          </a:xfrm>
-          <a:prstGeom prst="rect">
-            <a:avLst/>
-          </a:prstGeom>
-          <a:noFill/>
-        </p:spPr>
-        <p:txBody>
-          <a:bodyPr wrap="square" rtlCol="0">
-            <a:spAutoFit/>
-          </a:bodyPr>
-          <a:lstStyle/>
-          <a:p>
-            <a:pPr algn="ctr"/>
-            <a:r>
-              <a:rPr lang="fr-FR" sz="2400" dirty="0">
-                <a:latin typeface="Gill Sans Nova" panose="020B0602020104020203" pitchFamily="34" charset="0"/>
-              </a:rPr>
-              <a:t>Figure 2: Scheme of </a:t>
-            </a:r>
-            <a:r>
-              <a:rPr lang="fr-FR" sz="2400" dirty="0" err="1">
-                <a:latin typeface="Gill Sans Nova" panose="020B0602020104020203" pitchFamily="34" charset="0"/>
-              </a:rPr>
-              <a:t>our</a:t>
-            </a:r>
-            <a:r>
-              <a:rPr lang="fr-FR" sz="2400" dirty="0">
-                <a:latin typeface="Gill Sans Nova" panose="020B0602020104020203" pitchFamily="34" charset="0"/>
-              </a:rPr>
-              <a:t> Kernel-</a:t>
-            </a:r>
-            <a:r>
-              <a:rPr lang="fr-FR" sz="2400" dirty="0" err="1">
-                <a:latin typeface="Gill Sans Nova" panose="020B0602020104020203" pitchFamily="34" charset="0"/>
-              </a:rPr>
-              <a:t>Nulling</a:t>
-            </a:r>
-            <a:r>
-              <a:rPr lang="fr-FR" sz="2400" dirty="0">
-                <a:latin typeface="Gill Sans Nova" panose="020B0602020104020203" pitchFamily="34" charset="0"/>
-              </a:rPr>
-              <a:t> architecture</a:t>
-            </a:r>
-          </a:p>
-        </p:txBody>
-      </p:sp>
-      <p:pic>
-        <p:nvPicPr>
-          <p:cNvPr id="49" name="Image 48">
-            <a:extLst>
-              <a:ext uri="{FF2B5EF4-FFF2-40B4-BE49-F238E27FC236}">
-                <a16:creationId xmlns:a16="http://schemas.microsoft.com/office/drawing/2014/main" id="{46303983-A851-0FC7-FFFC-072645FAE819}"/>
-              </a:ext>
-            </a:extLst>
-          </p:cNvPr>
-          <p:cNvPicPr>
-            <a:picLocks noChangeAspect="1"/>
-          </p:cNvPicPr>
-          <p:nvPr/>
-        </p:nvPicPr>
-        <p:blipFill>
-          <a:blip r:embed="rId9"/>
-          <a:stretch>
-            <a:fillRect/>
-          </a:stretch>
-        </p:blipFill>
-        <p:spPr>
-          <a:xfrm>
-            <a:off x="21825948" y="12461710"/>
-            <a:ext cx="9879053" cy="1965116"/>
-          </a:xfrm>
-          <a:prstGeom prst="rect">
-            <a:avLst/>
-          </a:prstGeom>
-        </p:spPr>
-      </p:pic>
-      <p:pic>
-        <p:nvPicPr>
-          <p:cNvPr id="51" name="Image 50">
-            <a:extLst>
-              <a:ext uri="{FF2B5EF4-FFF2-40B4-BE49-F238E27FC236}">
-                <a16:creationId xmlns:a16="http://schemas.microsoft.com/office/drawing/2014/main" id="{B9D74AB2-0AE4-DDA5-8C26-577BEE13336F}"/>
-              </a:ext>
-            </a:extLst>
-          </p:cNvPr>
-          <p:cNvPicPr>
-            <a:picLocks noChangeAspect="1"/>
-          </p:cNvPicPr>
-          <p:nvPr/>
-        </p:nvPicPr>
-        <p:blipFill>
-          <a:blip r:embed="rId10"/>
-          <a:stretch>
-            <a:fillRect/>
-          </a:stretch>
-        </p:blipFill>
-        <p:spPr>
-          <a:xfrm>
-            <a:off x="21859493" y="14422567"/>
-            <a:ext cx="9845507" cy="1958443"/>
-          </a:xfrm>
-          <a:prstGeom prst="rect">
-            <a:avLst/>
-          </a:prstGeom>
-        </p:spPr>
-      </p:pic>
-      <p:pic>
-        <p:nvPicPr>
-          <p:cNvPr id="53" name="Image 52">
-            <a:extLst>
-              <a:ext uri="{FF2B5EF4-FFF2-40B4-BE49-F238E27FC236}">
-                <a16:creationId xmlns:a16="http://schemas.microsoft.com/office/drawing/2014/main" id="{D5B4CBB3-7CED-84A7-BCF0-6F95BB87059A}"/>
+                <a16:creationId xmlns:a16="http://schemas.microsoft.com/office/drawing/2014/main" id="{6536610B-CDCD-C67C-FD1C-2C58E435DDBD}"/>
               </a:ext>
             </a:extLst>
           </p:cNvPr>
@@ -5310,134 +5817,125 @@
         </p:blipFill>
         <p:spPr>
           <a:xfrm>
-            <a:off x="11429006" y="16781282"/>
-            <a:ext cx="4648876" cy="1637340"/>
+            <a:off x="22077010" y="19200076"/>
+            <a:ext cx="9006921" cy="3433295"/>
           </a:xfrm>
           <a:prstGeom prst="rect">
             <a:avLst/>
           </a:prstGeom>
+          <a:ln>
+            <a:noFill/>
+          </a:ln>
+          <a:effectLst>
+            <a:outerShdw blurRad="292100" dist="139700" dir="2700000" algn="tl" rotWithShape="0">
+              <a:srgbClr val="333333">
+                <a:alpha val="65000"/>
+              </a:srgbClr>
+            </a:outerShdw>
+          </a:effectLst>
         </p:spPr>
       </p:pic>
-      <p:pic>
-        <p:nvPicPr>
-          <p:cNvPr id="55" name="Image 54">
+      <p:grpSp>
+        <p:nvGrpSpPr>
+          <p:cNvPr id="38" name="Groupe 37">
             <a:extLst>
               <a:ext uri="{FF2B5EF4-FFF2-40B4-BE49-F238E27FC236}">
-                <a16:creationId xmlns:a16="http://schemas.microsoft.com/office/drawing/2014/main" id="{C5F97FB4-5233-9370-53E3-878F088EC827}"/>
+                <a16:creationId xmlns:a16="http://schemas.microsoft.com/office/drawing/2014/main" id="{45E54D07-A631-1226-DB10-74A250A5923C}"/>
               </a:ext>
             </a:extLst>
           </p:cNvPr>
-          <p:cNvPicPr>
-            <a:picLocks noChangeAspect="1"/>
-          </p:cNvPicPr>
+          <p:cNvGrpSpPr/>
           <p:nvPr/>
-        </p:nvPicPr>
-        <p:blipFill>
-          <a:blip r:embed="rId12"/>
-          <a:stretch>
-            <a:fillRect/>
-          </a:stretch>
-        </p:blipFill>
-        <p:spPr>
+        </p:nvGrpSpPr>
+        <p:grpSpPr>
           <a:xfrm>
-            <a:off x="16157539" y="16781282"/>
-            <a:ext cx="4653428" cy="1661144"/>
+            <a:off x="11185265" y="29682946"/>
+            <a:ext cx="9869444" cy="6142307"/>
+            <a:chOff x="11185265" y="29682946"/>
+            <a:chExt cx="9869444" cy="6142307"/>
           </a:xfrm>
-          <a:prstGeom prst="rect">
-            <a:avLst/>
-          </a:prstGeom>
-        </p:spPr>
-      </p:pic>
-      <p:pic>
-        <p:nvPicPr>
-          <p:cNvPr id="57" name="Image 56">
-            <a:extLst>
-              <a:ext uri="{FF2B5EF4-FFF2-40B4-BE49-F238E27FC236}">
-                <a16:creationId xmlns:a16="http://schemas.microsoft.com/office/drawing/2014/main" id="{66F5DAB8-C08B-EA3D-2290-E00D8047635A}"/>
-              </a:ext>
-            </a:extLst>
-          </p:cNvPr>
-          <p:cNvPicPr>
-            <a:picLocks noChangeAspect="1"/>
-          </p:cNvPicPr>
-          <p:nvPr/>
-        </p:nvPicPr>
-        <p:blipFill>
-          <a:blip r:embed="rId13"/>
-          <a:stretch>
-            <a:fillRect/>
-          </a:stretch>
-        </p:blipFill>
-        <p:spPr>
-          <a:xfrm>
-            <a:off x="11386480" y="18685147"/>
-            <a:ext cx="9182503" cy="3293644"/>
-          </a:xfrm>
-          <a:prstGeom prst="rect">
-            <a:avLst/>
-          </a:prstGeom>
-        </p:spPr>
-      </p:pic>
-      <p:pic>
-        <p:nvPicPr>
-          <p:cNvPr id="63" name="Image 62">
-            <a:extLst>
-              <a:ext uri="{FF2B5EF4-FFF2-40B4-BE49-F238E27FC236}">
-                <a16:creationId xmlns:a16="http://schemas.microsoft.com/office/drawing/2014/main" id="{D66B923E-43AB-92EE-F73D-EEC79B4D8013}"/>
-              </a:ext>
-            </a:extLst>
-          </p:cNvPr>
-          <p:cNvPicPr>
-            <a:picLocks noChangeAspect="1"/>
-          </p:cNvPicPr>
-          <p:nvPr/>
-        </p:nvPicPr>
-        <p:blipFill>
-          <a:blip r:embed="rId14"/>
-          <a:stretch>
-            <a:fillRect/>
-          </a:stretch>
-        </p:blipFill>
-        <p:spPr>
-          <a:xfrm>
-            <a:off x="24896605" y="17230658"/>
-            <a:ext cx="3985528" cy="2897928"/>
-          </a:xfrm>
-          <a:prstGeom prst="rect">
-            <a:avLst/>
-          </a:prstGeom>
-        </p:spPr>
-      </p:pic>
-      <p:pic>
-        <p:nvPicPr>
-          <p:cNvPr id="67" name="Image 66">
-            <a:extLst>
-              <a:ext uri="{FF2B5EF4-FFF2-40B4-BE49-F238E27FC236}">
-                <a16:creationId xmlns:a16="http://schemas.microsoft.com/office/drawing/2014/main" id="{633ADD5A-0847-8AA7-C05E-9E6C5C0BFB28}"/>
-              </a:ext>
-            </a:extLst>
-          </p:cNvPr>
-          <p:cNvPicPr>
-            <a:picLocks noChangeAspect="1"/>
-          </p:cNvPicPr>
-          <p:nvPr/>
-        </p:nvPicPr>
-        <p:blipFill>
-          <a:blip r:embed="rId15"/>
-          <a:stretch>
-            <a:fillRect/>
-          </a:stretch>
-        </p:blipFill>
-        <p:spPr>
-          <a:xfrm>
-            <a:off x="11678186" y="23982453"/>
-            <a:ext cx="8799391" cy="8694220"/>
-          </a:xfrm>
-          <a:prstGeom prst="rect">
-            <a:avLst/>
-          </a:prstGeom>
-        </p:spPr>
-      </p:pic>
+        </p:grpSpPr>
+        <p:pic>
+          <p:nvPicPr>
+            <p:cNvPr id="29" name="Image 28">
+              <a:extLst>
+                <a:ext uri="{FF2B5EF4-FFF2-40B4-BE49-F238E27FC236}">
+                  <a16:creationId xmlns:a16="http://schemas.microsoft.com/office/drawing/2014/main" id="{FE6EF54D-90AB-1281-F909-4132B96AA9AB}"/>
+                </a:ext>
+              </a:extLst>
+            </p:cNvPr>
+            <p:cNvPicPr>
+              <a:picLocks noChangeAspect="1"/>
+            </p:cNvPicPr>
+            <p:nvPr/>
+          </p:nvPicPr>
+          <p:blipFill>
+            <a:blip r:embed="rId12"/>
+            <a:stretch>
+              <a:fillRect/>
+            </a:stretch>
+          </p:blipFill>
+          <p:spPr>
+            <a:xfrm>
+              <a:off x="11185265" y="29682946"/>
+              <a:ext cx="9869444" cy="3284408"/>
+            </a:xfrm>
+            <a:prstGeom prst="rect">
+              <a:avLst/>
+            </a:prstGeom>
+            <a:ln>
+              <a:noFill/>
+            </a:ln>
+            <a:effectLst>
+              <a:outerShdw blurRad="292100" dist="139700" dir="2700000" algn="tl" rotWithShape="0">
+                <a:srgbClr val="333333">
+                  <a:alpha val="65000"/>
+                </a:srgbClr>
+              </a:outerShdw>
+            </a:effectLst>
+          </p:spPr>
+        </p:pic>
+        <p:pic>
+          <p:nvPicPr>
+            <p:cNvPr id="36" name="Image 35">
+              <a:extLst>
+                <a:ext uri="{FF2B5EF4-FFF2-40B4-BE49-F238E27FC236}">
+                  <a16:creationId xmlns:a16="http://schemas.microsoft.com/office/drawing/2014/main" id="{FAB18140-E76F-CB70-4A97-2CE39ED49838}"/>
+                </a:ext>
+              </a:extLst>
+            </p:cNvPr>
+            <p:cNvPicPr>
+              <a:picLocks noChangeAspect="1"/>
+            </p:cNvPicPr>
+            <p:nvPr/>
+          </p:nvPicPr>
+          <p:blipFill>
+            <a:blip r:embed="rId13"/>
+            <a:stretch>
+              <a:fillRect/>
+            </a:stretch>
+          </p:blipFill>
+          <p:spPr>
+            <a:xfrm>
+              <a:off x="11568429" y="32967354"/>
+              <a:ext cx="3286584" cy="2857899"/>
+            </a:xfrm>
+            <a:prstGeom prst="rect">
+              <a:avLst/>
+            </a:prstGeom>
+            <a:ln>
+              <a:noFill/>
+            </a:ln>
+            <a:effectLst>
+              <a:outerShdw blurRad="292100" dist="139700" dir="2700000" algn="tl" rotWithShape="0">
+                <a:srgbClr val="333333">
+                  <a:alpha val="65000"/>
+                </a:srgbClr>
+              </a:outerShdw>
+            </a:effectLst>
+          </p:spPr>
+        </p:pic>
+      </p:grpSp>
     </p:spTree>
     <p:extLst>
       <p:ext uri="{BB962C8B-B14F-4D97-AF65-F5344CB8AC3E}">

</xml_diff>

<commit_message>
🎨 Improved poster layout
</commit_message>
<xml_diff>
--- a/docs/Poster/Poster.pptx
+++ b/docs/Poster/Poster.pptx
@@ -2981,262 +2981,1972 @@
           <a:chExt cx="0" cy="0"/>
         </a:xfrm>
       </p:grpSpPr>
-      <p:sp>
-        <p:nvSpPr>
-          <p:cNvPr id="5" name="Rectangle : coins arrondis 4">
+      <p:grpSp>
+        <p:nvGrpSpPr>
+          <p:cNvPr id="34" name="Groupe 33">
             <a:extLst>
               <a:ext uri="{FF2B5EF4-FFF2-40B4-BE49-F238E27FC236}">
-                <a16:creationId xmlns:a16="http://schemas.microsoft.com/office/drawing/2014/main" id="{FB511331-6DB4-D732-29C5-1F788BAFE694}"/>
+                <a16:creationId xmlns:a16="http://schemas.microsoft.com/office/drawing/2014/main" id="{6FB9E802-F596-346E-1458-B456949B6967}"/>
               </a:ext>
             </a:extLst>
           </p:cNvPr>
-          <p:cNvSpPr>
-            <a:spLocks/>
-          </p:cNvSpPr>
+          <p:cNvGrpSpPr/>
           <p:nvPr/>
-        </p:nvSpPr>
-        <p:spPr>
+        </p:nvGrpSpPr>
+        <p:grpSpPr>
           <a:xfrm>
-            <a:off x="623629" y="25682742"/>
-            <a:ext cx="10064094" cy="10202409"/>
+            <a:off x="389116" y="9259890"/>
+            <a:ext cx="31567722" cy="28698741"/>
+            <a:chOff x="389116" y="9259890"/>
+            <a:chExt cx="31567722" cy="28698741"/>
           </a:xfrm>
-          <a:prstGeom prst="roundRect">
-            <a:avLst/>
-          </a:prstGeom>
-          <a:solidFill>
-            <a:srgbClr val="E7E1D5"/>
-          </a:solidFill>
-          <a:ln>
-            <a:noFill/>
-          </a:ln>
-        </p:spPr>
-        <p:style>
-          <a:lnRef idx="2">
-            <a:schemeClr val="accent1">
-              <a:shade val="15000"/>
-            </a:schemeClr>
-          </a:lnRef>
-          <a:fillRef idx="1">
-            <a:schemeClr val="accent1"/>
-          </a:fillRef>
-          <a:effectRef idx="0">
-            <a:schemeClr val="accent1"/>
-          </a:effectRef>
-          <a:fontRef idx="minor">
-            <a:schemeClr val="lt1"/>
-          </a:fontRef>
-        </p:style>
-        <p:txBody>
-          <a:bodyPr rtlCol="0" anchor="t"/>
-          <a:lstStyle/>
-          <a:p>
-            <a:pPr marL="0" marR="0" lvl="0" indent="0" algn="ctr" defTabSz="457200" rtl="0" eaLnBrk="1" fontAlgn="auto" latinLnBrk="0" hangingPunct="1">
-              <a:lnSpc>
-                <a:spcPct val="100000"/>
-              </a:lnSpc>
-              <a:spcBef>
-                <a:spcPts val="0"/>
-              </a:spcBef>
-              <a:spcAft>
-                <a:spcPts val="0"/>
-              </a:spcAft>
-              <a:buClrTx/>
-              <a:buSzTx/>
-              <a:buFontTx/>
-              <a:buNone/>
-              <a:tabLst/>
-              <a:defRPr/>
-            </a:pPr>
-            <a:r>
-              <a:rPr kumimoji="0" lang="fr-FR" sz="5000" b="0" i="0" u="none" strike="noStrike" kern="1200" cap="none" spc="0" normalizeH="0" baseline="0" noProof="0" dirty="0" err="1">
+        </p:grpSpPr>
+        <mc:AlternateContent xmlns:mc="http://schemas.openxmlformats.org/markup-compatibility/2006">
+          <mc:Choice xmlns:a14="http://schemas.microsoft.com/office/drawing/2010/main" Requires="a14">
+            <p:sp>
+              <p:nvSpPr>
+                <p:cNvPr id="5" name="Rectangle : coins arrondis 4">
+                  <a:extLst>
+                    <a:ext uri="{FF2B5EF4-FFF2-40B4-BE49-F238E27FC236}">
+                      <a16:creationId xmlns:a16="http://schemas.microsoft.com/office/drawing/2014/main" id="{FB511331-6DB4-D732-29C5-1F788BAFE694}"/>
+                    </a:ext>
+                  </a:extLst>
+                </p:cNvPr>
+                <p:cNvSpPr>
+                  <a:spLocks/>
+                </p:cNvSpPr>
+                <p:nvPr/>
+              </p:nvSpPr>
+              <p:spPr>
+                <a:xfrm>
+                  <a:off x="389116" y="30518100"/>
+                  <a:ext cx="10064094" cy="7352385"/>
+                </a:xfrm>
+                <a:prstGeom prst="roundRect">
+                  <a:avLst>
+                    <a:gd name="adj" fmla="val 13558"/>
+                  </a:avLst>
+                </a:prstGeom>
+                <a:solidFill>
+                  <a:srgbClr val="E7E1D5"/>
+                </a:solidFill>
                 <a:ln>
                   <a:noFill/>
                 </a:ln>
-                <a:solidFill>
-                  <a:srgbClr val="37322F"/>
-                </a:solidFill>
-                <a:effectLst/>
-                <a:uLnTx/>
-                <a:uFillTx/>
-                <a:latin typeface="Gill Sans Nova" panose="020B0602020104020203" pitchFamily="34" charset="0"/>
-                <a:ea typeface="+mn-ea"/>
-                <a:cs typeface="Aharoni" panose="020F0502020204030204" pitchFamily="2" charset="-79"/>
-              </a:rPr>
-              <a:t>Thermo-optic</a:t>
-            </a:r>
-            <a:r>
-              <a:rPr kumimoji="0" lang="fr-FR" sz="5000" b="0" i="0" u="none" strike="noStrike" kern="1200" cap="none" spc="0" normalizeH="0" baseline="0" noProof="0" dirty="0">
+              </p:spPr>
+              <p:style>
+                <a:lnRef idx="2">
+                  <a:schemeClr val="accent1">
+                    <a:shade val="15000"/>
+                  </a:schemeClr>
+                </a:lnRef>
+                <a:fillRef idx="1">
+                  <a:schemeClr val="accent1"/>
+                </a:fillRef>
+                <a:effectRef idx="0">
+                  <a:schemeClr val="accent1"/>
+                </a:effectRef>
+                <a:fontRef idx="minor">
+                  <a:schemeClr val="lt1"/>
+                </a:fontRef>
+              </p:style>
+              <p:txBody>
+                <a:bodyPr rtlCol="0" anchor="t"/>
+                <a:lstStyle/>
+                <a:p>
+                  <a:pPr marL="0" marR="0" lvl="0" indent="0" algn="ctr" defTabSz="457200" rtl="0" eaLnBrk="1" fontAlgn="auto" latinLnBrk="0" hangingPunct="1">
+                    <a:lnSpc>
+                      <a:spcPct val="100000"/>
+                    </a:lnSpc>
+                    <a:spcBef>
+                      <a:spcPts val="0"/>
+                    </a:spcBef>
+                    <a:spcAft>
+                      <a:spcPts val="0"/>
+                    </a:spcAft>
+                    <a:buClrTx/>
+                    <a:buSzTx/>
+                    <a:buFontTx/>
+                    <a:buNone/>
+                    <a:tabLst/>
+                    <a:defRPr/>
+                  </a:pPr>
+                  <a:r>
+                    <a:rPr kumimoji="0" lang="fr-FR" sz="4800" b="0" i="0" u="none" strike="noStrike" kern="1200" cap="none" spc="0" normalizeH="0" baseline="0" noProof="0" dirty="0">
+                      <a:ln>
+                        <a:noFill/>
+                      </a:ln>
+                      <a:solidFill>
+                        <a:srgbClr val="37322F"/>
+                      </a:solidFill>
+                      <a:effectLst/>
+                      <a:uLnTx/>
+                      <a:uFillTx/>
+                      <a:latin typeface="Congenial SemiBold" panose="02000503040000020004" pitchFamily="2" charset="0"/>
+                      <a:cs typeface="Aharoni" panose="020F0502020204030204" pitchFamily="2" charset="-79"/>
+                    </a:rPr>
+                    <a:t>Thermo-optic phase </a:t>
+                  </a:r>
+                  <a:r>
+                    <a:rPr kumimoji="0" lang="fr-FR" sz="4800" b="0" i="0" u="none" strike="noStrike" kern="1200" cap="none" spc="0" normalizeH="0" baseline="0" noProof="0" dirty="0" err="1">
+                      <a:ln>
+                        <a:noFill/>
+                      </a:ln>
+                      <a:solidFill>
+                        <a:srgbClr val="37322F"/>
+                      </a:solidFill>
+                      <a:effectLst/>
+                      <a:uLnTx/>
+                      <a:uFillTx/>
+                      <a:latin typeface="Congenial SemiBold" panose="02000503040000020004" pitchFamily="2" charset="0"/>
+                      <a:cs typeface="Aharoni" panose="020F0502020204030204" pitchFamily="2" charset="-79"/>
+                    </a:rPr>
+                    <a:t>shifter</a:t>
+                  </a:r>
+                  <a:r>
+                    <a:rPr kumimoji="0" lang="fr-FR" sz="4800" b="0" i="0" u="none" strike="noStrike" kern="1200" cap="none" spc="0" normalizeH="0" baseline="0" noProof="0" dirty="0">
+                      <a:ln>
+                        <a:noFill/>
+                      </a:ln>
+                      <a:solidFill>
+                        <a:srgbClr val="37322F"/>
+                      </a:solidFill>
+                      <a:effectLst/>
+                      <a:uLnTx/>
+                      <a:uFillTx/>
+                      <a:latin typeface="Congenial SemiBold" panose="02000503040000020004" pitchFamily="2" charset="0"/>
+                      <a:cs typeface="Aharoni" panose="020F0502020204030204" pitchFamily="2" charset="-79"/>
+                    </a:rPr>
+                    <a:t> 🌡️</a:t>
+                  </a:r>
+                  <a:endParaRPr kumimoji="0" lang="en-US" sz="4800" b="0" i="0" u="none" strike="noStrike" kern="1200" cap="none" spc="0" normalizeH="0" baseline="0" noProof="0" dirty="0">
+                    <a:ln>
+                      <a:noFill/>
+                    </a:ln>
+                    <a:solidFill>
+                      <a:srgbClr val="37322F"/>
+                    </a:solidFill>
+                    <a:effectLst/>
+                    <a:uLnTx/>
+                    <a:uFillTx/>
+                    <a:latin typeface="Congenial SemiBold" panose="02000503040000020004" pitchFamily="2" charset="0"/>
+                    <a:cs typeface="Aharoni" panose="020F0502020204030204" pitchFamily="2" charset="-79"/>
+                  </a:endParaRPr>
+                </a:p>
+                <a:p>
+                  <a:pPr marL="0" marR="0" lvl="0" indent="0" algn="ctr" defTabSz="457200" rtl="0" eaLnBrk="1" fontAlgn="auto" latinLnBrk="0" hangingPunct="1">
+                    <a:lnSpc>
+                      <a:spcPct val="100000"/>
+                    </a:lnSpc>
+                    <a:spcBef>
+                      <a:spcPts val="0"/>
+                    </a:spcBef>
+                    <a:spcAft>
+                      <a:spcPts val="0"/>
+                    </a:spcAft>
+                    <a:buClrTx/>
+                    <a:buSzTx/>
+                    <a:buFontTx/>
+                    <a:buNone/>
+                    <a:tabLst/>
+                    <a:defRPr/>
+                  </a:pPr>
+                  <a:r>
+                    <a:rPr kumimoji="0" lang="en-US" sz="2000" b="0" i="0" u="sng" strike="noStrike" kern="1200" cap="none" spc="0" normalizeH="0" baseline="0" noProof="0" dirty="0">
+                      <a:ln>
+                        <a:noFill/>
+                      </a:ln>
+                      <a:solidFill>
+                        <a:srgbClr val="37322F"/>
+                      </a:solidFill>
+                      <a:effectLst/>
+                      <a:uLnTx/>
+                      <a:uFillTx/>
+                      <a:latin typeface="Gill Sans Nova" panose="020B0602020104020203" pitchFamily="34" charset="0"/>
+                      <a:ea typeface="+mn-ea"/>
+                      <a:cs typeface="Aharoni" panose="020F0502020204030204" pitchFamily="2" charset="-79"/>
+                    </a:rPr>
+                    <a:t> </a:t>
+                  </a:r>
+                </a:p>
+                <a:p>
+                  <a:pPr marL="0" marR="0" lvl="0" indent="0" algn="l" defTabSz="457200" rtl="0" eaLnBrk="1" fontAlgn="auto" latinLnBrk="0" hangingPunct="1">
+                    <a:lnSpc>
+                      <a:spcPct val="100000"/>
+                    </a:lnSpc>
+                    <a:spcBef>
+                      <a:spcPts val="0"/>
+                    </a:spcBef>
+                    <a:spcAft>
+                      <a:spcPts val="0"/>
+                    </a:spcAft>
+                    <a:buClrTx/>
+                    <a:buSzTx/>
+                    <a:buFontTx/>
+                    <a:buNone/>
+                    <a:tabLst/>
+                    <a:defRPr/>
+                  </a:pPr>
+                  <a:r>
+                    <a:rPr lang="fr-FR" sz="3200" dirty="0">
+                      <a:solidFill>
+                        <a:srgbClr val="37322F"/>
+                      </a:solidFill>
+                      <a:latin typeface="Gill Sans Nova" panose="020B0602020104020203" pitchFamily="34" charset="0"/>
+                    </a:rPr>
+                    <a:t>- </a:t>
+                  </a:r>
+                  <a:r>
+                    <a:rPr lang="fr-FR" sz="3200" dirty="0" err="1">
+                      <a:solidFill>
+                        <a:srgbClr val="37322F"/>
+                      </a:solidFill>
+                      <a:latin typeface="Gill Sans Nova" panose="020B0602020104020203" pitchFamily="34" charset="0"/>
+                    </a:rPr>
+                    <a:t>Wavelenght</a:t>
+                  </a:r>
+                  <a:r>
+                    <a:rPr lang="fr-FR" sz="3200" dirty="0">
+                      <a:solidFill>
+                        <a:srgbClr val="37322F"/>
+                      </a:solidFill>
+                      <a:latin typeface="Gill Sans Nova" panose="020B0602020104020203" pitchFamily="34" charset="0"/>
+                    </a:rPr>
+                    <a:t> : </a:t>
+                  </a:r>
+                  <a14:m>
+                    <m:oMath xmlns:m="http://schemas.openxmlformats.org/officeDocument/2006/math">
+                      <m:r>
+                        <a:rPr lang="fr-FR" sz="3200" b="0" i="1" smtClean="0">
+                          <a:solidFill>
+                            <a:srgbClr val="37322F"/>
+                          </a:solidFill>
+                          <a:latin typeface="Cambria Math" panose="02040503050406030204" pitchFamily="18" charset="0"/>
+                        </a:rPr>
+                        <m:t>1</m:t>
+                      </m:r>
+                      <m:r>
+                        <a:rPr lang="fr-FR" sz="3200" b="0" i="1" smtClean="0">
+                          <a:solidFill>
+                            <a:srgbClr val="37322F"/>
+                          </a:solidFill>
+                          <a:latin typeface="Cambria Math" panose="02040503050406030204" pitchFamily="18" charset="0"/>
+                        </a:rPr>
+                        <m:t>.</m:t>
+                      </m:r>
+                      <m:r>
+                        <a:rPr lang="fr-FR" sz="3200" b="0" i="1" smtClean="0">
+                          <a:solidFill>
+                            <a:srgbClr val="37322F"/>
+                          </a:solidFill>
+                          <a:latin typeface="Cambria Math" panose="02040503050406030204" pitchFamily="18" charset="0"/>
+                        </a:rPr>
+                        <m:t>65</m:t>
+                      </m:r>
+                      <m:r>
+                        <a:rPr lang="fr-FR" sz="3200" b="0" i="1" smtClean="0">
+                          <a:solidFill>
+                            <a:srgbClr val="37322F"/>
+                          </a:solidFill>
+                          <a:latin typeface="Cambria Math" panose="02040503050406030204" pitchFamily="18" charset="0"/>
+                        </a:rPr>
+                        <m:t>𝜇</m:t>
+                      </m:r>
+                      <m:r>
+                        <a:rPr lang="fr-FR" sz="3200" b="0" i="1" smtClean="0">
+                          <a:solidFill>
+                            <a:srgbClr val="37322F"/>
+                          </a:solidFill>
+                          <a:latin typeface="Cambria Math" panose="02040503050406030204" pitchFamily="18" charset="0"/>
+                        </a:rPr>
+                        <m:t>𝑚</m:t>
+                      </m:r>
+                    </m:oMath>
+                  </a14:m>
+                  <a:endParaRPr lang="fr-FR" sz="3200" dirty="0">
+                    <a:solidFill>
+                      <a:srgbClr val="37322F"/>
+                    </a:solidFill>
+                    <a:latin typeface="Gill Sans Nova" panose="020B0602020104020203" pitchFamily="34" charset="0"/>
+                  </a:endParaRPr>
+                </a:p>
+                <a:p>
+                  <a:pPr marL="0" marR="0" lvl="0" indent="0" algn="l" defTabSz="457200" rtl="0" eaLnBrk="1" fontAlgn="auto" latinLnBrk="0" hangingPunct="1">
+                    <a:lnSpc>
+                      <a:spcPct val="100000"/>
+                    </a:lnSpc>
+                    <a:spcBef>
+                      <a:spcPts val="0"/>
+                    </a:spcBef>
+                    <a:spcAft>
+                      <a:spcPts val="0"/>
+                    </a:spcAft>
+                    <a:buClrTx/>
+                    <a:buSzTx/>
+                    <a:buFontTx/>
+                    <a:buNone/>
+                    <a:tabLst/>
+                    <a:defRPr/>
+                  </a:pPr>
+                  <a:r>
+                    <a:rPr lang="fr-FR" sz="3200" dirty="0">
+                      <a:solidFill>
+                        <a:srgbClr val="37322F"/>
+                      </a:solidFill>
+                      <a:latin typeface="Gill Sans Nova" panose="020B0602020104020203" pitchFamily="34" charset="0"/>
+                    </a:rPr>
+                    <a:t>- </a:t>
+                  </a:r>
+                  <a:r>
+                    <a:rPr lang="fr-FR" sz="3200" dirty="0" err="1">
+                      <a:solidFill>
+                        <a:srgbClr val="37322F"/>
+                      </a:solidFill>
+                      <a:latin typeface="Gill Sans Nova" panose="020B0602020104020203" pitchFamily="34" charset="0"/>
+                    </a:rPr>
+                    <a:t>Response</a:t>
+                  </a:r>
+                  <a:r>
+                    <a:rPr lang="fr-FR" sz="3200" dirty="0">
+                      <a:solidFill>
+                        <a:srgbClr val="37322F"/>
+                      </a:solidFill>
+                      <a:latin typeface="Gill Sans Nova" panose="020B0602020104020203" pitchFamily="34" charset="0"/>
+                    </a:rPr>
+                    <a:t> time: </a:t>
+                  </a:r>
+                  <a14:m>
+                    <m:oMath xmlns:m="http://schemas.openxmlformats.org/officeDocument/2006/math">
+                      <m:r>
+                        <a:rPr lang="fr-FR" sz="3200" b="0" i="1" smtClean="0">
+                          <a:solidFill>
+                            <a:srgbClr val="37322F"/>
+                          </a:solidFill>
+                          <a:latin typeface="Cambria Math" panose="02040503050406030204" pitchFamily="18" charset="0"/>
+                        </a:rPr>
+                        <m:t>&lt;</m:t>
+                      </m:r>
+                      <m:r>
+                        <a:rPr lang="fr-FR" sz="3200" b="0" i="1" smtClean="0">
+                          <a:solidFill>
+                            <a:srgbClr val="37322F"/>
+                          </a:solidFill>
+                          <a:latin typeface="Cambria Math" panose="02040503050406030204" pitchFamily="18" charset="0"/>
+                        </a:rPr>
+                        <m:t>1</m:t>
+                      </m:r>
+                      <m:r>
+                        <a:rPr lang="fr-FR" sz="3200" b="0" i="1" smtClean="0">
+                          <a:solidFill>
+                            <a:srgbClr val="37322F"/>
+                          </a:solidFill>
+                          <a:latin typeface="Cambria Math" panose="02040503050406030204" pitchFamily="18" charset="0"/>
+                        </a:rPr>
+                        <m:t> </m:t>
+                      </m:r>
+                      <m:r>
+                        <a:rPr lang="fr-FR" sz="3200" b="0" i="1" smtClean="0">
+                          <a:solidFill>
+                            <a:srgbClr val="37322F"/>
+                          </a:solidFill>
+                          <a:latin typeface="Cambria Math" panose="02040503050406030204" pitchFamily="18" charset="0"/>
+                        </a:rPr>
+                        <m:t>𝑚𝑠</m:t>
+                      </m:r>
+                    </m:oMath>
+                  </a14:m>
+                  <a:endParaRPr lang="fr-FR" dirty="0">
+                    <a:solidFill>
+                      <a:srgbClr val="37322F"/>
+                    </a:solidFill>
+                    <a:latin typeface="Aptos" panose="02110004020202020204"/>
+                  </a:endParaRPr>
+                </a:p>
+                <a:p>
+                  <a:pPr marL="0" marR="0" lvl="0" indent="0" algn="l" defTabSz="457200" rtl="0" eaLnBrk="1" fontAlgn="auto" latinLnBrk="0" hangingPunct="1">
+                    <a:lnSpc>
+                      <a:spcPct val="100000"/>
+                    </a:lnSpc>
+                    <a:spcBef>
+                      <a:spcPts val="0"/>
+                    </a:spcBef>
+                    <a:spcAft>
+                      <a:spcPts val="0"/>
+                    </a:spcAft>
+                    <a:buClrTx/>
+                    <a:buSzTx/>
+                    <a:buFontTx/>
+                    <a:buNone/>
+                    <a:tabLst/>
+                    <a:defRPr/>
+                  </a:pPr>
+                  <a:endParaRPr lang="fr-FR" dirty="0">
+                    <a:solidFill>
+                      <a:srgbClr val="37322F"/>
+                    </a:solidFill>
+                    <a:latin typeface="Aptos" panose="02110004020202020204"/>
+                  </a:endParaRPr>
+                </a:p>
+              </p:txBody>
+            </p:sp>
+          </mc:Choice>
+          <mc:Fallback>
+            <p:sp>
+              <p:nvSpPr>
+                <p:cNvPr id="5" name="Rectangle : coins arrondis 4">
+                  <a:extLst>
+                    <a:ext uri="{FF2B5EF4-FFF2-40B4-BE49-F238E27FC236}">
+                      <a16:creationId xmlns:a16="http://schemas.microsoft.com/office/drawing/2014/main" id="{FB511331-6DB4-D732-29C5-1F788BAFE694}"/>
+                    </a:ext>
+                  </a:extLst>
+                </p:cNvPr>
+                <p:cNvSpPr>
+                  <a:spLocks noRot="1" noChangeAspect="1" noMove="1" noResize="1" noEditPoints="1" noAdjustHandles="1" noChangeArrowheads="1" noChangeShapeType="1" noTextEdit="1"/>
+                </p:cNvSpPr>
+                <p:nvPr/>
+              </p:nvSpPr>
+              <p:spPr>
+                <a:xfrm>
+                  <a:off x="389116" y="30518100"/>
+                  <a:ext cx="10064094" cy="7352385"/>
+                </a:xfrm>
+                <a:prstGeom prst="roundRect">
+                  <a:avLst>
+                    <a:gd name="adj" fmla="val 13558"/>
+                  </a:avLst>
+                </a:prstGeom>
+                <a:blipFill>
+                  <a:blip r:embed="rId2"/>
+                  <a:stretch>
+                    <a:fillRect/>
+                  </a:stretch>
+                </a:blipFill>
                 <a:ln>
                   <a:noFill/>
                 </a:ln>
+              </p:spPr>
+              <p:txBody>
+                <a:bodyPr/>
+                <a:lstStyle/>
+                <a:p>
+                  <a:r>
+                    <a:rPr lang="fr-FR">
+                      <a:noFill/>
+                    </a:rPr>
+                    <a:t> </a:t>
+                  </a:r>
+                </a:p>
+              </p:txBody>
+            </p:sp>
+          </mc:Fallback>
+        </mc:AlternateContent>
+        <p:grpSp>
+          <p:nvGrpSpPr>
+            <p:cNvPr id="26" name="Groupe 25">
+              <a:extLst>
+                <a:ext uri="{FF2B5EF4-FFF2-40B4-BE49-F238E27FC236}">
+                  <a16:creationId xmlns:a16="http://schemas.microsoft.com/office/drawing/2014/main" id="{5257546A-9D87-D74C-CA19-37FD84365145}"/>
+                </a:ext>
+              </a:extLst>
+            </p:cNvPr>
+            <p:cNvGrpSpPr/>
+            <p:nvPr/>
+          </p:nvGrpSpPr>
+          <p:grpSpPr>
+            <a:xfrm>
+              <a:off x="442451" y="9259890"/>
+              <a:ext cx="31514387" cy="28698741"/>
+              <a:chOff x="442451" y="9259890"/>
+              <a:chExt cx="31514387" cy="28698741"/>
+            </a:xfrm>
+          </p:grpSpPr>
+          <p:grpSp>
+            <p:nvGrpSpPr>
+              <p:cNvPr id="42" name="Groupe 41">
+                <a:extLst>
+                  <a:ext uri="{FF2B5EF4-FFF2-40B4-BE49-F238E27FC236}">
+                    <a16:creationId xmlns:a16="http://schemas.microsoft.com/office/drawing/2014/main" id="{FB7EB6C8-9905-BBF6-F070-5AE71BB84C47}"/>
+                  </a:ext>
+                </a:extLst>
+              </p:cNvPr>
+              <p:cNvGrpSpPr/>
+              <p:nvPr/>
+            </p:nvGrpSpPr>
+            <p:grpSpPr>
+              <a:xfrm>
+                <a:off x="442451" y="9259890"/>
+                <a:ext cx="31514387" cy="28698741"/>
+                <a:chOff x="442451" y="9259890"/>
+                <a:chExt cx="31514387" cy="28698741"/>
+              </a:xfrm>
+            </p:grpSpPr>
+            <p:grpSp>
+              <p:nvGrpSpPr>
+                <p:cNvPr id="14" name="Groupe 13">
+                  <a:extLst>
+                    <a:ext uri="{FF2B5EF4-FFF2-40B4-BE49-F238E27FC236}">
+                      <a16:creationId xmlns:a16="http://schemas.microsoft.com/office/drawing/2014/main" id="{F7DF72B3-F5B3-DD7A-87CE-4EE6B48CB8A8}"/>
+                    </a:ext>
+                  </a:extLst>
+                </p:cNvPr>
+                <p:cNvGrpSpPr/>
+                <p:nvPr/>
+              </p:nvGrpSpPr>
+              <p:grpSpPr>
+                <a:xfrm>
+                  <a:off x="442451" y="9259890"/>
+                  <a:ext cx="31514387" cy="28698741"/>
+                  <a:chOff x="522107" y="7597170"/>
+                  <a:chExt cx="31514387" cy="28833164"/>
+                </a:xfrm>
+              </p:grpSpPr>
+              <p:grpSp>
+                <p:nvGrpSpPr>
+                  <p:cNvPr id="12" name="Groupe 11">
+                    <a:extLst>
+                      <a:ext uri="{FF2B5EF4-FFF2-40B4-BE49-F238E27FC236}">
+                        <a16:creationId xmlns:a16="http://schemas.microsoft.com/office/drawing/2014/main" id="{BD467FC4-ADDD-6315-F099-137D49B00582}"/>
+                      </a:ext>
+                    </a:extLst>
+                  </p:cNvPr>
+                  <p:cNvGrpSpPr/>
+                  <p:nvPr/>
+                </p:nvGrpSpPr>
+                <p:grpSpPr>
+                  <a:xfrm>
+                    <a:off x="522108" y="7597170"/>
+                    <a:ext cx="31514386" cy="28833164"/>
+                    <a:chOff x="244827" y="7313550"/>
+                    <a:chExt cx="28568459" cy="7097110"/>
+                  </a:xfrm>
+                </p:grpSpPr>
+                <p:sp>
+                  <p:nvSpPr>
+                    <p:cNvPr id="9" name="Rectangle : coins arrondis 8">
+                      <a:extLst>
+                        <a:ext uri="{FF2B5EF4-FFF2-40B4-BE49-F238E27FC236}">
+                          <a16:creationId xmlns:a16="http://schemas.microsoft.com/office/drawing/2014/main" id="{BA75F1BC-D910-19B2-11C1-1AEAE3EBDEB9}"/>
+                        </a:ext>
+                      </a:extLst>
+                    </p:cNvPr>
+                    <p:cNvSpPr>
+                      <a:spLocks/>
+                    </p:cNvSpPr>
+                    <p:nvPr/>
+                  </p:nvSpPr>
+                  <p:spPr>
+                    <a:xfrm>
+                      <a:off x="244827" y="7313550"/>
+                      <a:ext cx="15521137" cy="1185906"/>
+                    </a:xfrm>
+                    <a:prstGeom prst="roundRect">
+                      <a:avLst>
+                        <a:gd name="adj" fmla="val 22626"/>
+                      </a:avLst>
+                    </a:prstGeom>
+                    <a:solidFill>
+                      <a:srgbClr val="E7E1D5"/>
+                    </a:solidFill>
+                    <a:ln>
+                      <a:noFill/>
+                    </a:ln>
+                  </p:spPr>
+                  <p:style>
+                    <a:lnRef idx="2">
+                      <a:schemeClr val="accent1">
+                        <a:shade val="15000"/>
+                      </a:schemeClr>
+                    </a:lnRef>
+                    <a:fillRef idx="1">
+                      <a:schemeClr val="accent1"/>
+                    </a:fillRef>
+                    <a:effectRef idx="0">
+                      <a:schemeClr val="accent1"/>
+                    </a:effectRef>
+                    <a:fontRef idx="minor">
+                      <a:schemeClr val="lt1"/>
+                    </a:fontRef>
+                  </p:style>
+                  <p:txBody>
+                    <a:bodyPr rtlCol="0" anchor="t"/>
+                    <a:lstStyle/>
+                    <a:p>
+                      <a:pPr algn="ctr"/>
+                      <a:r>
+                        <a:rPr lang="fr-FR" sz="4800" dirty="0">
+                          <a:solidFill>
+                            <a:srgbClr val="37322F"/>
+                          </a:solidFill>
+                          <a:latin typeface="Congenial SemiBold" panose="02000503040000020004" pitchFamily="2" charset="0"/>
+                          <a:cs typeface="Aharoni" panose="020F0502020204030204" pitchFamily="2" charset="-79"/>
+                        </a:rPr>
+                        <a:t>In a </a:t>
+                      </a:r>
+                      <a:r>
+                        <a:rPr lang="fr-FR" sz="4800" dirty="0" err="1">
+                          <a:solidFill>
+                            <a:srgbClr val="37322F"/>
+                          </a:solidFill>
+                          <a:latin typeface="Congenial SemiBold" panose="02000503040000020004" pitchFamily="2" charset="0"/>
+                          <a:cs typeface="Aharoni" panose="020F0502020204030204" pitchFamily="2" charset="-79"/>
+                        </a:rPr>
+                        <a:t>nutshell</a:t>
+                      </a:r>
+                      <a:r>
+                        <a:rPr lang="fr-FR" sz="4800" dirty="0">
+                          <a:solidFill>
+                            <a:srgbClr val="37322F"/>
+                          </a:solidFill>
+                          <a:latin typeface="Congenial SemiBold" panose="02000503040000020004" pitchFamily="2" charset="0"/>
+                          <a:cs typeface="Aharoni" panose="020F0502020204030204" pitchFamily="2" charset="-79"/>
+                        </a:rPr>
+                        <a:t> 🥜</a:t>
+                      </a:r>
+                      <a:endParaRPr lang="en-US" sz="4800" dirty="0">
+                        <a:solidFill>
+                          <a:srgbClr val="37322F"/>
+                        </a:solidFill>
+                        <a:latin typeface="Congenial SemiBold" panose="02000503040000020004" pitchFamily="2" charset="0"/>
+                        <a:cs typeface="Aharoni" panose="020F0502020204030204" pitchFamily="2" charset="-79"/>
+                      </a:endParaRPr>
+                    </a:p>
+                    <a:p>
+                      <a:pPr algn="ctr"/>
+                      <a:r>
+                        <a:rPr lang="en-US" sz="2000" u="sng" dirty="0">
+                          <a:solidFill>
+                            <a:srgbClr val="37322F"/>
+                          </a:solidFill>
+                          <a:latin typeface="Gill Sans Nova" panose="020B0602020104020203" pitchFamily="34" charset="0"/>
+                          <a:cs typeface="Aharoni" panose="020F0502020204030204" pitchFamily="2" charset="-79"/>
+                        </a:rPr>
+                        <a:t> </a:t>
+                      </a:r>
+                    </a:p>
+                    <a:p>
+                      <a:r>
+                        <a:rPr lang="en-US" sz="3200" dirty="0">
+                          <a:solidFill>
+                            <a:srgbClr val="37322F"/>
+                          </a:solidFill>
+                          <a:latin typeface="Gill Sans Nova" panose="020B0602020104020203" pitchFamily="34" charset="0"/>
+                          <a:cs typeface="Aharoni" panose="020F0502020204030204" pitchFamily="2" charset="-79"/>
+                        </a:rPr>
+                        <a:t>This thesis aim to enhance nulling interferometry for exoplanet detection using a four-telescope architecture named Kernel-</a:t>
+                      </a:r>
+                      <a:r>
+                        <a:rPr lang="en-US" sz="3200" dirty="0" err="1">
+                          <a:solidFill>
+                            <a:srgbClr val="37322F"/>
+                          </a:solidFill>
+                          <a:latin typeface="Gill Sans Nova" panose="020B0602020104020203" pitchFamily="34" charset="0"/>
+                          <a:cs typeface="Aharoni" panose="020F0502020204030204" pitchFamily="2" charset="-79"/>
+                        </a:rPr>
+                        <a:t>Nuller</a:t>
+                      </a:r>
+                      <a:r>
+                        <a:rPr lang="en-US" sz="3200" dirty="0">
+                          <a:solidFill>
+                            <a:srgbClr val="37322F"/>
+                          </a:solidFill>
+                          <a:latin typeface="Gill Sans Nova" panose="020B0602020104020203" pitchFamily="34" charset="0"/>
+                          <a:cs typeface="Aharoni" panose="020F0502020204030204" pitchFamily="2" charset="-79"/>
+                        </a:rPr>
+                        <a:t>. By integrating 14 active phase shifters, it aims to mitigate phase aberrations caused by manufacturing defects. An algorithm is developed to optimize device performance, validated through simulations and lab experiments. A second phase consist in analyzing intensity distributions produced by Kernel-</a:t>
+                      </a:r>
+                      <a:r>
+                        <a:rPr lang="en-US" sz="3200" dirty="0" err="1">
+                          <a:solidFill>
+                            <a:srgbClr val="37322F"/>
+                          </a:solidFill>
+                          <a:latin typeface="Gill Sans Nova" panose="020B0602020104020203" pitchFamily="34" charset="0"/>
+                          <a:cs typeface="Aharoni" panose="020F0502020204030204" pitchFamily="2" charset="-79"/>
+                        </a:rPr>
+                        <a:t>Nuller</a:t>
+                      </a:r>
+                      <a:r>
+                        <a:rPr lang="en-US" sz="3200" dirty="0">
+                          <a:solidFill>
+                            <a:srgbClr val="37322F"/>
+                          </a:solidFill>
+                          <a:latin typeface="Gill Sans Nova" panose="020B0602020104020203" pitchFamily="34" charset="0"/>
+                          <a:cs typeface="Aharoni" panose="020F0502020204030204" pitchFamily="2" charset="-79"/>
+                        </a:rPr>
+                        <a:t> and applying statistical tests and machine learning to extract science information. This poster present the preliminary results.</a:t>
+                      </a:r>
+                      <a:endParaRPr lang="fr-FR" sz="3200" dirty="0">
+                        <a:solidFill>
+                          <a:srgbClr val="37322F"/>
+                        </a:solidFill>
+                        <a:latin typeface="Gill Sans Nova" panose="020B0602020104020203" pitchFamily="34" charset="0"/>
+                        <a:cs typeface="Aharoni" panose="020F0502020204030204" pitchFamily="2" charset="-79"/>
+                      </a:endParaRPr>
+                    </a:p>
+                  </p:txBody>
+                </p:sp>
+                <p:sp>
+                  <p:nvSpPr>
+                    <p:cNvPr id="10" name="Rectangle : coins arrondis 9">
+                      <a:extLst>
+                        <a:ext uri="{FF2B5EF4-FFF2-40B4-BE49-F238E27FC236}">
+                          <a16:creationId xmlns:a16="http://schemas.microsoft.com/office/drawing/2014/main" id="{FD7A54F2-9565-2EC1-1F7D-D3CDECC83C71}"/>
+                        </a:ext>
+                      </a:extLst>
+                    </p:cNvPr>
+                    <p:cNvSpPr>
+                      <a:spLocks/>
+                    </p:cNvSpPr>
+                    <p:nvPr/>
+                  </p:nvSpPr>
+                  <p:spPr>
+                    <a:xfrm>
+                      <a:off x="9885722" y="11481227"/>
+                      <a:ext cx="9363479" cy="2929433"/>
+                    </a:xfrm>
+                    <a:prstGeom prst="roundRect">
+                      <a:avLst>
+                        <a:gd name="adj" fmla="val 11134"/>
+                      </a:avLst>
+                    </a:prstGeom>
+                    <a:solidFill>
+                      <a:srgbClr val="E7E1D5"/>
+                    </a:solidFill>
+                    <a:ln>
+                      <a:noFill/>
+                    </a:ln>
+                  </p:spPr>
+                  <p:style>
+                    <a:lnRef idx="2">
+                      <a:schemeClr val="accent1">
+                        <a:shade val="15000"/>
+                      </a:schemeClr>
+                    </a:lnRef>
+                    <a:fillRef idx="1">
+                      <a:schemeClr val="accent1"/>
+                    </a:fillRef>
+                    <a:effectRef idx="0">
+                      <a:schemeClr val="accent1"/>
+                    </a:effectRef>
+                    <a:fontRef idx="minor">
+                      <a:schemeClr val="lt1"/>
+                    </a:fontRef>
+                  </p:style>
+                  <p:txBody>
+                    <a:bodyPr rtlCol="0" anchor="t"/>
+                    <a:lstStyle/>
+                    <a:p>
+                      <a:pPr algn="ctr"/>
+                      <a:r>
+                        <a:rPr lang="fr-FR" sz="4800" dirty="0">
+                          <a:solidFill>
+                            <a:srgbClr val="37322F"/>
+                          </a:solidFill>
+                          <a:latin typeface="Congenial SemiBold" panose="02000503040000020004" pitchFamily="2" charset="0"/>
+                          <a:cs typeface="Aharoni" panose="020F0502020204030204" pitchFamily="2" charset="-79"/>
+                        </a:rPr>
+                        <a:t>Calibration algorithme </a:t>
+                      </a:r>
+                      <a:r>
+                        <a:rPr lang="fr-FR" sz="4800" dirty="0">
+                          <a:solidFill>
+                            <a:srgbClr val="37322F"/>
+                          </a:solidFill>
+                          <a:latin typeface="Gill Sans Nova" panose="020B0602020104020203" pitchFamily="34" charset="0"/>
+                          <a:cs typeface="Aharoni" panose="020F0502020204030204" pitchFamily="2" charset="-79"/>
+                        </a:rPr>
+                        <a:t>🗜️</a:t>
+                      </a:r>
+                      <a:endParaRPr lang="en-US" sz="4800" dirty="0">
+                        <a:solidFill>
+                          <a:srgbClr val="37322F"/>
+                        </a:solidFill>
+                        <a:latin typeface="Gill Sans Nova" panose="020B0602020104020203" pitchFamily="34" charset="0"/>
+                        <a:cs typeface="Aharoni" panose="020F0502020204030204" pitchFamily="2" charset="-79"/>
+                      </a:endParaRPr>
+                    </a:p>
+                    <a:p>
+                      <a:pPr algn="ctr"/>
+                      <a:r>
+                        <a:rPr lang="en-US" sz="2000" u="sng" dirty="0">
+                          <a:solidFill>
+                            <a:srgbClr val="37322F"/>
+                          </a:solidFill>
+                          <a:latin typeface="Gill Sans Nova" panose="020B0602020104020203" pitchFamily="34" charset="0"/>
+                          <a:cs typeface="Aharoni" panose="020F0502020204030204" pitchFamily="2" charset="-79"/>
+                        </a:rPr>
+                        <a:t> </a:t>
+                      </a:r>
+                    </a:p>
+                    <a:p>
+                      <a:pPr marL="457200" indent="-457200">
+                        <a:buFontTx/>
+                        <a:buChar char="-"/>
+                      </a:pPr>
+                      <a:r>
+                        <a:rPr lang="fr-FR" sz="3200" dirty="0">
+                          <a:solidFill>
+                            <a:srgbClr val="37322F"/>
+                          </a:solidFill>
+                          <a:latin typeface="Gill Sans Nova" panose="020B0602020104020203" pitchFamily="34" charset="0"/>
+                        </a:rPr>
+                        <a:t>Method</a:t>
+                      </a:r>
+                    </a:p>
+                    <a:p>
+                      <a:pPr marL="457200" indent="-457200">
+                        <a:buFontTx/>
+                        <a:buChar char="-"/>
+                      </a:pPr>
+                      <a:r>
+                        <a:rPr lang="fr-FR" sz="3200" dirty="0" err="1">
+                          <a:solidFill>
+                            <a:srgbClr val="37322F"/>
+                          </a:solidFill>
+                          <a:latin typeface="Gill Sans Nova" panose="020B0602020104020203" pitchFamily="34" charset="0"/>
+                        </a:rPr>
+                        <a:t>Metrics</a:t>
+                      </a:r>
+                      <a:endParaRPr lang="fr-FR" sz="3200" dirty="0">
+                        <a:solidFill>
+                          <a:srgbClr val="37322F"/>
+                        </a:solidFill>
+                        <a:latin typeface="Gill Sans Nova" panose="020B0602020104020203" pitchFamily="34" charset="0"/>
+                      </a:endParaRPr>
+                    </a:p>
+                    <a:p>
+                      <a:pPr marL="457200" indent="-457200">
+                        <a:buFontTx/>
+                        <a:buChar char="-"/>
+                      </a:pPr>
+                      <a:r>
+                        <a:rPr lang="fr-FR" sz="3200" dirty="0">
+                          <a:solidFill>
+                            <a:srgbClr val="37322F"/>
+                          </a:solidFill>
+                          <a:latin typeface="Gill Sans Nova" panose="020B0602020104020203" pitchFamily="34" charset="0"/>
+                        </a:rPr>
+                        <a:t>Convergence speed</a:t>
+                      </a:r>
+                    </a:p>
+                    <a:p>
+                      <a:pPr marL="457200" indent="-457200">
+                        <a:buFontTx/>
+                        <a:buChar char="-"/>
+                      </a:pPr>
+                      <a:r>
+                        <a:rPr lang="fr-FR" sz="3200" dirty="0">
+                          <a:solidFill>
+                            <a:srgbClr val="37322F"/>
+                          </a:solidFill>
+                          <a:latin typeface="Gill Sans Nova" panose="020B0602020104020203" pitchFamily="34" charset="0"/>
+                        </a:rPr>
+                        <a:t>Limitations</a:t>
+                      </a:r>
+                    </a:p>
+                    <a:p>
+                      <a:pPr marL="457200" indent="-457200">
+                        <a:buFontTx/>
+                        <a:buChar char="-"/>
+                      </a:pPr>
+                      <a:endParaRPr lang="fr-FR" sz="3200" dirty="0">
+                        <a:solidFill>
+                          <a:srgbClr val="37322F"/>
+                        </a:solidFill>
+                        <a:latin typeface="Gill Sans Nova" panose="020B0602020104020203" pitchFamily="34" charset="0"/>
+                      </a:endParaRPr>
+                    </a:p>
+                  </p:txBody>
+                </p:sp>
+                <p:sp>
+                  <p:nvSpPr>
+                    <p:cNvPr id="11" name="Rectangle : coins arrondis 10">
+                      <a:extLst>
+                        <a:ext uri="{FF2B5EF4-FFF2-40B4-BE49-F238E27FC236}">
+                          <a16:creationId xmlns:a16="http://schemas.microsoft.com/office/drawing/2014/main" id="{395632F7-D70E-F64F-2ABF-901D8A78EC81}"/>
+                        </a:ext>
+                      </a:extLst>
+                    </p:cNvPr>
+                    <p:cNvSpPr>
+                      <a:spLocks/>
+                    </p:cNvSpPr>
+                    <p:nvPr/>
+                  </p:nvSpPr>
+                  <p:spPr>
+                    <a:xfrm>
+                      <a:off x="19689971" y="8632438"/>
+                      <a:ext cx="9123315" cy="3938202"/>
+                    </a:xfrm>
+                    <a:prstGeom prst="roundRect">
+                      <a:avLst>
+                        <a:gd name="adj" fmla="val 10421"/>
+                      </a:avLst>
+                    </a:prstGeom>
+                    <a:solidFill>
+                      <a:srgbClr val="E7E1D5"/>
+                    </a:solidFill>
+                    <a:ln>
+                      <a:noFill/>
+                    </a:ln>
+                  </p:spPr>
+                  <p:style>
+                    <a:lnRef idx="2">
+                      <a:schemeClr val="accent1">
+                        <a:shade val="15000"/>
+                      </a:schemeClr>
+                    </a:lnRef>
+                    <a:fillRef idx="1">
+                      <a:schemeClr val="accent1"/>
+                    </a:fillRef>
+                    <a:effectRef idx="0">
+                      <a:schemeClr val="accent1"/>
+                    </a:effectRef>
+                    <a:fontRef idx="minor">
+                      <a:schemeClr val="lt1"/>
+                    </a:fontRef>
+                  </p:style>
+                  <p:txBody>
+                    <a:bodyPr rtlCol="0" anchor="t"/>
+                    <a:lstStyle/>
+                    <a:p>
+                      <a:pPr marL="0" marR="0" lvl="0" indent="0" algn="ctr" defTabSz="457200" rtl="0" eaLnBrk="1" fontAlgn="auto" latinLnBrk="0" hangingPunct="1">
+                        <a:lnSpc>
+                          <a:spcPct val="100000"/>
+                        </a:lnSpc>
+                        <a:spcBef>
+                          <a:spcPts val="0"/>
+                        </a:spcBef>
+                        <a:spcAft>
+                          <a:spcPts val="0"/>
+                        </a:spcAft>
+                        <a:buClrTx/>
+                        <a:buSzTx/>
+                        <a:buFontTx/>
+                        <a:buNone/>
+                        <a:tabLst/>
+                        <a:defRPr/>
+                      </a:pPr>
+                      <a:r>
+                        <a:rPr kumimoji="0" lang="fr-FR" sz="4800" b="0" i="0" u="none" strike="noStrike" kern="1200" cap="none" spc="0" normalizeH="0" baseline="0" noProof="0" dirty="0" err="1">
+                          <a:ln>
+                            <a:noFill/>
+                          </a:ln>
+                          <a:solidFill>
+                            <a:srgbClr val="37322F"/>
+                          </a:solidFill>
+                          <a:effectLst/>
+                          <a:uLnTx/>
+                          <a:uFillTx/>
+                          <a:latin typeface="Congenial SemiBold" panose="02000503040000020004" pitchFamily="2" charset="0"/>
+                          <a:cs typeface="Aharoni" panose="020F0502020204030204" pitchFamily="2" charset="-79"/>
+                        </a:rPr>
+                        <a:t>Statistical</a:t>
+                      </a:r>
+                      <a:r>
+                        <a:rPr lang="fr-FR" sz="4800" dirty="0">
+                          <a:solidFill>
+                            <a:srgbClr val="37322F"/>
+                          </a:solidFill>
+                          <a:latin typeface="Congenial SemiBold" panose="02000503040000020004" pitchFamily="2" charset="0"/>
+                          <a:cs typeface="Aharoni" panose="020F0502020204030204" pitchFamily="2" charset="-79"/>
+                        </a:rPr>
+                        <a:t> </a:t>
+                      </a:r>
+                      <a:r>
+                        <a:rPr lang="fr-FR" sz="4800" dirty="0" err="1">
+                          <a:solidFill>
+                            <a:srgbClr val="37322F"/>
+                          </a:solidFill>
+                          <a:latin typeface="Congenial SemiBold" panose="02000503040000020004" pitchFamily="2" charset="0"/>
+                          <a:cs typeface="Aharoni" panose="020F0502020204030204" pitchFamily="2" charset="-79"/>
+                        </a:rPr>
+                        <a:t>analysis</a:t>
+                      </a:r>
+                      <a:r>
+                        <a:rPr lang="fr-FR" sz="4800" dirty="0">
+                          <a:solidFill>
+                            <a:srgbClr val="37322F"/>
+                          </a:solidFill>
+                          <a:latin typeface="Congenial SemiBold" panose="02000503040000020004" pitchFamily="2" charset="0"/>
+                          <a:cs typeface="Aharoni" panose="020F0502020204030204" pitchFamily="2" charset="-79"/>
+                        </a:rPr>
+                        <a:t> 📊</a:t>
+                      </a:r>
+                      <a:endParaRPr kumimoji="0" lang="en-US" sz="4800" b="0" i="0" u="none" strike="noStrike" kern="1200" cap="none" spc="0" normalizeH="0" baseline="0" noProof="0" dirty="0">
+                        <a:ln>
+                          <a:noFill/>
+                        </a:ln>
+                        <a:solidFill>
+                          <a:srgbClr val="37322F"/>
+                        </a:solidFill>
+                        <a:effectLst/>
+                        <a:uLnTx/>
+                        <a:uFillTx/>
+                        <a:latin typeface="Congenial SemiBold" panose="02000503040000020004" pitchFamily="2" charset="0"/>
+                        <a:cs typeface="Aharoni" panose="020F0502020204030204" pitchFamily="2" charset="-79"/>
+                      </a:endParaRPr>
+                    </a:p>
+                    <a:p>
+                      <a:pPr marL="0" marR="0" lvl="0" indent="0" algn="ctr" defTabSz="457200" rtl="0" eaLnBrk="1" fontAlgn="auto" latinLnBrk="0" hangingPunct="1">
+                        <a:lnSpc>
+                          <a:spcPct val="100000"/>
+                        </a:lnSpc>
+                        <a:spcBef>
+                          <a:spcPts val="0"/>
+                        </a:spcBef>
+                        <a:spcAft>
+                          <a:spcPts val="0"/>
+                        </a:spcAft>
+                        <a:buClrTx/>
+                        <a:buSzTx/>
+                        <a:buFontTx/>
+                        <a:buNone/>
+                        <a:tabLst/>
+                        <a:defRPr/>
+                      </a:pPr>
+                      <a:r>
+                        <a:rPr kumimoji="0" lang="en-US" sz="2000" b="0" i="0" u="sng" strike="noStrike" kern="1200" cap="none" spc="0" normalizeH="0" baseline="0" noProof="0" dirty="0">
+                          <a:ln>
+                            <a:noFill/>
+                          </a:ln>
+                          <a:solidFill>
+                            <a:srgbClr val="37322F"/>
+                          </a:solidFill>
+                          <a:effectLst/>
+                          <a:uLnTx/>
+                          <a:uFillTx/>
+                          <a:latin typeface="Gill Sans Nova" panose="020B0602020104020203" pitchFamily="34" charset="0"/>
+                          <a:ea typeface="+mn-ea"/>
+                          <a:cs typeface="Aharoni" panose="020F0502020204030204" pitchFamily="2" charset="-79"/>
+                        </a:rPr>
+                        <a:t> </a:t>
+                      </a:r>
+                    </a:p>
+                    <a:p>
+                      <a:pPr marL="457200" marR="0" lvl="0" indent="-457200" algn="l" defTabSz="457200" rtl="0" eaLnBrk="1" fontAlgn="auto" latinLnBrk="0" hangingPunct="1">
+                        <a:lnSpc>
+                          <a:spcPct val="100000"/>
+                        </a:lnSpc>
+                        <a:spcBef>
+                          <a:spcPts val="0"/>
+                        </a:spcBef>
+                        <a:spcAft>
+                          <a:spcPts val="0"/>
+                        </a:spcAft>
+                        <a:buClrTx/>
+                        <a:buSzTx/>
+                        <a:buFontTx/>
+                        <a:buChar char="-"/>
+                        <a:tabLst/>
+                        <a:defRPr/>
+                      </a:pPr>
+                      <a:r>
+                        <a:rPr kumimoji="0" lang="fr-FR" sz="3200" b="0" i="0" u="none" strike="noStrike" kern="1200" cap="none" spc="0" normalizeH="0" baseline="0" noProof="0" dirty="0">
+                          <a:ln>
+                            <a:noFill/>
+                          </a:ln>
+                          <a:solidFill>
+                            <a:srgbClr val="37322F"/>
+                          </a:solidFill>
+                          <a:effectLst/>
+                          <a:uLnTx/>
+                          <a:uFillTx/>
+                          <a:latin typeface="Gill Sans Nova" panose="020B0602020104020203" pitchFamily="34" charset="0"/>
+                          <a:ea typeface="+mn-ea"/>
+                          <a:cs typeface="+mn-cs"/>
+                        </a:rPr>
+                        <a:t>Kernel outputs</a:t>
+                      </a:r>
+                    </a:p>
+                    <a:p>
+                      <a:pPr marL="457200" marR="0" lvl="0" indent="-457200" algn="l" defTabSz="457200" rtl="0" eaLnBrk="1" fontAlgn="auto" latinLnBrk="0" hangingPunct="1">
+                        <a:lnSpc>
+                          <a:spcPct val="100000"/>
+                        </a:lnSpc>
+                        <a:spcBef>
+                          <a:spcPts val="0"/>
+                        </a:spcBef>
+                        <a:spcAft>
+                          <a:spcPts val="0"/>
+                        </a:spcAft>
+                        <a:buClrTx/>
+                        <a:buSzTx/>
+                        <a:buFontTx/>
+                        <a:buChar char="-"/>
+                        <a:tabLst/>
+                        <a:defRPr/>
+                      </a:pPr>
+                      <a:r>
+                        <a:rPr lang="fr-FR" sz="3200" dirty="0">
+                          <a:solidFill>
+                            <a:srgbClr val="37322F"/>
+                          </a:solidFill>
+                          <a:latin typeface="Gill Sans Nova" panose="020B0602020104020203" pitchFamily="34" charset="0"/>
+                        </a:rPr>
+                        <a:t>Distributions</a:t>
+                      </a:r>
+                    </a:p>
+                    <a:p>
+                      <a:pPr marL="457200" marR="0" lvl="0" indent="-457200" algn="l" defTabSz="457200" rtl="0" eaLnBrk="1" fontAlgn="auto" latinLnBrk="0" hangingPunct="1">
+                        <a:lnSpc>
+                          <a:spcPct val="100000"/>
+                        </a:lnSpc>
+                        <a:spcBef>
+                          <a:spcPts val="0"/>
+                        </a:spcBef>
+                        <a:spcAft>
+                          <a:spcPts val="0"/>
+                        </a:spcAft>
+                        <a:buClrTx/>
+                        <a:buSzTx/>
+                        <a:buFontTx/>
+                        <a:buChar char="-"/>
+                        <a:tabLst/>
+                        <a:defRPr/>
+                      </a:pPr>
+                      <a:r>
+                        <a:rPr kumimoji="0" lang="fr-FR" sz="3200" b="0" i="0" u="none" strike="noStrike" kern="1200" cap="none" spc="0" normalizeH="0" baseline="0" noProof="0" dirty="0">
+                          <a:ln>
+                            <a:noFill/>
+                          </a:ln>
+                          <a:solidFill>
+                            <a:srgbClr val="37322F"/>
+                          </a:solidFill>
+                          <a:effectLst/>
+                          <a:uLnTx/>
+                          <a:uFillTx/>
+                          <a:latin typeface="Gill Sans Nova" panose="020B0602020104020203" pitchFamily="34" charset="0"/>
+                          <a:ea typeface="+mn-ea"/>
+                          <a:cs typeface="+mn-cs"/>
+                        </a:rPr>
+                        <a:t>Estimation of the </a:t>
+                      </a:r>
+                      <a:r>
+                        <a:rPr kumimoji="0" lang="fr-FR" sz="3200" b="0" i="0" u="none" strike="noStrike" kern="1200" cap="none" spc="0" normalizeH="0" baseline="0" noProof="0" dirty="0" err="1">
+                          <a:ln>
+                            <a:noFill/>
+                          </a:ln>
+                          <a:solidFill>
+                            <a:srgbClr val="37322F"/>
+                          </a:solidFill>
+                          <a:effectLst/>
+                          <a:uLnTx/>
+                          <a:uFillTx/>
+                          <a:latin typeface="Gill Sans Nova" panose="020B0602020104020203" pitchFamily="34" charset="0"/>
+                          <a:ea typeface="+mn-ea"/>
+                          <a:cs typeface="+mn-cs"/>
+                        </a:rPr>
+                        <a:t>true</a:t>
+                      </a:r>
+                      <a:r>
+                        <a:rPr kumimoji="0" lang="fr-FR" sz="3200" b="0" i="0" u="none" strike="noStrike" kern="1200" cap="none" spc="0" normalizeH="0" baseline="0" noProof="0" dirty="0">
+                          <a:ln>
+                            <a:noFill/>
+                          </a:ln>
+                          <a:solidFill>
+                            <a:srgbClr val="37322F"/>
+                          </a:solidFill>
+                          <a:effectLst/>
+                          <a:uLnTx/>
+                          <a:uFillTx/>
+                          <a:latin typeface="Gill Sans Nova" panose="020B0602020104020203" pitchFamily="34" charset="0"/>
+                          <a:ea typeface="+mn-ea"/>
+                          <a:cs typeface="+mn-cs"/>
+                        </a:rPr>
+                        <a:t> value</a:t>
+                      </a:r>
+                    </a:p>
+                    <a:p>
+                      <a:pPr algn="ctr"/>
+                      <a:endParaRPr lang="fr-FR" dirty="0">
+                        <a:solidFill>
+                          <a:srgbClr val="37322F"/>
+                        </a:solidFill>
+                      </a:endParaRPr>
+                    </a:p>
+                  </p:txBody>
+                </p:sp>
+              </p:grpSp>
+              <p:sp>
+                <p:nvSpPr>
+                  <p:cNvPr id="13" name="Rectangle : coins arrondis 12">
+                    <a:extLst>
+                      <a:ext uri="{FF2B5EF4-FFF2-40B4-BE49-F238E27FC236}">
+                        <a16:creationId xmlns:a16="http://schemas.microsoft.com/office/drawing/2014/main" id="{B059752F-38D7-9C85-94E8-6DE3EEBE5976}"/>
+                      </a:ext>
+                    </a:extLst>
+                  </p:cNvPr>
+                  <p:cNvSpPr>
+                    <a:spLocks/>
+                  </p:cNvSpPr>
+                  <p:nvPr/>
+                </p:nvSpPr>
+                <p:spPr>
+                  <a:xfrm>
+                    <a:off x="522107" y="12955368"/>
+                    <a:ext cx="10064094" cy="15459321"/>
+                  </a:xfrm>
+                  <a:prstGeom prst="roundRect">
+                    <a:avLst>
+                      <a:gd name="adj" fmla="val 10988"/>
+                    </a:avLst>
+                  </a:prstGeom>
+                  <a:solidFill>
+                    <a:srgbClr val="E7E1D5"/>
+                  </a:solidFill>
+                  <a:ln>
+                    <a:noFill/>
+                  </a:ln>
+                </p:spPr>
+                <p:style>
+                  <a:lnRef idx="2">
+                    <a:schemeClr val="accent1">
+                      <a:shade val="15000"/>
+                    </a:schemeClr>
+                  </a:lnRef>
+                  <a:fillRef idx="1">
+                    <a:schemeClr val="accent1"/>
+                  </a:fillRef>
+                  <a:effectRef idx="0">
+                    <a:schemeClr val="accent1"/>
+                  </a:effectRef>
+                  <a:fontRef idx="minor">
+                    <a:schemeClr val="lt1"/>
+                  </a:fontRef>
+                </p:style>
+                <p:txBody>
+                  <a:bodyPr rtlCol="0" anchor="t"/>
+                  <a:lstStyle/>
+                  <a:p>
+                    <a:pPr marL="0" marR="0" lvl="0" indent="0" algn="ctr" defTabSz="457200" rtl="0" eaLnBrk="1" fontAlgn="auto" latinLnBrk="0" hangingPunct="1">
+                      <a:lnSpc>
+                        <a:spcPct val="100000"/>
+                      </a:lnSpc>
+                      <a:spcBef>
+                        <a:spcPts val="0"/>
+                      </a:spcBef>
+                      <a:spcAft>
+                        <a:spcPts val="0"/>
+                      </a:spcAft>
+                      <a:buClrTx/>
+                      <a:buSzTx/>
+                      <a:buFontTx/>
+                      <a:buNone/>
+                      <a:tabLst/>
+                      <a:defRPr/>
+                    </a:pPr>
+                    <a:r>
+                      <a:rPr kumimoji="0" lang="en-US" sz="4800" b="0" i="0" u="none" strike="noStrike" kern="1200" cap="none" spc="0" normalizeH="0" baseline="0" noProof="0" dirty="0" err="1">
+                        <a:ln>
+                          <a:noFill/>
+                        </a:ln>
+                        <a:solidFill>
+                          <a:srgbClr val="37322F"/>
+                        </a:solidFill>
+                        <a:effectLst/>
+                        <a:uLnTx/>
+                        <a:uFillTx/>
+                        <a:latin typeface="Congenial SemiBold" panose="02000503040000020004" pitchFamily="2" charset="0"/>
+                        <a:cs typeface="Aharoni" panose="020F0502020204030204" pitchFamily="2" charset="-79"/>
+                      </a:rPr>
+                      <a:t>Nullin</a:t>
+                    </a:r>
+                    <a:r>
+                      <a:rPr lang="en-US" sz="4800" dirty="0">
+                        <a:solidFill>
+                          <a:srgbClr val="37322F"/>
+                        </a:solidFill>
+                        <a:latin typeface="Congenial SemiBold" panose="02000503040000020004" pitchFamily="2" charset="0"/>
+                        <a:cs typeface="Aharoni" panose="020F0502020204030204" pitchFamily="2" charset="-79"/>
+                      </a:rPr>
+                      <a:t>g interferometry </a:t>
+                    </a:r>
+                    <a:r>
+                      <a:rPr lang="fr-FR" sz="4800" dirty="0">
+                        <a:solidFill>
+                          <a:srgbClr val="37322F"/>
+                        </a:solidFill>
+                        <a:latin typeface="Gill Sans Nova" panose="020B0602020104020203" pitchFamily="34" charset="0"/>
+                        <a:cs typeface="Aharoni" panose="020F0502020204030204" pitchFamily="2" charset="-79"/>
+                      </a:rPr>
+                      <a:t>〰️</a:t>
+                    </a:r>
+                    <a:br>
+                      <a:rPr lang="fr-FR" sz="4800" dirty="0">
+                        <a:solidFill>
+                          <a:srgbClr val="37322F"/>
+                        </a:solidFill>
+                        <a:latin typeface="Gill Sans Nova" panose="020B0602020104020203" pitchFamily="34" charset="0"/>
+                        <a:cs typeface="Aharoni" panose="020F0502020204030204" pitchFamily="2" charset="-79"/>
+                      </a:rPr>
+                    </a:br>
+                    <a:r>
+                      <a:rPr lang="fr-FR" sz="3200" dirty="0">
+                        <a:solidFill>
+                          <a:srgbClr val="37322F"/>
+                        </a:solidFill>
+                        <a:latin typeface="Congenial SemiBold" panose="02000503040000020004" pitchFamily="2" charset="0"/>
+                        <a:cs typeface="Aharoni" panose="020F0502020204030204" pitchFamily="2" charset="-79"/>
+                      </a:rPr>
+                      <a:t>On the VLTI</a:t>
+                    </a:r>
+                    <a:endParaRPr kumimoji="0" lang="en-US" sz="3200" b="0" i="0" u="none" strike="noStrike" kern="1200" cap="none" spc="0" normalizeH="0" baseline="0" noProof="0" dirty="0">
+                      <a:ln>
+                        <a:noFill/>
+                      </a:ln>
+                      <a:solidFill>
+                        <a:srgbClr val="37322F"/>
+                      </a:solidFill>
+                      <a:effectLst/>
+                      <a:uLnTx/>
+                      <a:uFillTx/>
+                      <a:latin typeface="Congenial SemiBold" panose="02000503040000020004" pitchFamily="2" charset="0"/>
+                      <a:cs typeface="Aharoni" panose="020F0502020204030204" pitchFamily="2" charset="-79"/>
+                    </a:endParaRPr>
+                  </a:p>
+                  <a:p>
+                    <a:pPr marL="0" marR="0" lvl="0" indent="0" algn="ctr" defTabSz="457200" rtl="0" eaLnBrk="1" fontAlgn="auto" latinLnBrk="0" hangingPunct="1">
+                      <a:lnSpc>
+                        <a:spcPct val="100000"/>
+                      </a:lnSpc>
+                      <a:spcBef>
+                        <a:spcPts val="0"/>
+                      </a:spcBef>
+                      <a:spcAft>
+                        <a:spcPts val="0"/>
+                      </a:spcAft>
+                      <a:buClrTx/>
+                      <a:buSzTx/>
+                      <a:buFontTx/>
+                      <a:buNone/>
+                      <a:tabLst/>
+                      <a:defRPr/>
+                    </a:pPr>
+                    <a:r>
+                      <a:rPr kumimoji="0" lang="en-US" sz="2000" b="0" i="0" u="sng" strike="noStrike" kern="1200" cap="none" spc="0" normalizeH="0" baseline="0" noProof="0" dirty="0">
+                        <a:ln>
+                          <a:noFill/>
+                        </a:ln>
+                        <a:solidFill>
+                          <a:srgbClr val="37322F"/>
+                        </a:solidFill>
+                        <a:effectLst/>
+                        <a:uLnTx/>
+                        <a:uFillTx/>
+                        <a:latin typeface="Gill Sans Nova" panose="020B0602020104020203" pitchFamily="34" charset="0"/>
+                        <a:ea typeface="+mn-ea"/>
+                        <a:cs typeface="Aharoni" panose="020F0502020204030204" pitchFamily="2" charset="-79"/>
+                      </a:rPr>
+                      <a:t> </a:t>
+                    </a:r>
+                  </a:p>
+                  <a:p>
+                    <a:pPr marL="0" marR="0" lvl="0" indent="0" algn="l" defTabSz="457200" rtl="0" eaLnBrk="1" fontAlgn="auto" latinLnBrk="0" hangingPunct="1">
+                      <a:lnSpc>
+                        <a:spcPct val="100000"/>
+                      </a:lnSpc>
+                      <a:spcBef>
+                        <a:spcPts val="0"/>
+                      </a:spcBef>
+                      <a:spcAft>
+                        <a:spcPts val="0"/>
+                      </a:spcAft>
+                      <a:buClrTx/>
+                      <a:buSzTx/>
+                      <a:buFontTx/>
+                      <a:buNone/>
+                      <a:tabLst/>
+                      <a:defRPr/>
+                    </a:pPr>
+                    <a:r>
+                      <a:rPr kumimoji="0" lang="fr-FR" sz="3200" b="0" i="0" u="none" strike="noStrike" kern="1200" cap="none" spc="0" normalizeH="0" baseline="0" noProof="0" dirty="0">
+                        <a:ln>
+                          <a:noFill/>
+                        </a:ln>
+                        <a:solidFill>
+                          <a:srgbClr val="37322F"/>
+                        </a:solidFill>
+                        <a:effectLst/>
+                        <a:uLnTx/>
+                        <a:uFillTx/>
+                        <a:latin typeface="Gill Sans Nova" panose="020B0602020104020203" pitchFamily="34" charset="0"/>
+                        <a:ea typeface="+mn-ea"/>
+                        <a:cs typeface="+mn-cs"/>
+                      </a:rPr>
+                      <a:t>Blablabla</a:t>
+                    </a:r>
+                  </a:p>
+                  <a:p>
+                    <a:pPr marL="0" marR="0" lvl="0" indent="0" algn="ctr" defTabSz="457200" rtl="0" eaLnBrk="1" fontAlgn="auto" latinLnBrk="0" hangingPunct="1">
+                      <a:lnSpc>
+                        <a:spcPct val="100000"/>
+                      </a:lnSpc>
+                      <a:spcBef>
+                        <a:spcPts val="0"/>
+                      </a:spcBef>
+                      <a:spcAft>
+                        <a:spcPts val="0"/>
+                      </a:spcAft>
+                      <a:buClrTx/>
+                      <a:buSzTx/>
+                      <a:buFontTx/>
+                      <a:buNone/>
+                      <a:tabLst/>
+                      <a:defRPr/>
+                    </a:pPr>
+                    <a:endParaRPr kumimoji="0" lang="fr-FR" sz="1800" b="0" i="0" u="none" strike="noStrike" kern="1200" cap="none" spc="0" normalizeH="0" baseline="0" noProof="0" dirty="0">
+                      <a:ln>
+                        <a:noFill/>
+                      </a:ln>
+                      <a:solidFill>
+                        <a:srgbClr val="37322F"/>
+                      </a:solidFill>
+                      <a:effectLst/>
+                      <a:uLnTx/>
+                      <a:uFillTx/>
+                      <a:latin typeface="Aptos" panose="02110004020202020204"/>
+                      <a:ea typeface="+mn-ea"/>
+                      <a:cs typeface="+mn-cs"/>
+                    </a:endParaRPr>
+                  </a:p>
+                </p:txBody>
+              </p:sp>
+            </p:grpSp>
+            <p:sp>
+              <p:nvSpPr>
+                <p:cNvPr id="31" name="Rectangle : coins arrondis 30">
+                  <a:extLst>
+                    <a:ext uri="{FF2B5EF4-FFF2-40B4-BE49-F238E27FC236}">
+                      <a16:creationId xmlns:a16="http://schemas.microsoft.com/office/drawing/2014/main" id="{171044C3-C700-576A-44E0-693B31CE2359}"/>
+                    </a:ext>
+                  </a:extLst>
+                </p:cNvPr>
+                <p:cNvSpPr>
+                  <a:spLocks/>
+                </p:cNvSpPr>
+                <p:nvPr/>
+              </p:nvSpPr>
+              <p:spPr>
+                <a:xfrm>
+                  <a:off x="21892743" y="31054525"/>
+                  <a:ext cx="10064094" cy="6815959"/>
+                </a:xfrm>
+                <a:prstGeom prst="roundRect">
+                  <a:avLst>
+                    <a:gd name="adj" fmla="val 16667"/>
+                  </a:avLst>
+                </a:prstGeom>
                 <a:solidFill>
-                  <a:srgbClr val="37322F"/>
+                  <a:srgbClr val="E7E1D5"/>
                 </a:solidFill>
-                <a:effectLst/>
-                <a:uLnTx/>
-                <a:uFillTx/>
-                <a:latin typeface="Gill Sans Nova" panose="020B0602020104020203" pitchFamily="34" charset="0"/>
-                <a:ea typeface="+mn-ea"/>
-                <a:cs typeface="Aharoni" panose="020F0502020204030204" pitchFamily="2" charset="-79"/>
-              </a:rPr>
-              <a:t> phase </a:t>
-            </a:r>
-            <a:r>
-              <a:rPr kumimoji="0" lang="fr-FR" sz="5000" b="0" i="0" u="none" strike="noStrike" kern="1200" cap="none" spc="0" normalizeH="0" baseline="0" noProof="0" dirty="0" err="1">
                 <a:ln>
                   <a:noFill/>
                 </a:ln>
-                <a:solidFill>
-                  <a:srgbClr val="37322F"/>
-                </a:solidFill>
-                <a:effectLst/>
-                <a:uLnTx/>
-                <a:uFillTx/>
-                <a:latin typeface="Gill Sans Nova" panose="020B0602020104020203" pitchFamily="34" charset="0"/>
-                <a:ea typeface="+mn-ea"/>
-                <a:cs typeface="Aharoni" panose="020F0502020204030204" pitchFamily="2" charset="-79"/>
-              </a:rPr>
-              <a:t>shifter</a:t>
-            </a:r>
-            <a:r>
-              <a:rPr kumimoji="0" lang="fr-FR" sz="5000" b="0" i="0" u="none" strike="noStrike" kern="1200" cap="none" spc="0" normalizeH="0" baseline="0" noProof="0" dirty="0">
-                <a:ln>
-                  <a:noFill/>
-                </a:ln>
-                <a:solidFill>
-                  <a:srgbClr val="37322F"/>
-                </a:solidFill>
-                <a:effectLst/>
-                <a:uLnTx/>
-                <a:uFillTx/>
-                <a:latin typeface="Gill Sans Nova" panose="020B0602020104020203" pitchFamily="34" charset="0"/>
-                <a:ea typeface="+mn-ea"/>
-                <a:cs typeface="Aharoni" panose="020F0502020204030204" pitchFamily="2" charset="-79"/>
-              </a:rPr>
-              <a:t> 🌡️</a:t>
-            </a:r>
-            <a:endParaRPr kumimoji="0" lang="en-US" sz="5000" b="0" i="0" u="none" strike="noStrike" kern="1200" cap="none" spc="0" normalizeH="0" baseline="0" noProof="0" dirty="0">
+              </p:spPr>
+              <p:style>
+                <a:lnRef idx="2">
+                  <a:schemeClr val="accent1">
+                    <a:shade val="15000"/>
+                  </a:schemeClr>
+                </a:lnRef>
+                <a:fillRef idx="1">
+                  <a:schemeClr val="accent1"/>
+                </a:fillRef>
+                <a:effectRef idx="0">
+                  <a:schemeClr val="accent1"/>
+                </a:effectRef>
+                <a:fontRef idx="minor">
+                  <a:schemeClr val="lt1"/>
+                </a:fontRef>
+              </p:style>
+              <p:txBody>
+                <a:bodyPr rtlCol="0" anchor="t"/>
+                <a:lstStyle/>
+                <a:p>
+                  <a:pPr marL="0" marR="0" lvl="0" indent="0" algn="ctr" defTabSz="457200" rtl="0" eaLnBrk="1" fontAlgn="auto" latinLnBrk="0" hangingPunct="1">
+                    <a:lnSpc>
+                      <a:spcPct val="100000"/>
+                    </a:lnSpc>
+                    <a:spcBef>
+                      <a:spcPts val="0"/>
+                    </a:spcBef>
+                    <a:spcAft>
+                      <a:spcPts val="0"/>
+                    </a:spcAft>
+                    <a:buClrTx/>
+                    <a:buSzTx/>
+                    <a:buFontTx/>
+                    <a:buNone/>
+                    <a:tabLst/>
+                    <a:defRPr/>
+                  </a:pPr>
+                  <a:r>
+                    <a:rPr kumimoji="0" lang="en-US" sz="4800" b="0" i="0" u="none" strike="noStrike" kern="1200" cap="none" spc="0" normalizeH="0" baseline="0" noProof="0" dirty="0">
+                      <a:ln>
+                        <a:noFill/>
+                      </a:ln>
+                      <a:solidFill>
+                        <a:srgbClr val="37322F"/>
+                      </a:solidFill>
+                      <a:effectLst/>
+                      <a:uLnTx/>
+                      <a:uFillTx/>
+                      <a:latin typeface="Congenial SemiBold" panose="02000503040000020004" pitchFamily="2" charset="0"/>
+                      <a:cs typeface="Aharoni" panose="020F0502020204030204" pitchFamily="2" charset="-79"/>
+                    </a:rPr>
+                    <a:t>Discussions &amp; prospects </a:t>
+                  </a:r>
+                  <a:r>
+                    <a:rPr kumimoji="0" lang="fr-FR" sz="4800" b="0" i="0" u="none" strike="noStrike" kern="1200" cap="none" spc="0" normalizeH="0" baseline="0" noProof="0" dirty="0">
+                      <a:ln>
+                        <a:noFill/>
+                      </a:ln>
+                      <a:solidFill>
+                        <a:srgbClr val="37322F"/>
+                      </a:solidFill>
+                      <a:effectLst/>
+                      <a:uLnTx/>
+                      <a:uFillTx/>
+                      <a:latin typeface="Congenial SemiBold" panose="02000503040000020004" pitchFamily="2" charset="0"/>
+                      <a:cs typeface="Aharoni" panose="020F0502020204030204" pitchFamily="2" charset="-79"/>
+                    </a:rPr>
+                    <a:t>💬</a:t>
+                  </a:r>
+                  <a:endParaRPr kumimoji="0" lang="en-US" sz="4800" b="0" i="0" u="none" strike="noStrike" kern="1200" cap="none" spc="0" normalizeH="0" baseline="0" noProof="0" dirty="0">
+                    <a:ln>
+                      <a:noFill/>
+                    </a:ln>
+                    <a:solidFill>
+                      <a:srgbClr val="37322F"/>
+                    </a:solidFill>
+                    <a:effectLst/>
+                    <a:uLnTx/>
+                    <a:uFillTx/>
+                    <a:latin typeface="Congenial SemiBold" panose="02000503040000020004" pitchFamily="2" charset="0"/>
+                    <a:cs typeface="Aharoni" panose="020F0502020204030204" pitchFamily="2" charset="-79"/>
+                  </a:endParaRPr>
+                </a:p>
+                <a:p>
+                  <a:pPr marL="0" marR="0" lvl="0" indent="0" algn="ctr" defTabSz="457200" rtl="0" eaLnBrk="1" fontAlgn="auto" latinLnBrk="0" hangingPunct="1">
+                    <a:lnSpc>
+                      <a:spcPct val="100000"/>
+                    </a:lnSpc>
+                    <a:spcBef>
+                      <a:spcPts val="0"/>
+                    </a:spcBef>
+                    <a:spcAft>
+                      <a:spcPts val="0"/>
+                    </a:spcAft>
+                    <a:buClrTx/>
+                    <a:buSzTx/>
+                    <a:buFontTx/>
+                    <a:buNone/>
+                    <a:tabLst/>
+                    <a:defRPr/>
+                  </a:pPr>
+                  <a:r>
+                    <a:rPr kumimoji="0" lang="en-US" sz="2000" b="0" i="0" u="sng" strike="noStrike" kern="1200" cap="none" spc="0" normalizeH="0" baseline="0" noProof="0" dirty="0">
+                      <a:ln>
+                        <a:noFill/>
+                      </a:ln>
+                      <a:solidFill>
+                        <a:srgbClr val="37322F"/>
+                      </a:solidFill>
+                      <a:effectLst/>
+                      <a:uLnTx/>
+                      <a:uFillTx/>
+                      <a:latin typeface="Gill Sans Nova" panose="020B0602020104020203" pitchFamily="34" charset="0"/>
+                      <a:ea typeface="+mn-ea"/>
+                      <a:cs typeface="Aharoni" panose="020F0502020204030204" pitchFamily="2" charset="-79"/>
+                    </a:rPr>
+                    <a:t> </a:t>
+                  </a:r>
+                </a:p>
+                <a:p>
+                  <a:pPr marL="457200" marR="0" lvl="0" indent="-457200" algn="l" defTabSz="457200" rtl="0" eaLnBrk="1" fontAlgn="auto" latinLnBrk="0" hangingPunct="1">
+                    <a:lnSpc>
+                      <a:spcPct val="100000"/>
+                    </a:lnSpc>
+                    <a:spcBef>
+                      <a:spcPts val="0"/>
+                    </a:spcBef>
+                    <a:spcAft>
+                      <a:spcPts val="0"/>
+                    </a:spcAft>
+                    <a:buClrTx/>
+                    <a:buSzTx/>
+                    <a:buFontTx/>
+                    <a:buChar char="-"/>
+                    <a:tabLst/>
+                    <a:defRPr/>
+                  </a:pPr>
+                  <a:r>
+                    <a:rPr kumimoji="0" lang="fr-FR" sz="3200" b="0" i="0" u="none" strike="noStrike" kern="1200" cap="none" spc="0" normalizeH="0" baseline="0" noProof="0" dirty="0" err="1">
+                      <a:ln>
+                        <a:noFill/>
+                      </a:ln>
+                      <a:solidFill>
+                        <a:srgbClr val="37322F"/>
+                      </a:solidFill>
+                      <a:effectLst/>
+                      <a:uLnTx/>
+                      <a:uFillTx/>
+                      <a:latin typeface="Gill Sans Nova" panose="020B0602020104020203" pitchFamily="34" charset="0"/>
+                      <a:ea typeface="+mn-ea"/>
+                      <a:cs typeface="+mn-cs"/>
+                    </a:rPr>
+                    <a:t>Angular</a:t>
+                  </a:r>
+                  <a:r>
+                    <a:rPr kumimoji="0" lang="fr-FR" sz="3200" b="0" i="0" u="none" strike="noStrike" kern="1200" cap="none" spc="0" normalizeH="0" baseline="0" noProof="0" dirty="0">
+                      <a:ln>
+                        <a:noFill/>
+                      </a:ln>
+                      <a:solidFill>
+                        <a:srgbClr val="37322F"/>
+                      </a:solidFill>
+                      <a:effectLst/>
+                      <a:uLnTx/>
+                      <a:uFillTx/>
+                      <a:latin typeface="Gill Sans Nova" panose="020B0602020104020203" pitchFamily="34" charset="0"/>
+                      <a:ea typeface="+mn-ea"/>
+                      <a:cs typeface="+mn-cs"/>
+                    </a:rPr>
+                    <a:t> </a:t>
+                  </a:r>
+                  <a:r>
+                    <a:rPr kumimoji="0" lang="fr-FR" sz="3200" b="0" i="0" u="none" strike="noStrike" kern="1200" cap="none" spc="0" normalizeH="0" baseline="0" noProof="0" dirty="0" err="1">
+                      <a:ln>
+                        <a:noFill/>
+                      </a:ln>
+                      <a:solidFill>
+                        <a:srgbClr val="37322F"/>
+                      </a:solidFill>
+                      <a:effectLst/>
+                      <a:uLnTx/>
+                      <a:uFillTx/>
+                      <a:latin typeface="Gill Sans Nova" panose="020B0602020104020203" pitchFamily="34" charset="0"/>
+                      <a:ea typeface="+mn-ea"/>
+                      <a:cs typeface="+mn-cs"/>
+                    </a:rPr>
+                    <a:t>diversity</a:t>
+                  </a:r>
+                  <a:endParaRPr kumimoji="0" lang="fr-FR" sz="3200" b="0" i="0" u="none" strike="noStrike" kern="1200" cap="none" spc="0" normalizeH="0" baseline="0" noProof="0" dirty="0">
+                    <a:ln>
+                      <a:noFill/>
+                    </a:ln>
+                    <a:solidFill>
+                      <a:srgbClr val="37322F"/>
+                    </a:solidFill>
+                    <a:effectLst/>
+                    <a:uLnTx/>
+                    <a:uFillTx/>
+                    <a:latin typeface="Gill Sans Nova" panose="020B0602020104020203" pitchFamily="34" charset="0"/>
+                    <a:ea typeface="+mn-ea"/>
+                    <a:cs typeface="+mn-cs"/>
+                  </a:endParaRPr>
+                </a:p>
+                <a:p>
+                  <a:pPr marL="457200" marR="0" lvl="0" indent="-457200" algn="l" defTabSz="457200" rtl="0" eaLnBrk="1" fontAlgn="auto" latinLnBrk="0" hangingPunct="1">
+                    <a:lnSpc>
+                      <a:spcPct val="100000"/>
+                    </a:lnSpc>
+                    <a:spcBef>
+                      <a:spcPts val="0"/>
+                    </a:spcBef>
+                    <a:spcAft>
+                      <a:spcPts val="0"/>
+                    </a:spcAft>
+                    <a:buClrTx/>
+                    <a:buSzTx/>
+                    <a:buFontTx/>
+                    <a:buChar char="-"/>
+                    <a:tabLst/>
+                    <a:defRPr/>
+                  </a:pPr>
+                  <a:r>
+                    <a:rPr kumimoji="0" lang="fr-FR" sz="3200" b="0" i="0" u="none" strike="noStrike" kern="1200" cap="none" spc="0" normalizeH="0" baseline="0" noProof="0" dirty="0">
+                      <a:ln>
+                        <a:noFill/>
+                      </a:ln>
+                      <a:solidFill>
+                        <a:srgbClr val="37322F"/>
+                      </a:solidFill>
+                      <a:effectLst/>
+                      <a:uLnTx/>
+                      <a:uFillTx/>
+                      <a:latin typeface="Gill Sans Nova" panose="020B0602020104020203" pitchFamily="34" charset="0"/>
+                      <a:ea typeface="+mn-ea"/>
+                      <a:cs typeface="+mn-cs"/>
+                    </a:rPr>
+                    <a:t>Test in </a:t>
+                  </a:r>
+                  <a:r>
+                    <a:rPr kumimoji="0" lang="fr-FR" sz="3200" b="0" i="0" u="none" strike="noStrike" kern="1200" cap="none" spc="0" normalizeH="0" baseline="0" noProof="0" dirty="0" err="1">
+                      <a:ln>
+                        <a:noFill/>
+                      </a:ln>
+                      <a:solidFill>
+                        <a:srgbClr val="37322F"/>
+                      </a:solidFill>
+                      <a:effectLst/>
+                      <a:uLnTx/>
+                      <a:uFillTx/>
+                      <a:latin typeface="Gill Sans Nova" panose="020B0602020104020203" pitchFamily="34" charset="0"/>
+                      <a:ea typeface="+mn-ea"/>
+                      <a:cs typeface="+mn-cs"/>
+                    </a:rPr>
+                    <a:t>lab</a:t>
+                  </a:r>
+                  <a:endParaRPr kumimoji="0" lang="fr-FR" sz="3200" b="0" i="0" u="none" strike="noStrike" kern="1200" cap="none" spc="0" normalizeH="0" baseline="0" noProof="0" dirty="0">
+                    <a:ln>
+                      <a:noFill/>
+                    </a:ln>
+                    <a:solidFill>
+                      <a:srgbClr val="37322F"/>
+                    </a:solidFill>
+                    <a:effectLst/>
+                    <a:uLnTx/>
+                    <a:uFillTx/>
+                    <a:latin typeface="Gill Sans Nova" panose="020B0602020104020203" pitchFamily="34" charset="0"/>
+                    <a:ea typeface="+mn-ea"/>
+                    <a:cs typeface="+mn-cs"/>
+                  </a:endParaRPr>
+                </a:p>
+                <a:p>
+                  <a:pPr marL="457200" marR="0" lvl="0" indent="-457200" algn="l" defTabSz="457200" rtl="0" eaLnBrk="1" fontAlgn="auto" latinLnBrk="0" hangingPunct="1">
+                    <a:lnSpc>
+                      <a:spcPct val="100000"/>
+                    </a:lnSpc>
+                    <a:spcBef>
+                      <a:spcPts val="0"/>
+                    </a:spcBef>
+                    <a:spcAft>
+                      <a:spcPts val="0"/>
+                    </a:spcAft>
+                    <a:buClrTx/>
+                    <a:buSzTx/>
+                    <a:buFontTx/>
+                    <a:buChar char="-"/>
+                    <a:tabLst/>
+                    <a:defRPr/>
+                  </a:pPr>
+                  <a:r>
+                    <a:rPr lang="fr-FR" sz="3200" dirty="0">
+                      <a:solidFill>
+                        <a:srgbClr val="37322F"/>
+                      </a:solidFill>
+                      <a:latin typeface="Gill Sans Nova" panose="020B0602020104020203" pitchFamily="34" charset="0"/>
+                    </a:rPr>
+                    <a:t>Usage of physics </a:t>
+                  </a:r>
+                  <a:r>
+                    <a:rPr lang="fr-FR" sz="3200" dirty="0" err="1">
+                      <a:solidFill>
+                        <a:srgbClr val="37322F"/>
+                      </a:solidFill>
+                      <a:latin typeface="Gill Sans Nova" panose="020B0602020104020203" pitchFamily="34" charset="0"/>
+                    </a:rPr>
+                    <a:t>based</a:t>
+                  </a:r>
+                  <a:r>
+                    <a:rPr lang="fr-FR" sz="3200" dirty="0">
+                      <a:solidFill>
+                        <a:srgbClr val="37322F"/>
+                      </a:solidFill>
+                      <a:latin typeface="Gill Sans Nova" panose="020B0602020104020203" pitchFamily="34" charset="0"/>
+                    </a:rPr>
+                    <a:t> MMI </a:t>
+                  </a:r>
+                  <a:r>
+                    <a:rPr lang="fr-FR" sz="3200" dirty="0" err="1">
+                      <a:solidFill>
+                        <a:srgbClr val="37322F"/>
+                      </a:solidFill>
+                      <a:latin typeface="Gill Sans Nova" panose="020B0602020104020203" pitchFamily="34" charset="0"/>
+                    </a:rPr>
+                    <a:t>models</a:t>
+                  </a:r>
+                  <a:endParaRPr lang="fr-FR" sz="3200" dirty="0">
+                    <a:solidFill>
+                      <a:srgbClr val="37322F"/>
+                    </a:solidFill>
+                    <a:latin typeface="Gill Sans Nova" panose="020B0602020104020203" pitchFamily="34" charset="0"/>
+                  </a:endParaRPr>
+                </a:p>
+                <a:p>
+                  <a:pPr marL="457200" marR="0" lvl="0" indent="-457200" algn="l" defTabSz="457200" rtl="0" eaLnBrk="1" fontAlgn="auto" latinLnBrk="0" hangingPunct="1">
+                    <a:lnSpc>
+                      <a:spcPct val="100000"/>
+                    </a:lnSpc>
+                    <a:spcBef>
+                      <a:spcPts val="0"/>
+                    </a:spcBef>
+                    <a:spcAft>
+                      <a:spcPts val="0"/>
+                    </a:spcAft>
+                    <a:buClrTx/>
+                    <a:buSzTx/>
+                    <a:buFontTx/>
+                    <a:buChar char="-"/>
+                    <a:tabLst/>
+                    <a:defRPr/>
+                  </a:pPr>
+                  <a:r>
+                    <a:rPr kumimoji="0" lang="fr-FR" sz="3200" b="0" i="0" u="none" strike="noStrike" kern="1200" cap="none" spc="0" normalizeH="0" baseline="0" noProof="0" dirty="0" err="1">
+                      <a:ln>
+                        <a:noFill/>
+                      </a:ln>
+                      <a:solidFill>
+                        <a:srgbClr val="37322F"/>
+                      </a:solidFill>
+                      <a:effectLst/>
+                      <a:uLnTx/>
+                      <a:uFillTx/>
+                      <a:latin typeface="Gill Sans Nova" panose="020B0602020104020203" pitchFamily="34" charset="0"/>
+                      <a:ea typeface="+mn-ea"/>
+                      <a:cs typeface="+mn-cs"/>
+                    </a:rPr>
+                    <a:t>Implementation</a:t>
+                  </a:r>
+                  <a:r>
+                    <a:rPr kumimoji="0" lang="fr-FR" sz="3200" b="0" i="0" u="none" strike="noStrike" kern="1200" cap="none" spc="0" normalizeH="0" baseline="0" noProof="0" dirty="0">
+                      <a:ln>
+                        <a:noFill/>
+                      </a:ln>
+                      <a:solidFill>
+                        <a:srgbClr val="37322F"/>
+                      </a:solidFill>
+                      <a:effectLst/>
+                      <a:uLnTx/>
+                      <a:uFillTx/>
+                      <a:latin typeface="Gill Sans Nova" panose="020B0602020104020203" pitchFamily="34" charset="0"/>
+                      <a:ea typeface="+mn-ea"/>
+                      <a:cs typeface="+mn-cs"/>
+                    </a:rPr>
+                    <a:t> on the VLTI</a:t>
+                  </a:r>
+                </a:p>
+              </p:txBody>
+            </p:sp>
+          </p:grpSp>
+          <p:sp>
+            <p:nvSpPr>
+              <p:cNvPr id="8" name="Rectangle : coins arrondis 7">
+                <a:extLst>
+                  <a:ext uri="{FF2B5EF4-FFF2-40B4-BE49-F238E27FC236}">
+                    <a16:creationId xmlns:a16="http://schemas.microsoft.com/office/drawing/2014/main" id="{0C379A8F-C7A8-CD89-C5B7-B3D7DBC0A70B}"/>
+                  </a:ext>
+                </a:extLst>
+              </p:cNvPr>
+              <p:cNvSpPr>
+                <a:spLocks/>
+              </p:cNvSpPr>
+              <p:nvPr/>
+            </p:nvSpPr>
+            <p:spPr>
+              <a:xfrm>
+                <a:off x="11077498" y="14637182"/>
+                <a:ext cx="10329024" cy="10928421"/>
+              </a:xfrm>
+              <a:prstGeom prst="roundRect">
+                <a:avLst>
+                  <a:gd name="adj" fmla="val 11688"/>
+                </a:avLst>
+              </a:prstGeom>
+              <a:solidFill>
+                <a:srgbClr val="E7E1D5"/>
+              </a:solidFill>
               <a:ln>
                 <a:noFill/>
               </a:ln>
-              <a:solidFill>
-                <a:srgbClr val="37322F"/>
-              </a:solidFill>
-              <a:effectLst/>
-              <a:uLnTx/>
-              <a:uFillTx/>
-              <a:latin typeface="Gill Sans Nova" panose="020B0602020104020203" pitchFamily="34" charset="0"/>
-              <a:ea typeface="+mn-ea"/>
-              <a:cs typeface="Aharoni" panose="020F0502020204030204" pitchFamily="2" charset="-79"/>
-            </a:endParaRPr>
-          </a:p>
-          <a:p>
-            <a:pPr marL="0" marR="0" lvl="0" indent="0" algn="ctr" defTabSz="457200" rtl="0" eaLnBrk="1" fontAlgn="auto" latinLnBrk="0" hangingPunct="1">
-              <a:lnSpc>
-                <a:spcPct val="100000"/>
-              </a:lnSpc>
-              <a:spcBef>
-                <a:spcPts val="0"/>
-              </a:spcBef>
-              <a:spcAft>
-                <a:spcPts val="0"/>
-              </a:spcAft>
-              <a:buClrTx/>
-              <a:buSzTx/>
-              <a:buFontTx/>
-              <a:buNone/>
-              <a:tabLst/>
-              <a:defRPr/>
-            </a:pPr>
-            <a:r>
-              <a:rPr kumimoji="0" lang="en-US" sz="2000" b="0" i="0" u="sng" strike="noStrike" kern="1200" cap="none" spc="0" normalizeH="0" baseline="0" noProof="0" dirty="0">
-                <a:ln>
-                  <a:noFill/>
-                </a:ln>
-                <a:solidFill>
-                  <a:srgbClr val="37322F"/>
-                </a:solidFill>
-                <a:effectLst/>
-                <a:uLnTx/>
-                <a:uFillTx/>
-                <a:latin typeface="Gill Sans Nova" panose="020B0602020104020203" pitchFamily="34" charset="0"/>
-                <a:ea typeface="+mn-ea"/>
-                <a:cs typeface="Aharoni" panose="020F0502020204030204" pitchFamily="2" charset="-79"/>
-              </a:rPr>
-              <a:t> </a:t>
-            </a:r>
-          </a:p>
-          <a:p>
-            <a:pPr marL="0" marR="0" lvl="0" indent="0" algn="l" defTabSz="457200" rtl="0" eaLnBrk="1" fontAlgn="auto" latinLnBrk="0" hangingPunct="1">
-              <a:lnSpc>
-                <a:spcPct val="100000"/>
-              </a:lnSpc>
-              <a:spcBef>
-                <a:spcPts val="0"/>
-              </a:spcBef>
-              <a:spcAft>
-                <a:spcPts val="0"/>
-              </a:spcAft>
-              <a:buClrTx/>
-              <a:buSzTx/>
-              <a:buFontTx/>
-              <a:buNone/>
-              <a:tabLst/>
-              <a:defRPr/>
-            </a:pPr>
-            <a:r>
-              <a:rPr kumimoji="0" lang="fr-FR" sz="3200" b="0" i="0" u="none" strike="noStrike" kern="1200" cap="none" spc="0" normalizeH="0" baseline="0" noProof="0" dirty="0">
-                <a:ln>
-                  <a:noFill/>
-                </a:ln>
-                <a:solidFill>
-                  <a:srgbClr val="37322F"/>
-                </a:solidFill>
-                <a:effectLst/>
-                <a:uLnTx/>
-                <a:uFillTx/>
-                <a:latin typeface="Gill Sans Nova" panose="020B0602020104020203" pitchFamily="34" charset="0"/>
-                <a:ea typeface="+mn-ea"/>
-                <a:cs typeface="+mn-cs"/>
-              </a:rPr>
-              <a:t>Blablabla</a:t>
-            </a:r>
-          </a:p>
-          <a:p>
-            <a:pPr marL="0" marR="0" lvl="0" indent="0" algn="ctr" defTabSz="457200" rtl="0" eaLnBrk="1" fontAlgn="auto" latinLnBrk="0" hangingPunct="1">
-              <a:lnSpc>
-                <a:spcPct val="100000"/>
-              </a:lnSpc>
-              <a:spcBef>
-                <a:spcPts val="0"/>
-              </a:spcBef>
-              <a:spcAft>
-                <a:spcPts val="0"/>
-              </a:spcAft>
-              <a:buClrTx/>
-              <a:buSzTx/>
-              <a:buFontTx/>
-              <a:buNone/>
-              <a:tabLst/>
-              <a:defRPr/>
-            </a:pPr>
-            <a:endParaRPr kumimoji="0" lang="fr-FR" sz="1800" b="0" i="0" u="none" strike="noStrike" kern="1200" cap="none" spc="0" normalizeH="0" baseline="0" noProof="0" dirty="0">
-              <a:ln>
-                <a:noFill/>
-              </a:ln>
-              <a:solidFill>
-                <a:srgbClr val="37322F"/>
-              </a:solidFill>
-              <a:effectLst/>
-              <a:uLnTx/>
-              <a:uFillTx/>
-              <a:latin typeface="Aptos" panose="02110004020202020204"/>
-              <a:ea typeface="+mn-ea"/>
-              <a:cs typeface="+mn-cs"/>
-            </a:endParaRPr>
-          </a:p>
-        </p:txBody>
-      </p:sp>
+            </p:spPr>
+            <p:style>
+              <a:lnRef idx="2">
+                <a:schemeClr val="accent1">
+                  <a:shade val="15000"/>
+                </a:schemeClr>
+              </a:lnRef>
+              <a:fillRef idx="1">
+                <a:schemeClr val="accent1"/>
+              </a:fillRef>
+              <a:effectRef idx="0">
+                <a:schemeClr val="accent1"/>
+              </a:effectRef>
+              <a:fontRef idx="minor">
+                <a:schemeClr val="lt1"/>
+              </a:fontRef>
+            </p:style>
+            <p:txBody>
+              <a:bodyPr rtlCol="0" anchor="t"/>
+              <a:lstStyle/>
+              <a:p>
+                <a:pPr algn="ctr"/>
+                <a:r>
+                  <a:rPr lang="fr-FR" sz="4800" dirty="0">
+                    <a:solidFill>
+                      <a:srgbClr val="37322F"/>
+                    </a:solidFill>
+                    <a:latin typeface="Congenial SemiBold" panose="02000503040000020004" pitchFamily="2" charset="0"/>
+                    <a:cs typeface="Aharoni" panose="020F0502020204030204" pitchFamily="2" charset="-79"/>
+                  </a:rPr>
+                  <a:t>Active </a:t>
+                </a:r>
+                <a:r>
+                  <a:rPr lang="fr-FR" sz="4800" dirty="0" err="1">
+                    <a:solidFill>
+                      <a:srgbClr val="37322F"/>
+                    </a:solidFill>
+                    <a:latin typeface="Congenial SemiBold" panose="02000503040000020004" pitchFamily="2" charset="0"/>
+                    <a:cs typeface="Aharoni" panose="020F0502020204030204" pitchFamily="2" charset="-79"/>
+                  </a:rPr>
+                  <a:t>optical</a:t>
+                </a:r>
+                <a:r>
+                  <a:rPr lang="fr-FR" sz="4800" dirty="0">
+                    <a:solidFill>
+                      <a:srgbClr val="37322F"/>
+                    </a:solidFill>
+                    <a:latin typeface="Congenial SemiBold" panose="02000503040000020004" pitchFamily="2" charset="0"/>
+                    <a:cs typeface="Aharoni" panose="020F0502020204030204" pitchFamily="2" charset="-79"/>
+                  </a:rPr>
+                  <a:t> components</a:t>
+                </a:r>
+                <a:endParaRPr lang="en-US" sz="4800" dirty="0">
+                  <a:solidFill>
+                    <a:srgbClr val="37322F"/>
+                  </a:solidFill>
+                  <a:latin typeface="Congenial SemiBold" panose="02000503040000020004" pitchFamily="2" charset="0"/>
+                  <a:cs typeface="Aharoni" panose="020F0502020204030204" pitchFamily="2" charset="-79"/>
+                </a:endParaRPr>
+              </a:p>
+              <a:p>
+                <a:pPr algn="ctr"/>
+                <a:r>
+                  <a:rPr lang="en-US" sz="2000" u="sng" dirty="0">
+                    <a:solidFill>
+                      <a:srgbClr val="37322F"/>
+                    </a:solidFill>
+                    <a:latin typeface="Gill Sans Nova" panose="020B0602020104020203" pitchFamily="34" charset="0"/>
+                    <a:cs typeface="Aharoni" panose="020F0502020204030204" pitchFamily="2" charset="-79"/>
+                  </a:rPr>
+                  <a:t> </a:t>
+                </a:r>
+              </a:p>
+              <a:p>
+                <a:r>
+                  <a:rPr lang="fr-FR" sz="3200" dirty="0">
+                    <a:solidFill>
+                      <a:srgbClr val="37322F"/>
+                    </a:solidFill>
+                    <a:latin typeface="Gill Sans Nova" panose="020B0602020104020203" pitchFamily="34" charset="0"/>
+                  </a:rPr>
+                  <a:t>Blablabla</a:t>
+                </a:r>
+              </a:p>
+            </p:txBody>
+          </p:sp>
+        </p:grpSp>
+      </p:grpSp>
       <p:grpSp>
         <p:nvGrpSpPr>
           <p:cNvPr id="15" name="Groupe 14">
@@ -3500,7 +5210,7 @@
                   <a:solidFill>
                     <a:srgbClr val="F9F6F1"/>
                   </a:solidFill>
-                  <a:latin typeface="Congenial SemiBold" panose="020F0502020204030204" pitchFamily="2" charset="0"/>
+                  <a:latin typeface="Gill Sans Nova" panose="020B0602020104020203" pitchFamily="34" charset="0"/>
                 </a:rPr>
                 <a:t>Vincent Foriel</a:t>
               </a:r>
@@ -3509,16 +5219,16 @@
                   <a:solidFill>
                     <a:srgbClr val="F9F6F1"/>
                   </a:solidFill>
-                  <a:latin typeface="Congenial SemiBold" panose="020F0502020204030204" pitchFamily="2" charset="0"/>
+                  <a:latin typeface="Gill Sans Nova" panose="020B0602020104020203" pitchFamily="34" charset="0"/>
                 </a:rPr>
-                <a:t> 1,*</a:t>
+                <a:t>1,*</a:t>
               </a:r>
               <a:r>
                 <a:rPr lang="en-US" sz="5400" dirty="0">
                   <a:solidFill>
                     <a:srgbClr val="F9F6F1"/>
                   </a:solidFill>
-                  <a:latin typeface="Congenial SemiBold" panose="020F0502020204030204" pitchFamily="2" charset="0"/>
+                  <a:latin typeface="Gill Sans Nova" panose="020B0602020104020203" pitchFamily="34" charset="0"/>
                 </a:rPr>
                 <a:t>, Frantz Martinache</a:t>
               </a:r>
@@ -3527,16 +5237,16 @@
                   <a:solidFill>
                     <a:srgbClr val="F9F6F1"/>
                   </a:solidFill>
-                  <a:latin typeface="Congenial SemiBold" panose="020F0502020204030204" pitchFamily="2" charset="0"/>
+                  <a:latin typeface="Gill Sans Nova" panose="020B0602020104020203" pitchFamily="34" charset="0"/>
                 </a:rPr>
-                <a:t> 1</a:t>
+                <a:t>1</a:t>
               </a:r>
               <a:r>
                 <a:rPr lang="en-US" sz="5400" dirty="0">
                   <a:solidFill>
                     <a:srgbClr val="F9F6F1"/>
                   </a:solidFill>
-                  <a:latin typeface="Congenial SemiBold" panose="020F0502020204030204" pitchFamily="2" charset="0"/>
+                  <a:latin typeface="Gill Sans Nova" panose="020B0602020104020203" pitchFamily="34" charset="0"/>
                 </a:rPr>
                 <a:t>, David Mary</a:t>
               </a:r>
@@ -3545,16 +5255,16 @@
                   <a:solidFill>
                     <a:srgbClr val="F9F6F1"/>
                   </a:solidFill>
-                  <a:latin typeface="Congenial SemiBold" panose="020F0502020204030204" pitchFamily="2" charset="0"/>
+                  <a:latin typeface="Gill Sans Nova" panose="020B0602020104020203" pitchFamily="34" charset="0"/>
                 </a:rPr>
-                <a:t> 1</a:t>
+                <a:t>1</a:t>
               </a:r>
               <a:br>
                 <a:rPr lang="en-US" sz="5400" baseline="30000" dirty="0">
                   <a:solidFill>
                     <a:srgbClr val="F9F6F1"/>
                   </a:solidFill>
-                  <a:latin typeface="Congenial SemiBold" panose="020F0502020204030204" pitchFamily="2" charset="0"/>
+                  <a:latin typeface="Gill Sans Nova" panose="020B0602020104020203" pitchFamily="34" charset="0"/>
                 </a:rPr>
               </a:br>
               <a:r>
@@ -3562,7 +5272,7 @@
                   <a:solidFill>
                     <a:srgbClr val="F9F6F1"/>
                   </a:solidFill>
-                  <a:latin typeface="Congenial SemiBold" panose="020F0502020204030204" pitchFamily="2" charset="0"/>
+                  <a:latin typeface="Gill Sans Nova" panose="020B0602020104020203" pitchFamily="34" charset="0"/>
                 </a:rPr>
                 <a:t> </a:t>
               </a:r>
@@ -3571,7 +5281,7 @@
                   <a:solidFill>
                     <a:srgbClr val="F9F6F1"/>
                   </a:solidFill>
-                  <a:latin typeface="Congenial SemiBold" panose="020F0502020204030204" pitchFamily="2" charset="0"/>
+                  <a:latin typeface="Gill Sans Nova" panose="020B0602020104020203" pitchFamily="34" charset="0"/>
                 </a:rPr>
               </a:br>
               <a:r>
@@ -3579,7 +5289,7 @@
                   <a:solidFill>
                     <a:srgbClr val="F9F6F1"/>
                   </a:solidFill>
-                  <a:latin typeface="Congenial SemiBold" panose="020F0502020204030204" pitchFamily="2" charset="0"/>
+                  <a:latin typeface="Gill Sans Nova" panose="020B0602020104020203" pitchFamily="34" charset="0"/>
                 </a:rPr>
                 <a:t>1 </a:t>
               </a:r>
@@ -3588,7 +5298,7 @@
                   <a:solidFill>
                     <a:srgbClr val="F9F6F1"/>
                   </a:solidFill>
-                  <a:latin typeface="Congenial SemiBold" panose="020F0502020204030204" pitchFamily="2" charset="0"/>
+                  <a:latin typeface="Gill Sans Nova" panose="020B0602020104020203" pitchFamily="34" charset="0"/>
                 </a:rPr>
                 <a:t>Université Côte d'Azur, Observatoire de la Côte d'Azur, CNRS, Laboratoire Lagrange, France</a:t>
               </a:r>
@@ -3597,7 +5307,7 @@
                   <a:solidFill>
                     <a:srgbClr val="F9F6F1"/>
                   </a:solidFill>
-                  <a:latin typeface="Congenial SemiBold" panose="020F0502020204030204" pitchFamily="2" charset="0"/>
+                  <a:latin typeface="Gill Sans Nova" panose="020B0602020104020203" pitchFamily="34" charset="0"/>
                 </a:rPr>
               </a:br>
               <a:r>
@@ -3605,7 +5315,7 @@
                   <a:solidFill>
                     <a:srgbClr val="F9F6F1"/>
                   </a:solidFill>
-                  <a:latin typeface="Congenial SemiBold" panose="020F0502020204030204" pitchFamily="2" charset="0"/>
+                  <a:latin typeface="Gill Sans Nova" panose="020B0602020104020203" pitchFamily="34" charset="0"/>
                 </a:rPr>
                 <a:t> </a:t>
               </a:r>
@@ -3614,7 +5324,7 @@
                   <a:solidFill>
                     <a:srgbClr val="F9F6F1"/>
                   </a:solidFill>
-                  <a:latin typeface="Congenial SemiBold" panose="020F0502020204030204" pitchFamily="2" charset="0"/>
+                  <a:latin typeface="Gill Sans Nova" panose="020B0602020104020203" pitchFamily="34" charset="0"/>
                 </a:rPr>
               </a:br>
               <a:r>
@@ -3622,7 +5332,7 @@
                   <a:solidFill>
                     <a:srgbClr val="F9F6F1"/>
                   </a:solidFill>
-                  <a:latin typeface="Congenial SemiBold" panose="020F0502020204030204" pitchFamily="2" charset="0"/>
+                  <a:latin typeface="Gill Sans Nova" panose="020B0602020104020203" pitchFamily="34" charset="0"/>
                 </a:rPr>
                 <a:t>* </a:t>
               </a:r>
@@ -3631,7 +5341,7 @@
                   <a:solidFill>
                     <a:srgbClr val="F9F6F1"/>
                   </a:solidFill>
-                  <a:latin typeface="Congenial SemiBold" panose="020F0502020204030204" pitchFamily="2" charset="0"/>
+                  <a:latin typeface="Gill Sans Nova" panose="020B0602020104020203" pitchFamily="34" charset="0"/>
                 </a:rPr>
                 <a:t>vincent.foriel@gmail.com</a:t>
               </a:r>
@@ -3639,7 +5349,7 @@
                 <a:solidFill>
                   <a:srgbClr val="F9F6F1"/>
                 </a:solidFill>
-                <a:latin typeface="Congenial SemiBold" panose="020F0502020204030204" pitchFamily="2" charset="0"/>
+                <a:latin typeface="Gill Sans Nova" panose="020B0602020104020203" pitchFamily="34" charset="0"/>
               </a:endParaRPr>
             </a:p>
           </p:txBody>
@@ -3680,7 +5390,7 @@
             <p:nvPr/>
           </p:nvPicPr>
           <p:blipFill>
-            <a:blip r:embed="rId2">
+            <a:blip r:embed="rId3">
               <a:extLst>
                 <a:ext uri="{28A0092B-C50C-407E-A947-70E740481C1C}">
                   <a14:useLocalDpi xmlns:a14="http://schemas.microsoft.com/office/drawing/2010/main" val="0"/>
@@ -3716,7 +5426,7 @@
             <p:nvPr/>
           </p:nvPicPr>
           <p:blipFill>
-            <a:blip r:embed="rId3">
+            <a:blip r:embed="rId4">
               <a:extLst>
                 <a:ext uri="{28A0092B-C50C-407E-A947-70E740481C1C}">
                   <a14:useLocalDpi xmlns:a14="http://schemas.microsoft.com/office/drawing/2010/main" val="0"/>
@@ -3752,7 +5462,7 @@
             <p:nvPr/>
           </p:nvPicPr>
           <p:blipFill>
-            <a:blip r:embed="rId4">
+            <a:blip r:embed="rId5">
               <a:extLst>
                 <a:ext uri="{28A0092B-C50C-407E-A947-70E740481C1C}">
                   <a14:useLocalDpi xmlns:a14="http://schemas.microsoft.com/office/drawing/2010/main" val="0"/>
@@ -3788,7 +5498,7 @@
             <p:nvPr/>
           </p:nvPicPr>
           <p:blipFill>
-            <a:blip r:embed="rId5">
+            <a:blip r:embed="rId6">
               <a:extLst>
                 <a:ext uri="{28A0092B-C50C-407E-A947-70E740481C1C}">
                   <a14:useLocalDpi xmlns:a14="http://schemas.microsoft.com/office/drawing/2010/main" val="0"/>
@@ -3812,10 +5522,10 @@
       </p:grpSp>
       <p:grpSp>
         <p:nvGrpSpPr>
-          <p:cNvPr id="42" name="Groupe 41">
+          <p:cNvPr id="33" name="Groupe 32">
             <a:extLst>
               <a:ext uri="{FF2B5EF4-FFF2-40B4-BE49-F238E27FC236}">
-                <a16:creationId xmlns:a16="http://schemas.microsoft.com/office/drawing/2014/main" id="{FB7EB6C8-9905-BBF6-F070-5AE71BB84C47}"/>
+                <a16:creationId xmlns:a16="http://schemas.microsoft.com/office/drawing/2014/main" id="{8F24D38F-CDFC-7E8D-4949-BD64235E6CE8}"/>
               </a:ext>
             </a:extLst>
           </p:cNvPr>
@@ -3824,731 +5534,18 @@
         </p:nvGrpSpPr>
         <p:grpSpPr>
           <a:xfrm>
-            <a:off x="442451" y="9259890"/>
-            <a:ext cx="31355071" cy="26625261"/>
-            <a:chOff x="442451" y="9259890"/>
-            <a:chExt cx="31355071" cy="26625261"/>
+            <a:off x="442451" y="38373624"/>
+            <a:ext cx="31514386" cy="4355068"/>
+            <a:chOff x="442451" y="36388295"/>
+            <a:chExt cx="31355071" cy="6340397"/>
           </a:xfrm>
         </p:grpSpPr>
-        <p:grpSp>
-          <p:nvGrpSpPr>
-            <p:cNvPr id="14" name="Groupe 13">
+        <p:sp>
+          <p:nvSpPr>
+            <p:cNvPr id="30" name="Rectangle : coins arrondis 29">
               <a:extLst>
                 <a:ext uri="{FF2B5EF4-FFF2-40B4-BE49-F238E27FC236}">
-                  <a16:creationId xmlns:a16="http://schemas.microsoft.com/office/drawing/2014/main" id="{F7DF72B3-F5B3-DD7A-87CE-4EE6B48CB8A8}"/>
-                </a:ext>
-              </a:extLst>
-            </p:cNvPr>
-            <p:cNvGrpSpPr/>
-            <p:nvPr/>
-          </p:nvGrpSpPr>
-          <p:grpSpPr>
-            <a:xfrm>
-              <a:off x="442451" y="9259890"/>
-              <a:ext cx="31355071" cy="15919712"/>
-              <a:chOff x="522107" y="7597170"/>
-              <a:chExt cx="31355071" cy="15994279"/>
-            </a:xfrm>
-          </p:grpSpPr>
-          <p:grpSp>
-            <p:nvGrpSpPr>
-              <p:cNvPr id="12" name="Groupe 11">
-                <a:extLst>
-                  <a:ext uri="{FF2B5EF4-FFF2-40B4-BE49-F238E27FC236}">
-                    <a16:creationId xmlns:a16="http://schemas.microsoft.com/office/drawing/2014/main" id="{BD467FC4-ADDD-6315-F099-137D49B00582}"/>
-                  </a:ext>
-                </a:extLst>
-              </p:cNvPr>
-              <p:cNvGrpSpPr/>
-              <p:nvPr/>
-            </p:nvGrpSpPr>
-            <p:grpSpPr>
-              <a:xfrm>
-                <a:off x="522108" y="7597170"/>
-                <a:ext cx="31355070" cy="15264866"/>
-                <a:chOff x="244827" y="7313550"/>
-                <a:chExt cx="28424036" cy="3757355"/>
-              </a:xfrm>
-            </p:grpSpPr>
-            <p:sp>
-              <p:nvSpPr>
-                <p:cNvPr id="9" name="Rectangle : coins arrondis 8">
-                  <a:extLst>
-                    <a:ext uri="{FF2B5EF4-FFF2-40B4-BE49-F238E27FC236}">
-                      <a16:creationId xmlns:a16="http://schemas.microsoft.com/office/drawing/2014/main" id="{BA75F1BC-D910-19B2-11C1-1AEAE3EBDEB9}"/>
-                    </a:ext>
-                  </a:extLst>
-                </p:cNvPr>
-                <p:cNvSpPr>
-                  <a:spLocks/>
-                </p:cNvSpPr>
-                <p:nvPr/>
-              </p:nvSpPr>
-              <p:spPr>
-                <a:xfrm>
-                  <a:off x="244827" y="7313550"/>
-                  <a:ext cx="18491684" cy="1194463"/>
-                </a:xfrm>
-                <a:prstGeom prst="roundRect">
-                  <a:avLst/>
-                </a:prstGeom>
-                <a:solidFill>
-                  <a:srgbClr val="E7E1D5"/>
-                </a:solidFill>
-                <a:ln>
-                  <a:noFill/>
-                </a:ln>
-              </p:spPr>
-              <p:style>
-                <a:lnRef idx="2">
-                  <a:schemeClr val="accent1">
-                    <a:shade val="15000"/>
-                  </a:schemeClr>
-                </a:lnRef>
-                <a:fillRef idx="1">
-                  <a:schemeClr val="accent1"/>
-                </a:fillRef>
-                <a:effectRef idx="0">
-                  <a:schemeClr val="accent1"/>
-                </a:effectRef>
-                <a:fontRef idx="minor">
-                  <a:schemeClr val="lt1"/>
-                </a:fontRef>
-              </p:style>
-              <p:txBody>
-                <a:bodyPr rtlCol="0" anchor="t"/>
-                <a:lstStyle/>
-                <a:p>
-                  <a:pPr algn="ctr"/>
-                  <a:r>
-                    <a:rPr lang="fr-FR" sz="5000" dirty="0">
-                      <a:solidFill>
-                        <a:srgbClr val="37322F"/>
-                      </a:solidFill>
-                      <a:latin typeface="Gill Sans Nova" panose="020B0602020104020203" pitchFamily="34" charset="0"/>
-                      <a:cs typeface="Aharoni" panose="020F0502020204030204" pitchFamily="2" charset="-79"/>
-                    </a:rPr>
-                    <a:t>In a </a:t>
-                  </a:r>
-                  <a:r>
-                    <a:rPr lang="fr-FR" sz="5000" dirty="0" err="1">
-                      <a:solidFill>
-                        <a:srgbClr val="37322F"/>
-                      </a:solidFill>
-                      <a:latin typeface="Gill Sans Nova" panose="020B0602020104020203" pitchFamily="34" charset="0"/>
-                      <a:cs typeface="Aharoni" panose="020F0502020204030204" pitchFamily="2" charset="-79"/>
-                    </a:rPr>
-                    <a:t>nutshell</a:t>
-                  </a:r>
-                  <a:r>
-                    <a:rPr lang="fr-FR" sz="5000" dirty="0">
-                      <a:solidFill>
-                        <a:srgbClr val="37322F"/>
-                      </a:solidFill>
-                      <a:latin typeface="Gill Sans Nova" panose="020B0602020104020203" pitchFamily="34" charset="0"/>
-                      <a:cs typeface="Aharoni" panose="020F0502020204030204" pitchFamily="2" charset="-79"/>
-                    </a:rPr>
-                    <a:t> 🥜</a:t>
-                  </a:r>
-                  <a:endParaRPr lang="en-US" sz="5000" dirty="0">
-                    <a:solidFill>
-                      <a:srgbClr val="37322F"/>
-                    </a:solidFill>
-                    <a:latin typeface="Gill Sans Nova" panose="020B0602020104020203" pitchFamily="34" charset="0"/>
-                    <a:cs typeface="Aharoni" panose="020F0502020204030204" pitchFamily="2" charset="-79"/>
-                  </a:endParaRPr>
-                </a:p>
-                <a:p>
-                  <a:pPr algn="ctr"/>
-                  <a:r>
-                    <a:rPr lang="en-US" sz="2000" u="sng" dirty="0">
-                      <a:solidFill>
-                        <a:srgbClr val="37322F"/>
-                      </a:solidFill>
-                      <a:latin typeface="Gill Sans Nova" panose="020B0602020104020203" pitchFamily="34" charset="0"/>
-                      <a:cs typeface="Aharoni" panose="020F0502020204030204" pitchFamily="2" charset="-79"/>
-                    </a:rPr>
-                    <a:t> </a:t>
-                  </a:r>
-                </a:p>
-                <a:p>
-                  <a:r>
-                    <a:rPr lang="en-US" sz="3200" dirty="0">
-                      <a:solidFill>
-                        <a:srgbClr val="37322F"/>
-                      </a:solidFill>
-                      <a:latin typeface="Gill Sans Nova" panose="020B0602020104020203" pitchFamily="34" charset="0"/>
-                      <a:cs typeface="Aharoni" panose="020F0502020204030204" pitchFamily="2" charset="-79"/>
-                    </a:rPr>
-                    <a:t>This thesis proposes an innovative approach, tunable Kernel-Nulling, for high-contrast imaging of exoplanets. Using integrated optics technology with electronically controlled phase shifters, the method asymmetrically modifies the </a:t>
-                  </a:r>
-                  <a:r>
-                    <a:rPr lang="en-US" sz="3200" dirty="0" err="1">
-                      <a:solidFill>
-                        <a:srgbClr val="37322F"/>
-                      </a:solidFill>
-                      <a:latin typeface="Gill Sans Nova" panose="020B0602020104020203" pitchFamily="34" charset="0"/>
-                      <a:cs typeface="Aharoni" panose="020F0502020204030204" pitchFamily="2" charset="-79"/>
-                    </a:rPr>
-                    <a:t>nuller's</a:t>
-                  </a:r>
-                  <a:r>
-                    <a:rPr lang="en-US" sz="3200" dirty="0">
-                      <a:solidFill>
-                        <a:srgbClr val="37322F"/>
-                      </a:solidFill>
-                      <a:latin typeface="Gill Sans Nova" panose="020B0602020104020203" pitchFamily="34" charset="0"/>
-                      <a:cs typeface="Aharoni" panose="020F0502020204030204" pitchFamily="2" charset="-79"/>
-                    </a:rPr>
-                    <a:t> response, allowing the discrimination of astrophysical signals from diffraction-induced speckles. The device's performance optimization involves machine learning techniques, initially in a controlled setting and later in realistic observing conditions. This approach promises to significantly enhance interferometric high-contrast imaging, providing a powerful solution for achieving deep and robust observations.</a:t>
-                  </a:r>
-                  <a:endParaRPr lang="fr-FR" sz="3200" dirty="0">
-                    <a:solidFill>
-                      <a:srgbClr val="37322F"/>
-                    </a:solidFill>
-                    <a:latin typeface="Gill Sans Nova" panose="020B0602020104020203" pitchFamily="34" charset="0"/>
-                    <a:cs typeface="Aharoni" panose="020F0502020204030204" pitchFamily="2" charset="-79"/>
-                  </a:endParaRPr>
-                </a:p>
-              </p:txBody>
-            </p:sp>
-            <p:sp>
-              <p:nvSpPr>
-                <p:cNvPr id="10" name="Rectangle : coins arrondis 9">
-                  <a:extLst>
-                    <a:ext uri="{FF2B5EF4-FFF2-40B4-BE49-F238E27FC236}">
-                      <a16:creationId xmlns:a16="http://schemas.microsoft.com/office/drawing/2014/main" id="{FD7A54F2-9565-2EC1-1F7D-D3CDECC83C71}"/>
-                    </a:ext>
-                  </a:extLst>
-                </p:cNvPr>
-                <p:cNvSpPr>
-                  <a:spLocks/>
-                </p:cNvSpPr>
-                <p:nvPr/>
-              </p:nvSpPr>
-              <p:spPr>
-                <a:xfrm>
-                  <a:off x="9895188" y="8632438"/>
-                  <a:ext cx="9123315" cy="2438467"/>
-                </a:xfrm>
-                <a:prstGeom prst="roundRect">
-                  <a:avLst/>
-                </a:prstGeom>
-                <a:solidFill>
-                  <a:srgbClr val="E7E1D5"/>
-                </a:solidFill>
-                <a:ln>
-                  <a:noFill/>
-                </a:ln>
-              </p:spPr>
-              <p:style>
-                <a:lnRef idx="2">
-                  <a:schemeClr val="accent1">
-                    <a:shade val="15000"/>
-                  </a:schemeClr>
-                </a:lnRef>
-                <a:fillRef idx="1">
-                  <a:schemeClr val="accent1"/>
-                </a:fillRef>
-                <a:effectRef idx="0">
-                  <a:schemeClr val="accent1"/>
-                </a:effectRef>
-                <a:fontRef idx="minor">
-                  <a:schemeClr val="lt1"/>
-                </a:fontRef>
-              </p:style>
-              <p:txBody>
-                <a:bodyPr rtlCol="0" anchor="t"/>
-                <a:lstStyle/>
-                <a:p>
-                  <a:pPr algn="ctr"/>
-                  <a:r>
-                    <a:rPr lang="fr-FR" sz="5000" dirty="0">
-                      <a:solidFill>
-                        <a:srgbClr val="37322F"/>
-                      </a:solidFill>
-                      <a:latin typeface="Gill Sans Nova" panose="020B0602020104020203" pitchFamily="34" charset="0"/>
-                      <a:cs typeface="Aharoni" panose="020F0502020204030204" pitchFamily="2" charset="-79"/>
-                    </a:rPr>
-                    <a:t>Calibration algorithme 🗜️</a:t>
-                  </a:r>
-                  <a:endParaRPr lang="en-US" sz="5000" dirty="0">
-                    <a:solidFill>
-                      <a:srgbClr val="37322F"/>
-                    </a:solidFill>
-                    <a:latin typeface="Gill Sans Nova" panose="020B0602020104020203" pitchFamily="34" charset="0"/>
-                    <a:cs typeface="Aharoni" panose="020F0502020204030204" pitchFamily="2" charset="-79"/>
-                  </a:endParaRPr>
-                </a:p>
-                <a:p>
-                  <a:pPr algn="ctr"/>
-                  <a:r>
-                    <a:rPr lang="en-US" sz="2000" u="sng" dirty="0">
-                      <a:solidFill>
-                        <a:srgbClr val="37322F"/>
-                      </a:solidFill>
-                      <a:latin typeface="Gill Sans Nova" panose="020B0602020104020203" pitchFamily="34" charset="0"/>
-                      <a:cs typeface="Aharoni" panose="020F0502020204030204" pitchFamily="2" charset="-79"/>
-                    </a:rPr>
-                    <a:t> </a:t>
-                  </a:r>
-                </a:p>
-                <a:p>
-                  <a:r>
-                    <a:rPr lang="fr-FR" sz="3200" dirty="0">
-                      <a:solidFill>
-                        <a:srgbClr val="37322F"/>
-                      </a:solidFill>
-                      <a:latin typeface="Gill Sans Nova" panose="020B0602020104020203" pitchFamily="34" charset="0"/>
-                    </a:rPr>
-                    <a:t>Blablabla</a:t>
-                  </a:r>
-                </a:p>
-              </p:txBody>
-            </p:sp>
-            <p:sp>
-              <p:nvSpPr>
-                <p:cNvPr id="11" name="Rectangle : coins arrondis 10">
-                  <a:extLst>
-                    <a:ext uri="{FF2B5EF4-FFF2-40B4-BE49-F238E27FC236}">
-                      <a16:creationId xmlns:a16="http://schemas.microsoft.com/office/drawing/2014/main" id="{395632F7-D70E-F64F-2ABF-901D8A78EC81}"/>
-                    </a:ext>
-                  </a:extLst>
-                </p:cNvPr>
-                <p:cNvSpPr>
-                  <a:spLocks/>
-                </p:cNvSpPr>
-                <p:nvPr/>
-              </p:nvSpPr>
-              <p:spPr>
-                <a:xfrm>
-                  <a:off x="19545548" y="8632438"/>
-                  <a:ext cx="9123315" cy="2161824"/>
-                </a:xfrm>
-                <a:prstGeom prst="roundRect">
-                  <a:avLst/>
-                </a:prstGeom>
-                <a:solidFill>
-                  <a:srgbClr val="E7E1D5"/>
-                </a:solidFill>
-                <a:ln>
-                  <a:noFill/>
-                </a:ln>
-              </p:spPr>
-              <p:style>
-                <a:lnRef idx="2">
-                  <a:schemeClr val="accent1">
-                    <a:shade val="15000"/>
-                  </a:schemeClr>
-                </a:lnRef>
-                <a:fillRef idx="1">
-                  <a:schemeClr val="accent1"/>
-                </a:fillRef>
-                <a:effectRef idx="0">
-                  <a:schemeClr val="accent1"/>
-                </a:effectRef>
-                <a:fontRef idx="minor">
-                  <a:schemeClr val="lt1"/>
-                </a:fontRef>
-              </p:style>
-              <p:txBody>
-                <a:bodyPr rtlCol="0" anchor="t"/>
-                <a:lstStyle/>
-                <a:p>
-                  <a:pPr marL="0" marR="0" lvl="0" indent="0" algn="ctr" defTabSz="457200" rtl="0" eaLnBrk="1" fontAlgn="auto" latinLnBrk="0" hangingPunct="1">
-                    <a:lnSpc>
-                      <a:spcPct val="100000"/>
-                    </a:lnSpc>
-                    <a:spcBef>
-                      <a:spcPts val="0"/>
-                    </a:spcBef>
-                    <a:spcAft>
-                      <a:spcPts val="0"/>
-                    </a:spcAft>
-                    <a:buClrTx/>
-                    <a:buSzTx/>
-                    <a:buFontTx/>
-                    <a:buNone/>
-                    <a:tabLst/>
-                    <a:defRPr/>
-                  </a:pPr>
-                  <a:r>
-                    <a:rPr kumimoji="0" lang="fr-FR" sz="5000" b="0" i="0" u="none" strike="noStrike" kern="1200" cap="none" spc="0" normalizeH="0" baseline="0" noProof="0" dirty="0" err="1">
-                      <a:ln>
-                        <a:noFill/>
-                      </a:ln>
-                      <a:solidFill>
-                        <a:srgbClr val="37322F"/>
-                      </a:solidFill>
-                      <a:effectLst/>
-                      <a:uLnTx/>
-                      <a:uFillTx/>
-                      <a:latin typeface="Gill Sans Nova" panose="020B0602020104020203" pitchFamily="34" charset="0"/>
-                      <a:ea typeface="+mn-ea"/>
-                      <a:cs typeface="Aharoni" panose="020F0502020204030204" pitchFamily="2" charset="-79"/>
-                    </a:rPr>
-                    <a:t>Statistical</a:t>
-                  </a:r>
-                  <a:r>
-                    <a:rPr lang="fr-FR" sz="5000" dirty="0">
-                      <a:solidFill>
-                        <a:srgbClr val="37322F"/>
-                      </a:solidFill>
-                      <a:latin typeface="Gill Sans Nova" panose="020B0602020104020203" pitchFamily="34" charset="0"/>
-                      <a:cs typeface="Aharoni" panose="020F0502020204030204" pitchFamily="2" charset="-79"/>
-                    </a:rPr>
-                    <a:t> </a:t>
-                  </a:r>
-                  <a:r>
-                    <a:rPr lang="fr-FR" sz="5000" dirty="0" err="1">
-                      <a:solidFill>
-                        <a:srgbClr val="37322F"/>
-                      </a:solidFill>
-                      <a:latin typeface="Gill Sans Nova" panose="020B0602020104020203" pitchFamily="34" charset="0"/>
-                      <a:cs typeface="Aharoni" panose="020F0502020204030204" pitchFamily="2" charset="-79"/>
-                    </a:rPr>
-                    <a:t>analysis</a:t>
-                  </a:r>
-                  <a:r>
-                    <a:rPr lang="fr-FR" sz="5000" dirty="0">
-                      <a:solidFill>
-                        <a:srgbClr val="37322F"/>
-                      </a:solidFill>
-                      <a:latin typeface="Gill Sans Nova" panose="020B0602020104020203" pitchFamily="34" charset="0"/>
-                      <a:cs typeface="Aharoni" panose="020F0502020204030204" pitchFamily="2" charset="-79"/>
-                    </a:rPr>
-                    <a:t> 📊</a:t>
-                  </a:r>
-                  <a:endParaRPr kumimoji="0" lang="en-US" sz="5000" b="0" i="0" u="none" strike="noStrike" kern="1200" cap="none" spc="0" normalizeH="0" baseline="0" noProof="0" dirty="0">
-                    <a:ln>
-                      <a:noFill/>
-                    </a:ln>
-                    <a:solidFill>
-                      <a:srgbClr val="37322F"/>
-                    </a:solidFill>
-                    <a:effectLst/>
-                    <a:uLnTx/>
-                    <a:uFillTx/>
-                    <a:latin typeface="Gill Sans Nova" panose="020B0602020104020203" pitchFamily="34" charset="0"/>
-                    <a:ea typeface="+mn-ea"/>
-                    <a:cs typeface="Aharoni" panose="020F0502020204030204" pitchFamily="2" charset="-79"/>
-                  </a:endParaRPr>
-                </a:p>
-                <a:p>
-                  <a:pPr marL="0" marR="0" lvl="0" indent="0" algn="ctr" defTabSz="457200" rtl="0" eaLnBrk="1" fontAlgn="auto" latinLnBrk="0" hangingPunct="1">
-                    <a:lnSpc>
-                      <a:spcPct val="100000"/>
-                    </a:lnSpc>
-                    <a:spcBef>
-                      <a:spcPts val="0"/>
-                    </a:spcBef>
-                    <a:spcAft>
-                      <a:spcPts val="0"/>
-                    </a:spcAft>
-                    <a:buClrTx/>
-                    <a:buSzTx/>
-                    <a:buFontTx/>
-                    <a:buNone/>
-                    <a:tabLst/>
-                    <a:defRPr/>
-                  </a:pPr>
-                  <a:r>
-                    <a:rPr kumimoji="0" lang="en-US" sz="2000" b="0" i="0" u="sng" strike="noStrike" kern="1200" cap="none" spc="0" normalizeH="0" baseline="0" noProof="0" dirty="0">
-                      <a:ln>
-                        <a:noFill/>
-                      </a:ln>
-                      <a:solidFill>
-                        <a:srgbClr val="37322F"/>
-                      </a:solidFill>
-                      <a:effectLst/>
-                      <a:uLnTx/>
-                      <a:uFillTx/>
-                      <a:latin typeface="Gill Sans Nova" panose="020B0602020104020203" pitchFamily="34" charset="0"/>
-                      <a:ea typeface="+mn-ea"/>
-                      <a:cs typeface="Aharoni" panose="020F0502020204030204" pitchFamily="2" charset="-79"/>
-                    </a:rPr>
-                    <a:t> </a:t>
-                  </a:r>
-                </a:p>
-                <a:p>
-                  <a:pPr marL="0" marR="0" lvl="0" indent="0" algn="l" defTabSz="457200" rtl="0" eaLnBrk="1" fontAlgn="auto" latinLnBrk="0" hangingPunct="1">
-                    <a:lnSpc>
-                      <a:spcPct val="100000"/>
-                    </a:lnSpc>
-                    <a:spcBef>
-                      <a:spcPts val="0"/>
-                    </a:spcBef>
-                    <a:spcAft>
-                      <a:spcPts val="0"/>
-                    </a:spcAft>
-                    <a:buClrTx/>
-                    <a:buSzTx/>
-                    <a:buFontTx/>
-                    <a:buNone/>
-                    <a:tabLst/>
-                    <a:defRPr/>
-                  </a:pPr>
-                  <a:r>
-                    <a:rPr kumimoji="0" lang="fr-FR" sz="3200" b="0" i="0" u="none" strike="noStrike" kern="1200" cap="none" spc="0" normalizeH="0" baseline="0" noProof="0" dirty="0">
-                      <a:ln>
-                        <a:noFill/>
-                      </a:ln>
-                      <a:solidFill>
-                        <a:srgbClr val="37322F"/>
-                      </a:solidFill>
-                      <a:effectLst/>
-                      <a:uLnTx/>
-                      <a:uFillTx/>
-                      <a:latin typeface="Gill Sans Nova" panose="020B0602020104020203" pitchFamily="34" charset="0"/>
-                      <a:ea typeface="+mn-ea"/>
-                      <a:cs typeface="+mn-cs"/>
-                    </a:rPr>
-                    <a:t>Blablabla</a:t>
-                  </a:r>
-                </a:p>
-                <a:p>
-                  <a:pPr algn="ctr"/>
-                  <a:endParaRPr lang="fr-FR" dirty="0">
-                    <a:solidFill>
-                      <a:srgbClr val="37322F"/>
-                    </a:solidFill>
-                  </a:endParaRPr>
-                </a:p>
-              </p:txBody>
-            </p:sp>
-          </p:grpSp>
-          <p:sp>
-            <p:nvSpPr>
-              <p:cNvPr id="13" name="Rectangle : coins arrondis 12">
-                <a:extLst>
-                  <a:ext uri="{FF2B5EF4-FFF2-40B4-BE49-F238E27FC236}">
-                    <a16:creationId xmlns:a16="http://schemas.microsoft.com/office/drawing/2014/main" id="{B059752F-38D7-9C85-94E8-6DE3EEBE5976}"/>
-                  </a:ext>
-                </a:extLst>
-              </p:cNvPr>
-              <p:cNvSpPr>
-                <a:spLocks/>
-              </p:cNvSpPr>
-              <p:nvPr/>
-            </p:nvSpPr>
-            <p:spPr>
-              <a:xfrm>
-                <a:off x="522107" y="12955368"/>
-                <a:ext cx="10064094" cy="10636081"/>
-              </a:xfrm>
-              <a:prstGeom prst="roundRect">
-                <a:avLst/>
-              </a:prstGeom>
-              <a:solidFill>
-                <a:srgbClr val="E7E1D5"/>
-              </a:solidFill>
-              <a:ln>
-                <a:noFill/>
-              </a:ln>
-            </p:spPr>
-            <p:style>
-              <a:lnRef idx="2">
-                <a:schemeClr val="accent1">
-                  <a:shade val="15000"/>
-                </a:schemeClr>
-              </a:lnRef>
-              <a:fillRef idx="1">
-                <a:schemeClr val="accent1"/>
-              </a:fillRef>
-              <a:effectRef idx="0">
-                <a:schemeClr val="accent1"/>
-              </a:effectRef>
-              <a:fontRef idx="minor">
-                <a:schemeClr val="lt1"/>
-              </a:fontRef>
-            </p:style>
-            <p:txBody>
-              <a:bodyPr rtlCol="0" anchor="t"/>
-              <a:lstStyle/>
-              <a:p>
-                <a:pPr marL="0" marR="0" lvl="0" indent="0" algn="ctr" defTabSz="457200" rtl="0" eaLnBrk="1" fontAlgn="auto" latinLnBrk="0" hangingPunct="1">
-                  <a:lnSpc>
-                    <a:spcPct val="100000"/>
-                  </a:lnSpc>
-                  <a:spcBef>
-                    <a:spcPts val="0"/>
-                  </a:spcBef>
-                  <a:spcAft>
-                    <a:spcPts val="0"/>
-                  </a:spcAft>
-                  <a:buClrTx/>
-                  <a:buSzTx/>
-                  <a:buFontTx/>
-                  <a:buNone/>
-                  <a:tabLst/>
-                  <a:defRPr/>
-                </a:pPr>
-                <a:r>
-                  <a:rPr kumimoji="0" lang="en-US" sz="5000" b="0" i="0" u="none" strike="noStrike" kern="1200" cap="none" spc="0" normalizeH="0" baseline="0" noProof="0" dirty="0" err="1">
-                    <a:ln>
-                      <a:noFill/>
-                    </a:ln>
-                    <a:solidFill>
-                      <a:srgbClr val="37322F"/>
-                    </a:solidFill>
-                    <a:effectLst/>
-                    <a:uLnTx/>
-                    <a:uFillTx/>
-                    <a:latin typeface="Gill Sans Nova" panose="020B0602020104020203" pitchFamily="34" charset="0"/>
-                    <a:ea typeface="+mn-ea"/>
-                    <a:cs typeface="Aharoni" panose="020F0502020204030204" pitchFamily="2" charset="-79"/>
-                  </a:rPr>
-                  <a:t>Nullin</a:t>
-                </a:r>
-                <a:r>
-                  <a:rPr lang="en-US" sz="5000" dirty="0">
-                    <a:solidFill>
-                      <a:srgbClr val="37322F"/>
-                    </a:solidFill>
-                    <a:latin typeface="Gill Sans Nova" panose="020B0602020104020203" pitchFamily="34" charset="0"/>
-                    <a:cs typeface="Aharoni" panose="020F0502020204030204" pitchFamily="2" charset="-79"/>
-                  </a:rPr>
-                  <a:t>g interferometry </a:t>
-                </a:r>
-                <a:r>
-                  <a:rPr lang="fr-FR" sz="5000" dirty="0">
-                    <a:solidFill>
-                      <a:srgbClr val="37322F"/>
-                    </a:solidFill>
-                    <a:latin typeface="Gill Sans Nova" panose="020B0602020104020203" pitchFamily="34" charset="0"/>
-                    <a:cs typeface="Aharoni" panose="020F0502020204030204" pitchFamily="2" charset="-79"/>
-                  </a:rPr>
-                  <a:t>〰️</a:t>
-                </a:r>
-                <a:endParaRPr kumimoji="0" lang="en-US" sz="5000" b="0" i="0" u="none" strike="noStrike" kern="1200" cap="none" spc="0" normalizeH="0" baseline="0" noProof="0" dirty="0">
-                  <a:ln>
-                    <a:noFill/>
-                  </a:ln>
-                  <a:solidFill>
-                    <a:srgbClr val="37322F"/>
-                  </a:solidFill>
-                  <a:effectLst/>
-                  <a:uLnTx/>
-                  <a:uFillTx/>
-                  <a:latin typeface="Gill Sans Nova" panose="020B0602020104020203" pitchFamily="34" charset="0"/>
-                  <a:ea typeface="+mn-ea"/>
-                  <a:cs typeface="Aharoni" panose="020F0502020204030204" pitchFamily="2" charset="-79"/>
-                </a:endParaRPr>
-              </a:p>
-              <a:p>
-                <a:pPr marL="0" marR="0" lvl="0" indent="0" algn="ctr" defTabSz="457200" rtl="0" eaLnBrk="1" fontAlgn="auto" latinLnBrk="0" hangingPunct="1">
-                  <a:lnSpc>
-                    <a:spcPct val="100000"/>
-                  </a:lnSpc>
-                  <a:spcBef>
-                    <a:spcPts val="0"/>
-                  </a:spcBef>
-                  <a:spcAft>
-                    <a:spcPts val="0"/>
-                  </a:spcAft>
-                  <a:buClrTx/>
-                  <a:buSzTx/>
-                  <a:buFontTx/>
-                  <a:buNone/>
-                  <a:tabLst/>
-                  <a:defRPr/>
-                </a:pPr>
-                <a:r>
-                  <a:rPr kumimoji="0" lang="en-US" sz="2000" b="0" i="0" u="sng" strike="noStrike" kern="1200" cap="none" spc="0" normalizeH="0" baseline="0" noProof="0" dirty="0">
-                    <a:ln>
-                      <a:noFill/>
-                    </a:ln>
-                    <a:solidFill>
-                      <a:srgbClr val="37322F"/>
-                    </a:solidFill>
-                    <a:effectLst/>
-                    <a:uLnTx/>
-                    <a:uFillTx/>
-                    <a:latin typeface="Gill Sans Nova" panose="020B0602020104020203" pitchFamily="34" charset="0"/>
-                    <a:ea typeface="+mn-ea"/>
-                    <a:cs typeface="Aharoni" panose="020F0502020204030204" pitchFamily="2" charset="-79"/>
-                  </a:rPr>
-                  <a:t> </a:t>
-                </a:r>
-              </a:p>
-              <a:p>
-                <a:pPr marL="0" marR="0" lvl="0" indent="0" algn="l" defTabSz="457200" rtl="0" eaLnBrk="1" fontAlgn="auto" latinLnBrk="0" hangingPunct="1">
-                  <a:lnSpc>
-                    <a:spcPct val="100000"/>
-                  </a:lnSpc>
-                  <a:spcBef>
-                    <a:spcPts val="0"/>
-                  </a:spcBef>
-                  <a:spcAft>
-                    <a:spcPts val="0"/>
-                  </a:spcAft>
-                  <a:buClrTx/>
-                  <a:buSzTx/>
-                  <a:buFontTx/>
-                  <a:buNone/>
-                  <a:tabLst/>
-                  <a:defRPr/>
-                </a:pPr>
-                <a:r>
-                  <a:rPr kumimoji="0" lang="fr-FR" sz="3200" b="0" i="0" u="none" strike="noStrike" kern="1200" cap="none" spc="0" normalizeH="0" baseline="0" noProof="0" dirty="0">
-                    <a:ln>
-                      <a:noFill/>
-                    </a:ln>
-                    <a:solidFill>
-                      <a:srgbClr val="37322F"/>
-                    </a:solidFill>
-                    <a:effectLst/>
-                    <a:uLnTx/>
-                    <a:uFillTx/>
-                    <a:latin typeface="Gill Sans Nova" panose="020B0602020104020203" pitchFamily="34" charset="0"/>
-                    <a:ea typeface="+mn-ea"/>
-                    <a:cs typeface="+mn-cs"/>
-                  </a:rPr>
-                  <a:t>Blablabla</a:t>
-                </a:r>
-              </a:p>
-              <a:p>
-                <a:pPr marL="0" marR="0" lvl="0" indent="0" algn="ctr" defTabSz="457200" rtl="0" eaLnBrk="1" fontAlgn="auto" latinLnBrk="0" hangingPunct="1">
-                  <a:lnSpc>
-                    <a:spcPct val="100000"/>
-                  </a:lnSpc>
-                  <a:spcBef>
-                    <a:spcPts val="0"/>
-                  </a:spcBef>
-                  <a:spcAft>
-                    <a:spcPts val="0"/>
-                  </a:spcAft>
-                  <a:buClrTx/>
-                  <a:buSzTx/>
-                  <a:buFontTx/>
-                  <a:buNone/>
-                  <a:tabLst/>
-                  <a:defRPr/>
-                </a:pPr>
-                <a:endParaRPr kumimoji="0" lang="fr-FR" sz="1800" b="0" i="0" u="none" strike="noStrike" kern="1200" cap="none" spc="0" normalizeH="0" baseline="0" noProof="0" dirty="0">
-                  <a:ln>
-                    <a:noFill/>
-                  </a:ln>
-                  <a:solidFill>
-                    <a:srgbClr val="37322F"/>
-                  </a:solidFill>
-                  <a:effectLst/>
-                  <a:uLnTx/>
-                  <a:uFillTx/>
-                  <a:latin typeface="Aptos" panose="02110004020202020204"/>
-                  <a:ea typeface="+mn-ea"/>
-                  <a:cs typeface="+mn-cs"/>
-                </a:endParaRPr>
-              </a:p>
-            </p:txBody>
-          </p:sp>
-        </p:grpSp>
-        <p:sp>
-          <p:nvSpPr>
-            <p:cNvPr id="31" name="Rectangle : coins arrondis 30">
-              <a:extLst>
-                <a:ext uri="{FF2B5EF4-FFF2-40B4-BE49-F238E27FC236}">
-                  <a16:creationId xmlns:a16="http://schemas.microsoft.com/office/drawing/2014/main" id="{171044C3-C700-576A-44E0-693B31CE2359}"/>
+                  <a16:creationId xmlns:a16="http://schemas.microsoft.com/office/drawing/2014/main" id="{77411863-3506-4DE1-3C72-54B665E02689}"/>
                 </a:ext>
               </a:extLst>
             </p:cNvPr>
@@ -4559,11 +5556,13 @@
           </p:nvSpPr>
           <p:spPr>
             <a:xfrm>
-              <a:off x="21733428" y="23838065"/>
-              <a:ext cx="10064094" cy="12047086"/>
+              <a:off x="442451" y="36388296"/>
+              <a:ext cx="15535281" cy="6340396"/>
             </a:xfrm>
             <a:prstGeom prst="roundRect">
-              <a:avLst/>
+              <a:avLst>
+                <a:gd name="adj" fmla="val 23228"/>
+              </a:avLst>
             </a:prstGeom>
             <a:solidFill>
               <a:srgbClr val="E7E1D5"/>
@@ -4610,7 +5609,59 @@
                 <a:defRPr/>
               </a:pPr>
               <a:r>
-                <a:rPr kumimoji="0" lang="en-US" sz="5000" b="0" i="0" u="none" strike="noStrike" kern="1200" cap="none" spc="0" normalizeH="0" baseline="0" noProof="0" dirty="0">
+                <a:rPr lang="en-US" sz="4800" dirty="0">
+                  <a:solidFill>
+                    <a:srgbClr val="37322F"/>
+                  </a:solidFill>
+                  <a:latin typeface="Congenial SemiBold" panose="02000503040000020004" pitchFamily="2" charset="0"/>
+                  <a:cs typeface="Aharoni" panose="020F0502020204030204" pitchFamily="2" charset="-79"/>
+                </a:rPr>
+                <a:t>References </a:t>
+              </a:r>
+              <a:r>
+                <a:rPr lang="fr-FR" sz="4800" dirty="0">
+                  <a:solidFill>
+                    <a:srgbClr val="37322F"/>
+                  </a:solidFill>
+                  <a:latin typeface="Congenial SemiBold" panose="02000503040000020004" pitchFamily="2" charset="0"/>
+                  <a:cs typeface="Aharoni" panose="020F0502020204030204" pitchFamily="2" charset="-79"/>
+                </a:rPr>
+                <a:t>📜</a:t>
+              </a:r>
+              <a:endParaRPr kumimoji="0" lang="en-US" sz="4800" b="0" i="0" u="none" strike="noStrike" kern="1200" cap="none" spc="0" normalizeH="0" baseline="0" noProof="0" dirty="0">
+                <a:ln>
+                  <a:noFill/>
+                </a:ln>
+                <a:solidFill>
+                  <a:srgbClr val="37322F"/>
+                </a:solidFill>
+                <a:effectLst/>
+                <a:uLnTx/>
+                <a:uFillTx/>
+                <a:latin typeface="Congenial SemiBold" panose="02000503040000020004" pitchFamily="2" charset="0"/>
+                <a:cs typeface="Aharoni" panose="020F0502020204030204" pitchFamily="2" charset="-79"/>
+              </a:endParaRPr>
+            </a:p>
+            <a:p>
+              <a:pPr marL="0" marR="0" lvl="0" indent="0" algn="ctr" defTabSz="457200" rtl="0" eaLnBrk="1" fontAlgn="auto" latinLnBrk="0" hangingPunct="1">
+                <a:lnSpc>
+                  <a:spcPct val="100000"/>
+                </a:lnSpc>
+                <a:spcBef>
+                  <a:spcPts val="0"/>
+                </a:spcBef>
+                <a:spcAft>
+                  <a:spcPts val="0"/>
+                </a:spcAft>
+                <a:buClrTx/>
+                <a:buSzTx/>
+                <a:buFontTx/>
+                <a:buNone/>
+                <a:tabLst/>
+                <a:defRPr/>
+              </a:pPr>
+              <a:r>
+                <a:rPr kumimoji="0" lang="en-US" sz="2000" b="0" i="0" u="sng" strike="noStrike" kern="1200" cap="none" spc="0" normalizeH="0" baseline="0" noProof="0" dirty="0">
                   <a:ln>
                     <a:noFill/>
                   </a:ln>
@@ -4624,10 +5675,29 @@
                   <a:ea typeface="+mn-ea"/>
                   <a:cs typeface="Aharoni" panose="020F0502020204030204" pitchFamily="2" charset="-79"/>
                 </a:rPr>
-                <a:t>Discussions &amp; prospects </a:t>
+                <a:t> </a:t>
               </a:r>
+            </a:p>
+            <a:p>
+              <a:pPr marL="0" marR="0" lvl="0" indent="0" algn="l" defTabSz="457200" rtl="0" eaLnBrk="1" fontAlgn="auto" latinLnBrk="0" hangingPunct="1">
+                <a:lnSpc>
+                  <a:spcPct val="100000"/>
+                </a:lnSpc>
+                <a:spcBef>
+                  <a:spcPts val="0"/>
+                </a:spcBef>
+                <a:spcAft>
+                  <a:spcPts val="0"/>
+                </a:spcAft>
+                <a:buClrTx/>
+                <a:buSzTx/>
+                <a:buFontTx/>
+                <a:buNone/>
+                <a:tabLst/>
+                <a:defRPr/>
+              </a:pPr>
               <a:r>
-                <a:rPr kumimoji="0" lang="fr-FR" sz="5000" b="0" i="0" u="none" strike="noStrike" kern="1200" cap="none" spc="0" normalizeH="0" baseline="0" noProof="0" dirty="0">
+                <a:rPr kumimoji="0" lang="fr-FR" sz="3200" b="0" i="0" u="none" strike="noStrike" kern="1200" cap="none" spc="0" normalizeH="0" baseline="0" noProof="0" dirty="0">
                   <a:ln>
                     <a:noFill/>
                   </a:ln>
@@ -4639,11 +5709,107 @@
                   <a:uFillTx/>
                   <a:latin typeface="Gill Sans Nova" panose="020B0602020104020203" pitchFamily="34" charset="0"/>
                   <a:ea typeface="+mn-ea"/>
+                  <a:cs typeface="+mn-cs"/>
+                </a:rPr>
+                <a:t>Blablabla</a:t>
+              </a:r>
+              <a:endParaRPr lang="fr-FR" dirty="0">
+                <a:solidFill>
+                  <a:srgbClr val="37322F"/>
+                </a:solidFill>
+              </a:endParaRPr>
+            </a:p>
+          </p:txBody>
+        </p:sp>
+        <p:sp>
+          <p:nvSpPr>
+            <p:cNvPr id="32" name="Rectangle : coins arrondis 31">
+              <a:extLst>
+                <a:ext uri="{FF2B5EF4-FFF2-40B4-BE49-F238E27FC236}">
+                  <a16:creationId xmlns:a16="http://schemas.microsoft.com/office/drawing/2014/main" id="{9C405201-1ED0-8A8B-AD7B-C7F7B5940E71}"/>
+                </a:ext>
+              </a:extLst>
+            </p:cNvPr>
+            <p:cNvSpPr>
+              <a:spLocks/>
+            </p:cNvSpPr>
+            <p:nvPr/>
+          </p:nvSpPr>
+          <p:spPr>
+            <a:xfrm>
+              <a:off x="16421557" y="36388295"/>
+              <a:ext cx="15375965" cy="6340395"/>
+            </a:xfrm>
+            <a:prstGeom prst="roundRect">
+              <a:avLst>
+                <a:gd name="adj" fmla="val 21916"/>
+              </a:avLst>
+            </a:prstGeom>
+            <a:solidFill>
+              <a:srgbClr val="E7E1D5"/>
+            </a:solidFill>
+            <a:ln>
+              <a:noFill/>
+            </a:ln>
+          </p:spPr>
+          <p:style>
+            <a:lnRef idx="2">
+              <a:schemeClr val="accent1">
+                <a:shade val="15000"/>
+              </a:schemeClr>
+            </a:lnRef>
+            <a:fillRef idx="1">
+              <a:schemeClr val="accent1"/>
+            </a:fillRef>
+            <a:effectRef idx="0">
+              <a:schemeClr val="accent1"/>
+            </a:effectRef>
+            <a:fontRef idx="minor">
+              <a:schemeClr val="lt1"/>
+            </a:fontRef>
+          </p:style>
+          <p:txBody>
+            <a:bodyPr rtlCol="0" anchor="t"/>
+            <a:lstStyle/>
+            <a:p>
+              <a:pPr marL="0" marR="0" lvl="0" indent="0" algn="ctr" defTabSz="457200" rtl="0" eaLnBrk="1" fontAlgn="auto" latinLnBrk="0" hangingPunct="1">
+                <a:lnSpc>
+                  <a:spcPct val="100000"/>
+                </a:lnSpc>
+                <a:spcBef>
+                  <a:spcPts val="0"/>
+                </a:spcBef>
+                <a:spcAft>
+                  <a:spcPts val="0"/>
+                </a:spcAft>
+                <a:buClrTx/>
+                <a:buSzTx/>
+                <a:buFontTx/>
+                <a:buNone/>
+                <a:tabLst/>
+                <a:defRPr/>
+              </a:pPr>
+              <a:r>
+                <a:rPr lang="en-US" sz="4800" dirty="0">
+                  <a:solidFill>
+                    <a:srgbClr val="37322F"/>
+                  </a:solidFill>
+                  <a:latin typeface="Congenial SemiBold" panose="02000503040000020004" pitchFamily="2" charset="0"/>
                   <a:cs typeface="Aharoni" panose="020F0502020204030204" pitchFamily="2" charset="-79"/>
                 </a:rPr>
-                <a:t>💬</a:t>
+                <a:t>Acknowledgment </a:t>
               </a:r>
-              <a:endParaRPr kumimoji="0" lang="en-US" sz="5000" b="0" i="0" u="none" strike="noStrike" kern="1200" cap="none" spc="0" normalizeH="0" baseline="0" noProof="0" dirty="0">
+              <a:r>
+                <a:rPr lang="fr-FR" sz="4800" dirty="0">
+                  <a:solidFill>
+                    <a:srgbClr val="37322F"/>
+                  </a:solidFill>
+                  <a:latin typeface="Congenial SemiBold" panose="02000503040000020004" pitchFamily="2" charset="0"/>
+                  <a:cs typeface="Aharoni" panose="020F0502020204030204" pitchFamily="2" charset="-79"/>
+                </a:rPr>
+                <a:t>🤝</a:t>
+              </a:r>
+              <a:endParaRPr kumimoji="0" lang="en-US" sz="4800" b="0" i="0" u="none" strike="noStrike" kern="1200" cap="none" spc="0" normalizeH="0" baseline="0" noProof="0" dirty="0">
                 <a:ln>
                   <a:noFill/>
                 </a:ln>
@@ -4653,8 +5819,7 @@
                 <a:effectLst/>
                 <a:uLnTx/>
                 <a:uFillTx/>
-                <a:latin typeface="Gill Sans Nova" panose="020B0602020104020203" pitchFamily="34" charset="0"/>
-                <a:ea typeface="+mn-ea"/>
+                <a:latin typeface="Congenial SemiBold" panose="02000503040000020004" pitchFamily="2" charset="0"/>
                 <a:cs typeface="Aharoni" panose="020F0502020204030204" pitchFamily="2" charset="-79"/>
               </a:endParaRPr>
             </a:p>
@@ -4731,7 +5896,7 @@
               </a:r>
             </a:p>
             <a:p>
-              <a:pPr marL="0" marR="0" lvl="0" indent="0" algn="ctr" defTabSz="457200" rtl="0" eaLnBrk="1" fontAlgn="auto" latinLnBrk="0" hangingPunct="1">
+              <a:pPr marL="0" marR="0" lvl="0" indent="0" algn="l" defTabSz="457200" rtl="0" eaLnBrk="1" fontAlgn="auto" latinLnBrk="0" hangingPunct="1">
                 <a:lnSpc>
                   <a:spcPct val="100000"/>
                 </a:lnSpc>
@@ -4748,180 +5913,12 @@
                 <a:tabLst/>
                 <a:defRPr/>
               </a:pPr>
-              <a:endParaRPr kumimoji="0" lang="fr-FR" sz="1800" b="0" i="0" u="none" strike="noStrike" kern="1200" cap="none" spc="0" normalizeH="0" baseline="0" noProof="0" dirty="0">
-                <a:ln>
-                  <a:noFill/>
-                </a:ln>
+              <a:endParaRPr lang="fr-FR" sz="3200" dirty="0">
                 <a:solidFill>
                   <a:srgbClr val="37322F"/>
                 </a:solidFill>
-                <a:effectLst/>
-                <a:uLnTx/>
-                <a:uFillTx/>
-                <a:latin typeface="Aptos" panose="02110004020202020204"/>
-                <a:ea typeface="+mn-ea"/>
-                <a:cs typeface="+mn-cs"/>
+                <a:latin typeface="Gill Sans Nova" panose="020B0602020104020203" pitchFamily="34" charset="0"/>
               </a:endParaRPr>
-            </a:p>
-          </p:txBody>
-        </p:sp>
-      </p:grpSp>
-      <p:grpSp>
-        <p:nvGrpSpPr>
-          <p:cNvPr id="33" name="Groupe 32">
-            <a:extLst>
-              <a:ext uri="{FF2B5EF4-FFF2-40B4-BE49-F238E27FC236}">
-                <a16:creationId xmlns:a16="http://schemas.microsoft.com/office/drawing/2014/main" id="{8F24D38F-CDFC-7E8D-4949-BD64235E6CE8}"/>
-              </a:ext>
-            </a:extLst>
-          </p:cNvPr>
-          <p:cNvGrpSpPr/>
-          <p:nvPr/>
-        </p:nvGrpSpPr>
-        <p:grpSpPr>
-          <a:xfrm>
-            <a:off x="442451" y="36388295"/>
-            <a:ext cx="31355071" cy="6340397"/>
-            <a:chOff x="442451" y="36388295"/>
-            <a:chExt cx="31355071" cy="6340397"/>
-          </a:xfrm>
-        </p:grpSpPr>
-        <p:sp>
-          <p:nvSpPr>
-            <p:cNvPr id="30" name="Rectangle : coins arrondis 29">
-              <a:extLst>
-                <a:ext uri="{FF2B5EF4-FFF2-40B4-BE49-F238E27FC236}">
-                  <a16:creationId xmlns:a16="http://schemas.microsoft.com/office/drawing/2014/main" id="{77411863-3506-4DE1-3C72-54B665E02689}"/>
-                </a:ext>
-              </a:extLst>
-            </p:cNvPr>
-            <p:cNvSpPr>
-              <a:spLocks/>
-            </p:cNvSpPr>
-            <p:nvPr/>
-          </p:nvSpPr>
-          <p:spPr>
-            <a:xfrm>
-              <a:off x="442451" y="36388296"/>
-              <a:ext cx="15535281" cy="6340396"/>
-            </a:xfrm>
-            <a:prstGeom prst="roundRect">
-              <a:avLst/>
-            </a:prstGeom>
-            <a:solidFill>
-              <a:srgbClr val="E7E1D5"/>
-            </a:solidFill>
-            <a:ln>
-              <a:noFill/>
-            </a:ln>
-          </p:spPr>
-          <p:style>
-            <a:lnRef idx="2">
-              <a:schemeClr val="accent1">
-                <a:shade val="15000"/>
-              </a:schemeClr>
-            </a:lnRef>
-            <a:fillRef idx="1">
-              <a:schemeClr val="accent1"/>
-            </a:fillRef>
-            <a:effectRef idx="0">
-              <a:schemeClr val="accent1"/>
-            </a:effectRef>
-            <a:fontRef idx="minor">
-              <a:schemeClr val="lt1"/>
-            </a:fontRef>
-          </p:style>
-          <p:txBody>
-            <a:bodyPr rtlCol="0" anchor="t"/>
-            <a:lstStyle/>
-            <a:p>
-              <a:pPr marL="0" marR="0" lvl="0" indent="0" algn="ctr" defTabSz="457200" rtl="0" eaLnBrk="1" fontAlgn="auto" latinLnBrk="0" hangingPunct="1">
-                <a:lnSpc>
-                  <a:spcPct val="100000"/>
-                </a:lnSpc>
-                <a:spcBef>
-                  <a:spcPts val="0"/>
-                </a:spcBef>
-                <a:spcAft>
-                  <a:spcPts val="0"/>
-                </a:spcAft>
-                <a:buClrTx/>
-                <a:buSzTx/>
-                <a:buFontTx/>
-                <a:buNone/>
-                <a:tabLst/>
-                <a:defRPr/>
-              </a:pPr>
-              <a:r>
-                <a:rPr lang="en-US" sz="5000" dirty="0">
-                  <a:solidFill>
-                    <a:srgbClr val="37322F"/>
-                  </a:solidFill>
-                  <a:latin typeface="Gill Sans Nova" panose="020B0602020104020203" pitchFamily="34" charset="0"/>
-                  <a:cs typeface="Aharoni" panose="020F0502020204030204" pitchFamily="2" charset="-79"/>
-                </a:rPr>
-                <a:t>References </a:t>
-              </a:r>
-              <a:r>
-                <a:rPr lang="fr-FR" sz="5000" dirty="0">
-                  <a:solidFill>
-                    <a:srgbClr val="37322F"/>
-                  </a:solidFill>
-                  <a:latin typeface="Gill Sans Nova" panose="020B0602020104020203" pitchFamily="34" charset="0"/>
-                  <a:cs typeface="Aharoni" panose="020F0502020204030204" pitchFamily="2" charset="-79"/>
-                </a:rPr>
-                <a:t>📜</a:t>
-              </a:r>
-              <a:endParaRPr kumimoji="0" lang="en-US" sz="5000" b="0" i="0" u="none" strike="noStrike" kern="1200" cap="none" spc="0" normalizeH="0" baseline="0" noProof="0" dirty="0">
-                <a:ln>
-                  <a:noFill/>
-                </a:ln>
-                <a:solidFill>
-                  <a:srgbClr val="37322F"/>
-                </a:solidFill>
-                <a:effectLst/>
-                <a:uLnTx/>
-                <a:uFillTx/>
-                <a:latin typeface="Gill Sans Nova" panose="020B0602020104020203" pitchFamily="34" charset="0"/>
-                <a:ea typeface="+mn-ea"/>
-                <a:cs typeface="Aharoni" panose="020F0502020204030204" pitchFamily="2" charset="-79"/>
-              </a:endParaRPr>
-            </a:p>
-            <a:p>
-              <a:pPr marL="0" marR="0" lvl="0" indent="0" algn="ctr" defTabSz="457200" rtl="0" eaLnBrk="1" fontAlgn="auto" latinLnBrk="0" hangingPunct="1">
-                <a:lnSpc>
-                  <a:spcPct val="100000"/>
-                </a:lnSpc>
-                <a:spcBef>
-                  <a:spcPts val="0"/>
-                </a:spcBef>
-                <a:spcAft>
-                  <a:spcPts val="0"/>
-                </a:spcAft>
-                <a:buClrTx/>
-                <a:buSzTx/>
-                <a:buFontTx/>
-                <a:buNone/>
-                <a:tabLst/>
-                <a:defRPr/>
-              </a:pPr>
-              <a:r>
-                <a:rPr kumimoji="0" lang="en-US" sz="2000" b="0" i="0" u="sng" strike="noStrike" kern="1200" cap="none" spc="0" normalizeH="0" baseline="0" noProof="0" dirty="0">
-                  <a:ln>
-                    <a:noFill/>
-                  </a:ln>
-                  <a:solidFill>
-                    <a:srgbClr val="37322F"/>
-                  </a:solidFill>
-                  <a:effectLst/>
-                  <a:uLnTx/>
-                  <a:uFillTx/>
-                  <a:latin typeface="Gill Sans Nova" panose="020B0602020104020203" pitchFamily="34" charset="0"/>
-                  <a:ea typeface="+mn-ea"/>
-                  <a:cs typeface="Aharoni" panose="020F0502020204030204" pitchFamily="2" charset="-79"/>
-                </a:rPr>
-                <a:t> </a:t>
-              </a:r>
             </a:p>
             <a:p>
               <a:pPr marL="0" marR="0" lvl="0" indent="0" algn="l" defTabSz="457200" rtl="0" eaLnBrk="1" fontAlgn="auto" latinLnBrk="0" hangingPunct="1">
@@ -4956,27 +5953,8 @@
                   <a:ea typeface="+mn-ea"/>
                   <a:cs typeface="+mn-cs"/>
                 </a:rPr>
-                <a:t>Blablabla</a:t>
+                <a:t>Financement projet PHOTONICS</a:t>
               </a:r>
-            </a:p>
-            <a:p>
-              <a:pPr marL="0" marR="0" lvl="0" indent="0" algn="ctr" defTabSz="457200" rtl="0" eaLnBrk="1" fontAlgn="auto" latinLnBrk="0" hangingPunct="1">
-                <a:lnSpc>
-                  <a:spcPct val="100000"/>
-                </a:lnSpc>
-                <a:spcBef>
-                  <a:spcPts val="0"/>
-                </a:spcBef>
-                <a:spcAft>
-                  <a:spcPts val="0"/>
-                </a:spcAft>
-                <a:buClrTx/>
-                <a:buSzTx/>
-                <a:buFontTx/>
-                <a:buNone/>
-                <a:tabLst/>
-                <a:defRPr/>
-              </a:pPr>
               <a:endParaRPr kumimoji="0" lang="fr-FR" sz="1800" b="0" i="0" u="none" strike="noStrike" kern="1200" cap="none" spc="0" normalizeH="0" baseline="0" noProof="0" dirty="0">
                 <a:ln>
                   <a:noFill/>
@@ -4990,230 +5968,6 @@
                 <a:latin typeface="Aptos" panose="02110004020202020204"/>
                 <a:ea typeface="+mn-ea"/>
                 <a:cs typeface="+mn-cs"/>
-              </a:endParaRPr>
-            </a:p>
-            <a:p>
-              <a:pPr algn="ctr"/>
-              <a:endParaRPr lang="fr-FR" dirty="0">
-                <a:solidFill>
-                  <a:srgbClr val="37322F"/>
-                </a:solidFill>
-              </a:endParaRPr>
-            </a:p>
-          </p:txBody>
-        </p:sp>
-        <p:sp>
-          <p:nvSpPr>
-            <p:cNvPr id="32" name="Rectangle : coins arrondis 31">
-              <a:extLst>
-                <a:ext uri="{FF2B5EF4-FFF2-40B4-BE49-F238E27FC236}">
-                  <a16:creationId xmlns:a16="http://schemas.microsoft.com/office/drawing/2014/main" id="{9C405201-1ED0-8A8B-AD7B-C7F7B5940E71}"/>
-                </a:ext>
-              </a:extLst>
-            </p:cNvPr>
-            <p:cNvSpPr>
-              <a:spLocks/>
-            </p:cNvSpPr>
-            <p:nvPr/>
-          </p:nvSpPr>
-          <p:spPr>
-            <a:xfrm>
-              <a:off x="16421557" y="36388295"/>
-              <a:ext cx="15375965" cy="6340395"/>
-            </a:xfrm>
-            <a:prstGeom prst="roundRect">
-              <a:avLst/>
-            </a:prstGeom>
-            <a:solidFill>
-              <a:srgbClr val="E7E1D5"/>
-            </a:solidFill>
-            <a:ln>
-              <a:noFill/>
-            </a:ln>
-          </p:spPr>
-          <p:style>
-            <a:lnRef idx="2">
-              <a:schemeClr val="accent1">
-                <a:shade val="15000"/>
-              </a:schemeClr>
-            </a:lnRef>
-            <a:fillRef idx="1">
-              <a:schemeClr val="accent1"/>
-            </a:fillRef>
-            <a:effectRef idx="0">
-              <a:schemeClr val="accent1"/>
-            </a:effectRef>
-            <a:fontRef idx="minor">
-              <a:schemeClr val="lt1"/>
-            </a:fontRef>
-          </p:style>
-          <p:txBody>
-            <a:bodyPr rtlCol="0" anchor="t"/>
-            <a:lstStyle/>
-            <a:p>
-              <a:pPr marL="0" marR="0" lvl="0" indent="0" algn="ctr" defTabSz="457200" rtl="0" eaLnBrk="1" fontAlgn="auto" latinLnBrk="0" hangingPunct="1">
-                <a:lnSpc>
-                  <a:spcPct val="100000"/>
-                </a:lnSpc>
-                <a:spcBef>
-                  <a:spcPts val="0"/>
-                </a:spcBef>
-                <a:spcAft>
-                  <a:spcPts val="0"/>
-                </a:spcAft>
-                <a:buClrTx/>
-                <a:buSzTx/>
-                <a:buFontTx/>
-                <a:buNone/>
-                <a:tabLst/>
-                <a:defRPr/>
-              </a:pPr>
-              <a:r>
-                <a:rPr lang="en-US" sz="5000" dirty="0">
-                  <a:solidFill>
-                    <a:srgbClr val="37322F"/>
-                  </a:solidFill>
-                  <a:latin typeface="Gill Sans Nova" panose="020B0602020104020203" pitchFamily="34" charset="0"/>
-                  <a:cs typeface="Aharoni" panose="020F0502020204030204" pitchFamily="2" charset="-79"/>
-                </a:rPr>
-                <a:t>Acknowledgment </a:t>
-              </a:r>
-              <a:r>
-                <a:rPr lang="fr-FR" sz="5000" dirty="0">
-                  <a:solidFill>
-                    <a:srgbClr val="37322F"/>
-                  </a:solidFill>
-                  <a:latin typeface="Gill Sans Nova" panose="020B0602020104020203" pitchFamily="34" charset="0"/>
-                  <a:cs typeface="Aharoni" panose="020F0502020204030204" pitchFamily="2" charset="-79"/>
-                </a:rPr>
-                <a:t>🤝</a:t>
-              </a:r>
-              <a:endParaRPr kumimoji="0" lang="en-US" sz="5000" b="0" i="0" u="none" strike="noStrike" kern="1200" cap="none" spc="0" normalizeH="0" baseline="0" noProof="0" dirty="0">
-                <a:ln>
-                  <a:noFill/>
-                </a:ln>
-                <a:solidFill>
-                  <a:srgbClr val="37322F"/>
-                </a:solidFill>
-                <a:effectLst/>
-                <a:uLnTx/>
-                <a:uFillTx/>
-                <a:latin typeface="Gill Sans Nova" panose="020B0602020104020203" pitchFamily="34" charset="0"/>
-                <a:ea typeface="+mn-ea"/>
-                <a:cs typeface="Aharoni" panose="020F0502020204030204" pitchFamily="2" charset="-79"/>
-              </a:endParaRPr>
-            </a:p>
-            <a:p>
-              <a:pPr marL="0" marR="0" lvl="0" indent="0" algn="ctr" defTabSz="457200" rtl="0" eaLnBrk="1" fontAlgn="auto" latinLnBrk="0" hangingPunct="1">
-                <a:lnSpc>
-                  <a:spcPct val="100000"/>
-                </a:lnSpc>
-                <a:spcBef>
-                  <a:spcPts val="0"/>
-                </a:spcBef>
-                <a:spcAft>
-                  <a:spcPts val="0"/>
-                </a:spcAft>
-                <a:buClrTx/>
-                <a:buSzTx/>
-                <a:buFontTx/>
-                <a:buNone/>
-                <a:tabLst/>
-                <a:defRPr/>
-              </a:pPr>
-              <a:r>
-                <a:rPr kumimoji="0" lang="en-US" sz="2000" b="0" i="0" u="sng" strike="noStrike" kern="1200" cap="none" spc="0" normalizeH="0" baseline="0" noProof="0" dirty="0">
-                  <a:ln>
-                    <a:noFill/>
-                  </a:ln>
-                  <a:solidFill>
-                    <a:srgbClr val="37322F"/>
-                  </a:solidFill>
-                  <a:effectLst/>
-                  <a:uLnTx/>
-                  <a:uFillTx/>
-                  <a:latin typeface="Gill Sans Nova" panose="020B0602020104020203" pitchFamily="34" charset="0"/>
-                  <a:ea typeface="+mn-ea"/>
-                  <a:cs typeface="Aharoni" panose="020F0502020204030204" pitchFamily="2" charset="-79"/>
-                </a:rPr>
-                <a:t> </a:t>
-              </a:r>
-            </a:p>
-            <a:p>
-              <a:pPr marL="0" marR="0" lvl="0" indent="0" algn="l" defTabSz="457200" rtl="0" eaLnBrk="1" fontAlgn="auto" latinLnBrk="0" hangingPunct="1">
-                <a:lnSpc>
-                  <a:spcPct val="100000"/>
-                </a:lnSpc>
-                <a:spcBef>
-                  <a:spcPts val="0"/>
-                </a:spcBef>
-                <a:spcAft>
-                  <a:spcPts val="0"/>
-                </a:spcAft>
-                <a:buClrTx/>
-                <a:buSzTx/>
-                <a:buFontTx/>
-                <a:buNone/>
-                <a:tabLst/>
-                <a:defRPr/>
-              </a:pPr>
-              <a:r>
-                <a:rPr kumimoji="0" lang="fr-FR" sz="3200" b="0" i="0" u="none" strike="noStrike" kern="1200" cap="none" spc="0" normalizeH="0" baseline="0" noProof="0" dirty="0">
-                  <a:ln>
-                    <a:noFill/>
-                  </a:ln>
-                  <a:solidFill>
-                    <a:srgbClr val="37322F"/>
-                  </a:solidFill>
-                  <a:effectLst/>
-                  <a:uLnTx/>
-                  <a:uFillTx/>
-                  <a:latin typeface="Gill Sans Nova" panose="020B0602020104020203" pitchFamily="34" charset="0"/>
-                  <a:ea typeface="+mn-ea"/>
-                  <a:cs typeface="+mn-cs"/>
-                </a:rPr>
-                <a:t>Blablabla</a:t>
-              </a:r>
-            </a:p>
-            <a:p>
-              <a:pPr marL="0" marR="0" lvl="0" indent="0" algn="ctr" defTabSz="457200" rtl="0" eaLnBrk="1" fontAlgn="auto" latinLnBrk="0" hangingPunct="1">
-                <a:lnSpc>
-                  <a:spcPct val="100000"/>
-                </a:lnSpc>
-                <a:spcBef>
-                  <a:spcPts val="0"/>
-                </a:spcBef>
-                <a:spcAft>
-                  <a:spcPts val="0"/>
-                </a:spcAft>
-                <a:buClrTx/>
-                <a:buSzTx/>
-                <a:buFontTx/>
-                <a:buNone/>
-                <a:tabLst/>
-                <a:defRPr/>
-              </a:pPr>
-              <a:endParaRPr kumimoji="0" lang="fr-FR" sz="1800" b="0" i="0" u="none" strike="noStrike" kern="1200" cap="none" spc="0" normalizeH="0" baseline="0" noProof="0" dirty="0">
-                <a:ln>
-                  <a:noFill/>
-                </a:ln>
-                <a:solidFill>
-                  <a:srgbClr val="37322F"/>
-                </a:solidFill>
-                <a:effectLst/>
-                <a:uLnTx/>
-                <a:uFillTx/>
-                <a:latin typeface="Aptos" panose="02110004020202020204"/>
-                <a:ea typeface="+mn-ea"/>
-                <a:cs typeface="+mn-cs"/>
-              </a:endParaRPr>
-            </a:p>
-            <a:p>
-              <a:pPr algn="ctr"/>
-              <a:endParaRPr lang="fr-FR" dirty="0">
-                <a:solidFill>
-                  <a:srgbClr val="37322F"/>
-                </a:solidFill>
               </a:endParaRPr>
             </a:p>
           </p:txBody>
@@ -5233,7 +5987,7 @@
         </p:nvGrpSpPr>
         <p:grpSpPr>
           <a:xfrm>
-            <a:off x="1504335" y="18974831"/>
+            <a:off x="1323157" y="18277209"/>
             <a:ext cx="8302682" cy="5940424"/>
             <a:chOff x="1323157" y="29845168"/>
             <a:chExt cx="8302682" cy="5940424"/>
@@ -5254,7 +6008,7 @@
             <p:nvPr/>
           </p:nvPicPr>
           <p:blipFill>
-            <a:blip r:embed="rId6">
+            <a:blip r:embed="rId7">
               <a:extLst>
                 <a:ext uri="{28A0092B-C50C-407E-A947-70E740481C1C}">
                   <a14:useLocalDpi xmlns:a14="http://schemas.microsoft.com/office/drawing/2010/main" val="0"/>
@@ -5359,7 +6113,7 @@
         </p:nvGrpSpPr>
         <p:grpSpPr>
           <a:xfrm>
-            <a:off x="1504335" y="33158140"/>
+            <a:off x="1312753" y="35249541"/>
             <a:ext cx="8216820" cy="2431405"/>
             <a:chOff x="22824491" y="33403509"/>
             <a:chExt cx="8216820" cy="2431405"/>
@@ -5380,7 +6134,7 @@
             <p:nvPr/>
           </p:nvPicPr>
           <p:blipFill>
-            <a:blip r:embed="rId7">
+            <a:blip r:embed="rId8">
               <a:extLst>
                 <a:ext uri="{28A0092B-C50C-407E-A947-70E740481C1C}">
                   <a14:useLocalDpi xmlns:a14="http://schemas.microsoft.com/office/drawing/2010/main" val="0"/>
@@ -5485,10 +6239,10 @@
         </p:nvGrpSpPr>
         <p:grpSpPr>
           <a:xfrm>
-            <a:off x="20840964" y="9273233"/>
-            <a:ext cx="11479014" cy="4816733"/>
-            <a:chOff x="10380480" y="9259889"/>
-            <a:chExt cx="11479014" cy="4816733"/>
+            <a:off x="17637177" y="8879202"/>
+            <a:ext cx="14265938" cy="5223519"/>
+            <a:chOff x="9965380" y="9259889"/>
+            <a:chExt cx="11894114" cy="4355068"/>
           </a:xfrm>
         </p:grpSpPr>
         <p:pic>
@@ -5506,7 +6260,7 @@
             <p:nvPr/>
           </p:nvPicPr>
           <p:blipFill>
-            <a:blip r:embed="rId8">
+            <a:blip r:embed="rId9">
               <a:extLst>
                 <a:ext uri="{28A0092B-C50C-407E-A947-70E740481C1C}">
                   <a14:useLocalDpi xmlns:a14="http://schemas.microsoft.com/office/drawing/2010/main" val="0"/>
@@ -5551,7 +6305,7 @@
           </p:nvSpPr>
           <p:spPr>
             <a:xfrm>
-              <a:off x="12011577" y="13614957"/>
+              <a:off x="9965380" y="13139946"/>
               <a:ext cx="8216820" cy="461665"/>
             </a:xfrm>
             <a:prstGeom prst="rect">
@@ -5600,100 +6354,6 @@
           </p:txBody>
         </p:sp>
       </p:grpSp>
-      <p:sp>
-        <p:nvSpPr>
-          <p:cNvPr id="8" name="Rectangle : coins arrondis 7">
-            <a:extLst>
-              <a:ext uri="{FF2B5EF4-FFF2-40B4-BE49-F238E27FC236}">
-                <a16:creationId xmlns:a16="http://schemas.microsoft.com/office/drawing/2014/main" id="{0C379A8F-C7A8-CD89-C5B7-B3D7DBC0A70B}"/>
-              </a:ext>
-            </a:extLst>
-          </p:cNvPr>
-          <p:cNvSpPr>
-            <a:spLocks/>
-          </p:cNvSpPr>
-          <p:nvPr/>
-        </p:nvSpPr>
-        <p:spPr>
-          <a:xfrm>
-            <a:off x="11087939" y="24956730"/>
-            <a:ext cx="10064094" cy="10928421"/>
-          </a:xfrm>
-          <a:prstGeom prst="roundRect">
-            <a:avLst/>
-          </a:prstGeom>
-          <a:solidFill>
-            <a:srgbClr val="E7E1D5"/>
-          </a:solidFill>
-          <a:ln>
-            <a:noFill/>
-          </a:ln>
-        </p:spPr>
-        <p:style>
-          <a:lnRef idx="2">
-            <a:schemeClr val="accent1">
-              <a:shade val="15000"/>
-            </a:schemeClr>
-          </a:lnRef>
-          <a:fillRef idx="1">
-            <a:schemeClr val="accent1"/>
-          </a:fillRef>
-          <a:effectRef idx="0">
-            <a:schemeClr val="accent1"/>
-          </a:effectRef>
-          <a:fontRef idx="minor">
-            <a:schemeClr val="lt1"/>
-          </a:fontRef>
-        </p:style>
-        <p:txBody>
-          <a:bodyPr rtlCol="0" anchor="t"/>
-          <a:lstStyle/>
-          <a:p>
-            <a:pPr algn="ctr"/>
-            <a:r>
-              <a:rPr lang="fr-FR" sz="5000" dirty="0">
-                <a:solidFill>
-                  <a:srgbClr val="37322F"/>
-                </a:solidFill>
-                <a:latin typeface="Gill Sans Nova" panose="020B0602020104020203" pitchFamily="34" charset="0"/>
-                <a:cs typeface="Aharoni" panose="020F0502020204030204" pitchFamily="2" charset="-79"/>
-              </a:rPr>
-              <a:t>Kernels 💠</a:t>
-            </a:r>
-            <a:endParaRPr lang="en-US" sz="5000" dirty="0">
-              <a:solidFill>
-                <a:srgbClr val="37322F"/>
-              </a:solidFill>
-              <a:latin typeface="Gill Sans Nova" panose="020B0602020104020203" pitchFamily="34" charset="0"/>
-              <a:cs typeface="Aharoni" panose="020F0502020204030204" pitchFamily="2" charset="-79"/>
-            </a:endParaRPr>
-          </a:p>
-          <a:p>
-            <a:pPr algn="ctr"/>
-            <a:r>
-              <a:rPr lang="en-US" sz="2000" u="sng" dirty="0">
-                <a:solidFill>
-                  <a:srgbClr val="37322F"/>
-                </a:solidFill>
-                <a:latin typeface="Gill Sans Nova" panose="020B0602020104020203" pitchFamily="34" charset="0"/>
-                <a:cs typeface="Aharoni" panose="020F0502020204030204" pitchFamily="2" charset="-79"/>
-              </a:rPr>
-              <a:t> </a:t>
-            </a:r>
-          </a:p>
-          <a:p>
-            <a:r>
-              <a:rPr lang="fr-FR" sz="3200" dirty="0">
-                <a:solidFill>
-                  <a:srgbClr val="37322F"/>
-                </a:solidFill>
-                <a:latin typeface="Gill Sans Nova" panose="020B0602020104020203" pitchFamily="34" charset="0"/>
-              </a:rPr>
-              <a:t>Blablabla</a:t>
-            </a:r>
-          </a:p>
-        </p:txBody>
-      </p:sp>
       <p:grpSp>
         <p:nvGrpSpPr>
           <p:cNvPr id="20" name="Groupe 19">
@@ -5708,7 +6368,7 @@
         </p:nvGrpSpPr>
         <p:grpSpPr>
           <a:xfrm>
-            <a:off x="11474271" y="19948554"/>
+            <a:off x="11616526" y="32961097"/>
             <a:ext cx="9006921" cy="3580634"/>
             <a:chOff x="11862888" y="18669766"/>
             <a:chExt cx="14079915" cy="5597365"/>
@@ -5729,7 +6389,7 @@
             <p:nvPr/>
           </p:nvPicPr>
           <p:blipFill>
-            <a:blip r:embed="rId9"/>
+            <a:blip r:embed="rId10"/>
             <a:stretch>
               <a:fillRect/>
             </a:stretch>
@@ -5769,7 +6429,7 @@
             <p:nvPr/>
           </p:nvPicPr>
           <p:blipFill>
-            <a:blip r:embed="rId10"/>
+            <a:blip r:embed="rId11"/>
             <a:stretch>
               <a:fillRect/>
             </a:stretch>
@@ -5810,14 +6470,14 @@
           <p:nvPr/>
         </p:nvPicPr>
         <p:blipFill>
-          <a:blip r:embed="rId11"/>
+          <a:blip r:embed="rId12"/>
           <a:stretch>
             <a:fillRect/>
           </a:stretch>
         </p:blipFill>
         <p:spPr>
           <a:xfrm>
-            <a:off x="22077010" y="19200076"/>
+            <a:off x="22421329" y="26200046"/>
             <a:ext cx="9006921" cy="3433295"/>
           </a:xfrm>
           <a:prstGeom prst="rect">
@@ -5835,107 +6495,86 @@
           </a:effectLst>
         </p:spPr>
       </p:pic>
-      <p:grpSp>
-        <p:nvGrpSpPr>
-          <p:cNvPr id="38" name="Groupe 37">
+      <p:pic>
+        <p:nvPicPr>
+          <p:cNvPr id="29" name="Image 28">
             <a:extLst>
               <a:ext uri="{FF2B5EF4-FFF2-40B4-BE49-F238E27FC236}">
-                <a16:creationId xmlns:a16="http://schemas.microsoft.com/office/drawing/2014/main" id="{45E54D07-A631-1226-DB10-74A250A5923C}"/>
+                <a16:creationId xmlns:a16="http://schemas.microsoft.com/office/drawing/2014/main" id="{FE6EF54D-90AB-1281-F909-4132B96AA9AB}"/>
               </a:ext>
             </a:extLst>
           </p:cNvPr>
-          <p:cNvGrpSpPr/>
+          <p:cNvPicPr>
+            <a:picLocks noChangeAspect="1"/>
+          </p:cNvPicPr>
           <p:nvPr/>
-        </p:nvGrpSpPr>
-        <p:grpSpPr>
+        </p:nvPicPr>
+        <p:blipFill>
+          <a:blip r:embed="rId13"/>
+          <a:stretch>
+            <a:fillRect/>
+          </a:stretch>
+        </p:blipFill>
+        <p:spPr>
           <a:xfrm>
-            <a:off x="11185265" y="29682946"/>
-            <a:ext cx="9869444" cy="6142307"/>
-            <a:chOff x="11185265" y="29682946"/>
-            <a:chExt cx="9869444" cy="6142307"/>
+            <a:off x="22421328" y="18349634"/>
+            <a:ext cx="9006921" cy="2997373"/>
           </a:xfrm>
-        </p:grpSpPr>
-        <p:pic>
-          <p:nvPicPr>
-            <p:cNvPr id="29" name="Image 28">
-              <a:extLst>
-                <a:ext uri="{FF2B5EF4-FFF2-40B4-BE49-F238E27FC236}">
-                  <a16:creationId xmlns:a16="http://schemas.microsoft.com/office/drawing/2014/main" id="{FE6EF54D-90AB-1281-F909-4132B96AA9AB}"/>
-                </a:ext>
-              </a:extLst>
-            </p:cNvPr>
-            <p:cNvPicPr>
-              <a:picLocks noChangeAspect="1"/>
-            </p:cNvPicPr>
-            <p:nvPr/>
-          </p:nvPicPr>
-          <p:blipFill>
-            <a:blip r:embed="rId12"/>
-            <a:stretch>
-              <a:fillRect/>
-            </a:stretch>
-          </p:blipFill>
-          <p:spPr>
-            <a:xfrm>
-              <a:off x="11185265" y="29682946"/>
-              <a:ext cx="9869444" cy="3284408"/>
-            </a:xfrm>
-            <a:prstGeom prst="rect">
-              <a:avLst/>
-            </a:prstGeom>
-            <a:ln>
-              <a:noFill/>
-            </a:ln>
-            <a:effectLst>
-              <a:outerShdw blurRad="292100" dist="139700" dir="2700000" algn="tl" rotWithShape="0">
-                <a:srgbClr val="333333">
-                  <a:alpha val="65000"/>
-                </a:srgbClr>
-              </a:outerShdw>
-            </a:effectLst>
-          </p:spPr>
-        </p:pic>
-        <p:pic>
-          <p:nvPicPr>
-            <p:cNvPr id="36" name="Image 35">
-              <a:extLst>
-                <a:ext uri="{FF2B5EF4-FFF2-40B4-BE49-F238E27FC236}">
-                  <a16:creationId xmlns:a16="http://schemas.microsoft.com/office/drawing/2014/main" id="{FAB18140-E76F-CB70-4A97-2CE39ED49838}"/>
-                </a:ext>
-              </a:extLst>
-            </p:cNvPr>
-            <p:cNvPicPr>
-              <a:picLocks noChangeAspect="1"/>
-            </p:cNvPicPr>
-            <p:nvPr/>
-          </p:nvPicPr>
-          <p:blipFill>
-            <a:blip r:embed="rId13"/>
-            <a:stretch>
-              <a:fillRect/>
-            </a:stretch>
-          </p:blipFill>
-          <p:spPr>
-            <a:xfrm>
-              <a:off x="11568429" y="32967354"/>
-              <a:ext cx="3286584" cy="2857899"/>
-            </a:xfrm>
-            <a:prstGeom prst="rect">
-              <a:avLst/>
-            </a:prstGeom>
-            <a:ln>
-              <a:noFill/>
-            </a:ln>
-            <a:effectLst>
-              <a:outerShdw blurRad="292100" dist="139700" dir="2700000" algn="tl" rotWithShape="0">
-                <a:srgbClr val="333333">
-                  <a:alpha val="65000"/>
-                </a:srgbClr>
-              </a:outerShdw>
-            </a:effectLst>
-          </p:spPr>
-        </p:pic>
-      </p:grpSp>
+          <a:prstGeom prst="rect">
+            <a:avLst/>
+          </a:prstGeom>
+          <a:ln>
+            <a:noFill/>
+          </a:ln>
+          <a:effectLst>
+            <a:outerShdw blurRad="292100" dist="139700" dir="2700000" algn="tl" rotWithShape="0">
+              <a:srgbClr val="333333">
+                <a:alpha val="65000"/>
+              </a:srgbClr>
+            </a:outerShdw>
+          </a:effectLst>
+        </p:spPr>
+      </p:pic>
+      <p:pic>
+        <p:nvPicPr>
+          <p:cNvPr id="36" name="Image 35">
+            <a:extLst>
+              <a:ext uri="{FF2B5EF4-FFF2-40B4-BE49-F238E27FC236}">
+                <a16:creationId xmlns:a16="http://schemas.microsoft.com/office/drawing/2014/main" id="{FAB18140-E76F-CB70-4A97-2CE39ED49838}"/>
+              </a:ext>
+            </a:extLst>
+          </p:cNvPr>
+          <p:cNvPicPr>
+            <a:picLocks noChangeAspect="1"/>
+          </p:cNvPicPr>
+          <p:nvPr/>
+        </p:nvPicPr>
+        <p:blipFill>
+          <a:blip r:embed="rId14"/>
+          <a:stretch>
+            <a:fillRect/>
+          </a:stretch>
+        </p:blipFill>
+        <p:spPr>
+          <a:xfrm>
+            <a:off x="971038" y="25979682"/>
+            <a:ext cx="3286584" cy="2857899"/>
+          </a:xfrm>
+          <a:prstGeom prst="rect">
+            <a:avLst/>
+          </a:prstGeom>
+          <a:ln>
+            <a:noFill/>
+          </a:ln>
+          <a:effectLst>
+            <a:outerShdw blurRad="292100" dist="139700" dir="2700000" algn="tl" rotWithShape="0">
+              <a:srgbClr val="333333">
+                <a:alpha val="65000"/>
+              </a:srgbClr>
+            </a:outerShdw>
+          </a:effectLst>
+        </p:spPr>
+      </p:pic>
     </p:spTree>
     <p:extLst>
       <p:ext uri="{BB962C8B-B14F-4D97-AF65-F5344CB8AC3E}">

</xml_diff>

<commit_message>
📝 Removed shadow on poster figures
</commit_message>
<xml_diff>
--- a/docs/Poster/Poster.pptx
+++ b/docs/Poster/Poster.pptx
@@ -243,7 +243,7 @@
           <a:p>
             <a:fld id="{70533FD3-F370-458C-BCE8-160857C0EEE2}" type="datetimeFigureOut">
               <a:rPr lang="fr-FR" smtClean="0"/>
-              <a:t>10/05/2024</a:t>
+              <a:t>13/05/2024</a:t>
             </a:fld>
             <a:endParaRPr lang="fr-FR"/>
           </a:p>
@@ -285,7 +285,7 @@
           <a:p>
             <a:fld id="{30D7D844-E7F4-4E2F-A407-23458DD25894}" type="slidenum">
               <a:rPr lang="fr-FR" smtClean="0"/>
-              <a:t>‹#›</a:t>
+              <a:t>‹N°›</a:t>
             </a:fld>
             <a:endParaRPr lang="fr-FR"/>
           </a:p>
@@ -413,7 +413,7 @@
           <a:p>
             <a:fld id="{70533FD3-F370-458C-BCE8-160857C0EEE2}" type="datetimeFigureOut">
               <a:rPr lang="fr-FR" smtClean="0"/>
-              <a:t>10/05/2024</a:t>
+              <a:t>13/05/2024</a:t>
             </a:fld>
             <a:endParaRPr lang="fr-FR"/>
           </a:p>
@@ -455,7 +455,7 @@
           <a:p>
             <a:fld id="{30D7D844-E7F4-4E2F-A407-23458DD25894}" type="slidenum">
               <a:rPr lang="fr-FR" smtClean="0"/>
-              <a:t>‹#›</a:t>
+              <a:t>‹N°›</a:t>
             </a:fld>
             <a:endParaRPr lang="fr-FR"/>
           </a:p>
@@ -593,7 +593,7 @@
           <a:p>
             <a:fld id="{70533FD3-F370-458C-BCE8-160857C0EEE2}" type="datetimeFigureOut">
               <a:rPr lang="fr-FR" smtClean="0"/>
-              <a:t>10/05/2024</a:t>
+              <a:t>13/05/2024</a:t>
             </a:fld>
             <a:endParaRPr lang="fr-FR"/>
           </a:p>
@@ -635,7 +635,7 @@
           <a:p>
             <a:fld id="{30D7D844-E7F4-4E2F-A407-23458DD25894}" type="slidenum">
               <a:rPr lang="fr-FR" smtClean="0"/>
-              <a:t>‹#›</a:t>
+              <a:t>‹N°›</a:t>
             </a:fld>
             <a:endParaRPr lang="fr-FR"/>
           </a:p>
@@ -763,7 +763,7 @@
           <a:p>
             <a:fld id="{70533FD3-F370-458C-BCE8-160857C0EEE2}" type="datetimeFigureOut">
               <a:rPr lang="fr-FR" smtClean="0"/>
-              <a:t>10/05/2024</a:t>
+              <a:t>13/05/2024</a:t>
             </a:fld>
             <a:endParaRPr lang="fr-FR"/>
           </a:p>
@@ -805,7 +805,7 @@
           <a:p>
             <a:fld id="{30D7D844-E7F4-4E2F-A407-23458DD25894}" type="slidenum">
               <a:rPr lang="fr-FR" smtClean="0"/>
-              <a:t>‹#›</a:t>
+              <a:t>‹N°›</a:t>
             </a:fld>
             <a:endParaRPr lang="fr-FR"/>
           </a:p>
@@ -1009,7 +1009,7 @@
           <a:p>
             <a:fld id="{70533FD3-F370-458C-BCE8-160857C0EEE2}" type="datetimeFigureOut">
               <a:rPr lang="fr-FR" smtClean="0"/>
-              <a:t>10/05/2024</a:t>
+              <a:t>13/05/2024</a:t>
             </a:fld>
             <a:endParaRPr lang="fr-FR"/>
           </a:p>
@@ -1051,7 +1051,7 @@
           <a:p>
             <a:fld id="{30D7D844-E7F4-4E2F-A407-23458DD25894}" type="slidenum">
               <a:rPr lang="fr-FR" smtClean="0"/>
-              <a:t>‹#›</a:t>
+              <a:t>‹N°›</a:t>
             </a:fld>
             <a:endParaRPr lang="fr-FR"/>
           </a:p>
@@ -1241,7 +1241,7 @@
           <a:p>
             <a:fld id="{70533FD3-F370-458C-BCE8-160857C0EEE2}" type="datetimeFigureOut">
               <a:rPr lang="fr-FR" smtClean="0"/>
-              <a:t>10/05/2024</a:t>
+              <a:t>13/05/2024</a:t>
             </a:fld>
             <a:endParaRPr lang="fr-FR"/>
           </a:p>
@@ -1283,7 +1283,7 @@
           <a:p>
             <a:fld id="{30D7D844-E7F4-4E2F-A407-23458DD25894}" type="slidenum">
               <a:rPr lang="fr-FR" smtClean="0"/>
-              <a:t>‹#›</a:t>
+              <a:t>‹N°›</a:t>
             </a:fld>
             <a:endParaRPr lang="fr-FR"/>
           </a:p>
@@ -1608,7 +1608,7 @@
           <a:p>
             <a:fld id="{70533FD3-F370-458C-BCE8-160857C0EEE2}" type="datetimeFigureOut">
               <a:rPr lang="fr-FR" smtClean="0"/>
-              <a:t>10/05/2024</a:t>
+              <a:t>13/05/2024</a:t>
             </a:fld>
             <a:endParaRPr lang="fr-FR"/>
           </a:p>
@@ -1650,7 +1650,7 @@
           <a:p>
             <a:fld id="{30D7D844-E7F4-4E2F-A407-23458DD25894}" type="slidenum">
               <a:rPr lang="fr-FR" smtClean="0"/>
-              <a:t>‹#›</a:t>
+              <a:t>‹N°›</a:t>
             </a:fld>
             <a:endParaRPr lang="fr-FR"/>
           </a:p>
@@ -1726,7 +1726,7 @@
           <a:p>
             <a:fld id="{70533FD3-F370-458C-BCE8-160857C0EEE2}" type="datetimeFigureOut">
               <a:rPr lang="fr-FR" smtClean="0"/>
-              <a:t>10/05/2024</a:t>
+              <a:t>13/05/2024</a:t>
             </a:fld>
             <a:endParaRPr lang="fr-FR"/>
           </a:p>
@@ -1768,7 +1768,7 @@
           <a:p>
             <a:fld id="{30D7D844-E7F4-4E2F-A407-23458DD25894}" type="slidenum">
               <a:rPr lang="fr-FR" smtClean="0"/>
-              <a:t>‹#›</a:t>
+              <a:t>‹N°›</a:t>
             </a:fld>
             <a:endParaRPr lang="fr-FR"/>
           </a:p>
@@ -1821,7 +1821,7 @@
           <a:p>
             <a:fld id="{70533FD3-F370-458C-BCE8-160857C0EEE2}" type="datetimeFigureOut">
               <a:rPr lang="fr-FR" smtClean="0"/>
-              <a:t>10/05/2024</a:t>
+              <a:t>13/05/2024</a:t>
             </a:fld>
             <a:endParaRPr lang="fr-FR"/>
           </a:p>
@@ -1863,7 +1863,7 @@
           <a:p>
             <a:fld id="{30D7D844-E7F4-4E2F-A407-23458DD25894}" type="slidenum">
               <a:rPr lang="fr-FR" smtClean="0"/>
-              <a:t>‹#›</a:t>
+              <a:t>‹N°›</a:t>
             </a:fld>
             <a:endParaRPr lang="fr-FR"/>
           </a:p>
@@ -2098,7 +2098,7 @@
           <a:p>
             <a:fld id="{70533FD3-F370-458C-BCE8-160857C0EEE2}" type="datetimeFigureOut">
               <a:rPr lang="fr-FR" smtClean="0"/>
-              <a:t>10/05/2024</a:t>
+              <a:t>13/05/2024</a:t>
             </a:fld>
             <a:endParaRPr lang="fr-FR"/>
           </a:p>
@@ -2140,7 +2140,7 @@
           <a:p>
             <a:fld id="{30D7D844-E7F4-4E2F-A407-23458DD25894}" type="slidenum">
               <a:rPr lang="fr-FR" smtClean="0"/>
-              <a:t>‹#›</a:t>
+              <a:t>‹N°›</a:t>
             </a:fld>
             <a:endParaRPr lang="fr-FR"/>
           </a:p>
@@ -2355,7 +2355,7 @@
           <a:p>
             <a:fld id="{70533FD3-F370-458C-BCE8-160857C0EEE2}" type="datetimeFigureOut">
               <a:rPr lang="fr-FR" smtClean="0"/>
-              <a:t>10/05/2024</a:t>
+              <a:t>13/05/2024</a:t>
             </a:fld>
             <a:endParaRPr lang="fr-FR"/>
           </a:p>
@@ -2397,7 +2397,7 @@
           <a:p>
             <a:fld id="{30D7D844-E7F4-4E2F-A407-23458DD25894}" type="slidenum">
               <a:rPr lang="fr-FR" smtClean="0"/>
-              <a:t>‹#›</a:t>
+              <a:t>‹N°›</a:t>
             </a:fld>
             <a:endParaRPr lang="fr-FR"/>
           </a:p>
@@ -2568,7 +2568,7 @@
           <a:p>
             <a:fld id="{70533FD3-F370-458C-BCE8-160857C0EEE2}" type="datetimeFigureOut">
               <a:rPr lang="fr-FR" smtClean="0"/>
-              <a:t>10/05/2024</a:t>
+              <a:t>13/05/2024</a:t>
             </a:fld>
             <a:endParaRPr lang="fr-FR"/>
           </a:p>
@@ -2646,7 +2646,7 @@
           <a:p>
             <a:fld id="{30D7D844-E7F4-4E2F-A407-23458DD25894}" type="slidenum">
               <a:rPr lang="fr-FR" smtClean="0"/>
-              <a:t>‹#›</a:t>
+              <a:t>‹N°›</a:t>
             </a:fld>
             <a:endParaRPr lang="fr-FR"/>
           </a:p>
@@ -3363,8 +3363,8 @@
             <a:chExt cx="31514388" cy="29425808"/>
           </a:xfrm>
         </p:grpSpPr>
-        <mc:AlternateContent xmlns:mc="http://schemas.openxmlformats.org/markup-compatibility/2006">
-          <mc:Choice xmlns:a14="http://schemas.microsoft.com/office/drawing/2010/main" Requires="a14">
+        <mc:AlternateContent xmlns:mc="http://schemas.openxmlformats.org/markup-compatibility/2006" xmlns:a14="http://schemas.microsoft.com/office/drawing/2010/main">
+          <mc:Choice Requires="a14">
             <p:sp>
               <p:nvSpPr>
                 <p:cNvPr id="5" name="Rectangle : coins arrondis 4">
@@ -3658,7 +3658,7 @@
               </p:txBody>
             </p:sp>
           </mc:Choice>
-          <mc:Fallback>
+          <mc:Fallback xmlns="">
             <p:sp>
               <p:nvSpPr>
                 <p:cNvPr id="5" name="Rectangle : coins arrondis 4">
@@ -3912,8 +3912,8 @@
                     </a:p>
                   </p:txBody>
                 </p:sp>
-                <mc:AlternateContent xmlns:mc="http://schemas.openxmlformats.org/markup-compatibility/2006">
-                  <mc:Choice xmlns:a14="http://schemas.microsoft.com/office/drawing/2010/main" Requires="a14">
+                <mc:AlternateContent xmlns:mc="http://schemas.openxmlformats.org/markup-compatibility/2006" xmlns:a14="http://schemas.microsoft.com/office/drawing/2010/main">
+                  <mc:Choice Requires="a14">
                     <p:sp>
                       <p:nvSpPr>
                         <p:cNvPr id="10" name="Rectangle : coins arrondis 9">
@@ -4482,7 +4482,7 @@
                       </p:txBody>
                     </p:sp>
                   </mc:Choice>
-                  <mc:Fallback>
+                  <mc:Fallback xmlns="">
                     <p:sp>
                       <p:nvSpPr>
                         <p:cNvPr id="10" name="Rectangle : coins arrondis 9">
@@ -5092,8 +5092,8 @@
                 </p:txBody>
               </p:sp>
             </p:grpSp>
-            <mc:AlternateContent xmlns:mc="http://schemas.openxmlformats.org/markup-compatibility/2006">
-              <mc:Choice xmlns:a14="http://schemas.microsoft.com/office/drawing/2010/main" Requires="a14">
+            <mc:AlternateContent xmlns:mc="http://schemas.openxmlformats.org/markup-compatibility/2006" xmlns:a14="http://schemas.microsoft.com/office/drawing/2010/main">
+              <mc:Choice Requires="a14">
                 <p:sp>
                   <p:nvSpPr>
                     <p:cNvPr id="31" name="Rectangle : coins arrondis 30">
@@ -5451,7 +5451,7 @@
                   </p:txBody>
                 </p:sp>
               </mc:Choice>
-              <mc:Fallback>
+              <mc:Fallback xmlns="">
                 <p:sp>
                   <p:nvSpPr>
                     <p:cNvPr id="31" name="Rectangle : coins arrondis 30">
@@ -5685,8 +5685,8 @@
           </p:nvSpPr>
           <p:spPr>
             <a:xfrm>
-              <a:off x="10506545" y="471947"/>
-              <a:ext cx="20229094" cy="6341808"/>
+              <a:off x="10901391" y="471947"/>
+              <a:ext cx="20581506" cy="6341808"/>
             </a:xfrm>
             <a:noFill/>
             <a:ln cap="rnd">
@@ -6830,16 +6830,6 @@
             <a:prstGeom prst="rect">
               <a:avLst/>
             </a:prstGeom>
-            <a:ln>
-              <a:noFill/>
-            </a:ln>
-            <a:effectLst>
-              <a:outerShdw blurRad="292100" dist="139700" dir="2700000" algn="tl" rotWithShape="0">
-                <a:srgbClr val="333333">
-                  <a:alpha val="65000"/>
-                </a:srgbClr>
-              </a:outerShdw>
-            </a:effectLst>
           </p:spPr>
         </p:pic>
         <p:sp>
@@ -6872,7 +6862,7 @@
             <a:p>
               <a:pPr algn="ctr"/>
               <a:r>
-                <a:rPr lang="fr-FR" sz="2400" dirty="0">
+                <a:rPr lang="en-US" sz="2400" dirty="0">
                   <a:solidFill>
                     <a:schemeClr val="tx1">
                       <a:lumMod val="50000"/>
@@ -6881,53 +6871,8 @@
                   </a:solidFill>
                   <a:latin typeface="Gill Sans Nova" panose="020B0602020104020203" pitchFamily="34" charset="0"/>
                 </a:rPr>
-                <a:t>Figure 2: Concept of </a:t>
+                <a:t>Figure 2: Concept of nulling interferometry</a:t>
               </a:r>
-              <a:r>
-                <a:rPr lang="fr-FR" sz="2400" dirty="0" err="1">
-                  <a:solidFill>
-                    <a:schemeClr val="tx1">
-                      <a:lumMod val="50000"/>
-                      <a:lumOff val="50000"/>
-                    </a:schemeClr>
-                  </a:solidFill>
-                  <a:latin typeface="Gill Sans Nova" panose="020B0602020104020203" pitchFamily="34" charset="0"/>
-                </a:rPr>
-                <a:t>nulling</a:t>
-              </a:r>
-              <a:r>
-                <a:rPr lang="fr-FR" sz="2400" dirty="0">
-                  <a:solidFill>
-                    <a:schemeClr val="tx1">
-                      <a:lumMod val="50000"/>
-                      <a:lumOff val="50000"/>
-                    </a:schemeClr>
-                  </a:solidFill>
-                  <a:latin typeface="Gill Sans Nova" panose="020B0602020104020203" pitchFamily="34" charset="0"/>
-                </a:rPr>
-                <a:t> </a:t>
-              </a:r>
-              <a:r>
-                <a:rPr lang="fr-FR" sz="2400" dirty="0" err="1">
-                  <a:solidFill>
-                    <a:schemeClr val="tx1">
-                      <a:lumMod val="50000"/>
-                      <a:lumOff val="50000"/>
-                    </a:schemeClr>
-                  </a:solidFill>
-                  <a:latin typeface="Gill Sans Nova" panose="020B0602020104020203" pitchFamily="34" charset="0"/>
-                </a:rPr>
-                <a:t>interferometry</a:t>
-              </a:r>
-              <a:endParaRPr lang="fr-FR" sz="2400" dirty="0">
-                <a:solidFill>
-                  <a:schemeClr val="tx1">
-                    <a:lumMod val="50000"/>
-                    <a:lumOff val="50000"/>
-                  </a:schemeClr>
-                </a:solidFill>
-                <a:latin typeface="Gill Sans Nova" panose="020B0602020104020203" pitchFamily="34" charset="0"/>
-              </a:endParaRPr>
             </a:p>
           </p:txBody>
         </p:sp>
@@ -6986,16 +6931,6 @@
             <a:prstGeom prst="rect">
               <a:avLst/>
             </a:prstGeom>
-            <a:ln>
-              <a:noFill/>
-            </a:ln>
-            <a:effectLst>
-              <a:outerShdw blurRad="292100" dist="139700" dir="2700000" algn="tl" rotWithShape="0">
-                <a:srgbClr val="333333">
-                  <a:alpha val="65000"/>
-                </a:srgbClr>
-              </a:outerShdw>
-            </a:effectLst>
           </p:spPr>
         </p:pic>
         <p:sp>
@@ -7097,16 +7032,6 @@
             <a:prstGeom prst="rect">
               <a:avLst/>
             </a:prstGeom>
-            <a:ln>
-              <a:noFill/>
-            </a:ln>
-            <a:effectLst>
-              <a:outerShdw blurRad="292100" dist="139700" dir="2700000" algn="tl" rotWithShape="0">
-                <a:srgbClr val="333333">
-                  <a:alpha val="65000"/>
-                </a:srgbClr>
-              </a:outerShdw>
-            </a:effectLst>
           </p:spPr>
         </p:pic>
         <p:sp>
@@ -7182,26 +7107,12 @@
         </p:blipFill>
         <p:spPr>
           <a:xfrm>
-            <a:off x="1504335" y="718076"/>
-            <a:ext cx="8482300" cy="5301437"/>
+            <a:off x="1323722" y="479073"/>
+            <a:ext cx="9316803" cy="5823002"/>
           </a:xfrm>
           <a:prstGeom prst="rect">
             <a:avLst/>
           </a:prstGeom>
-          <a:ln w="38100" cap="sq">
-            <a:solidFill>
-              <a:srgbClr val="000000"/>
-            </a:solidFill>
-            <a:prstDash val="solid"/>
-            <a:miter lim="800000"/>
-          </a:ln>
-          <a:effectLst>
-            <a:outerShdw blurRad="50800" dist="38100" dir="2700000" algn="tl" rotWithShape="0">
-              <a:srgbClr val="000000">
-                <a:alpha val="43000"/>
-              </a:srgbClr>
-            </a:outerShdw>
-          </a:effectLst>
         </p:spPr>
       </p:pic>
       <p:grpSp>
@@ -7252,16 +7163,6 @@
             <a:prstGeom prst="rect">
               <a:avLst/>
             </a:prstGeom>
-            <a:ln>
-              <a:noFill/>
-            </a:ln>
-            <a:effectLst>
-              <a:outerShdw blurRad="292100" dist="139700" dir="2700000" algn="tl" rotWithShape="0">
-                <a:srgbClr val="333333">
-                  <a:alpha val="65000"/>
-                </a:srgbClr>
-              </a:outerShdw>
-            </a:effectLst>
           </p:spPr>
         </p:pic>
         <p:sp>
@@ -7400,16 +7301,6 @@
               <a:prstGeom prst="rect">
                 <a:avLst/>
               </a:prstGeom>
-              <a:ln>
-                <a:noFill/>
-              </a:ln>
-              <a:effectLst>
-                <a:outerShdw blurRad="292100" dist="139700" dir="2700000" algn="tl" rotWithShape="0">
-                  <a:srgbClr val="333333">
-                    <a:alpha val="65000"/>
-                  </a:srgbClr>
-                </a:outerShdw>
-              </a:effectLst>
             </p:spPr>
           </p:pic>
           <p:pic>
@@ -7440,16 +7331,6 @@
               <a:prstGeom prst="rect">
                 <a:avLst/>
               </a:prstGeom>
-              <a:ln>
-                <a:noFill/>
-              </a:ln>
-              <a:effectLst>
-                <a:outerShdw blurRad="292100" dist="139700" dir="2700000" algn="tl" rotWithShape="0">
-                  <a:srgbClr val="333333">
-                    <a:alpha val="65000"/>
-                  </a:srgbClr>
-                </a:outerShdw>
-              </a:effectLst>
             </p:spPr>
           </p:pic>
         </p:grpSp>
@@ -7844,16 +7725,6 @@
             <a:prstGeom prst="rect">
               <a:avLst/>
             </a:prstGeom>
-            <a:ln>
-              <a:noFill/>
-            </a:ln>
-            <a:effectLst>
-              <a:outerShdw blurRad="292100" dist="139700" dir="2700000" algn="tl" rotWithShape="0">
-                <a:srgbClr val="333333">
-                  <a:alpha val="65000"/>
-                </a:srgbClr>
-              </a:outerShdw>
-            </a:effectLst>
           </p:spPr>
         </p:pic>
       </p:grpSp>
@@ -7905,16 +7776,6 @@
             <a:prstGeom prst="rect">
               <a:avLst/>
             </a:prstGeom>
-            <a:ln>
-              <a:noFill/>
-            </a:ln>
-            <a:effectLst>
-              <a:outerShdw blurRad="292100" dist="139700" dir="2700000" algn="tl" rotWithShape="0">
-                <a:srgbClr val="333333">
-                  <a:alpha val="65000"/>
-                </a:srgbClr>
-              </a:outerShdw>
-            </a:effectLst>
           </p:spPr>
         </p:pic>
         <p:sp>
@@ -8025,16 +7886,6 @@
             <a:prstGeom prst="rect">
               <a:avLst/>
             </a:prstGeom>
-            <a:ln>
-              <a:noFill/>
-            </a:ln>
-            <a:effectLst>
-              <a:outerShdw blurRad="292100" dist="139700" dir="2700000" algn="tl" rotWithShape="0">
-                <a:srgbClr val="333333">
-                  <a:alpha val="65000"/>
-                </a:srgbClr>
-              </a:outerShdw>
-            </a:effectLst>
           </p:spPr>
         </p:pic>
         <p:sp>
@@ -8130,16 +7981,6 @@
             <a:prstGeom prst="rect">
               <a:avLst/>
             </a:prstGeom>
-            <a:ln>
-              <a:noFill/>
-            </a:ln>
-            <a:effectLst>
-              <a:outerShdw blurRad="292100" dist="139700" dir="2700000" algn="tl" rotWithShape="0">
-                <a:srgbClr val="333333">
-                  <a:alpha val="65000"/>
-                </a:srgbClr>
-              </a:outerShdw>
-            </a:effectLst>
           </p:spPr>
         </p:pic>
         <p:sp>
@@ -8256,16 +8097,6 @@
             <a:prstGeom prst="rect">
               <a:avLst/>
             </a:prstGeom>
-            <a:ln>
-              <a:noFill/>
-            </a:ln>
-            <a:effectLst>
-              <a:outerShdw blurRad="292100" dist="139700" dir="2700000" algn="tl" rotWithShape="0">
-                <a:srgbClr val="333333">
-                  <a:alpha val="65000"/>
-                </a:srgbClr>
-              </a:outerShdw>
-            </a:effectLst>
           </p:spPr>
         </p:pic>
         <p:sp>
@@ -8361,16 +8192,6 @@
             <a:prstGeom prst="rect">
               <a:avLst/>
             </a:prstGeom>
-            <a:ln>
-              <a:noFill/>
-            </a:ln>
-            <a:effectLst>
-              <a:outerShdw blurRad="292100" dist="139700" dir="2700000" algn="tl" rotWithShape="0">
-                <a:srgbClr val="333333">
-                  <a:alpha val="65000"/>
-                </a:srgbClr>
-              </a:outerShdw>
-            </a:effectLst>
           </p:spPr>
         </p:pic>
         <p:sp>

</xml_diff>

<commit_message>
Poster final (?) + rapport avancement
</commit_message>
<xml_diff>
--- a/docs/Poster/Poster.pptx
+++ b/docs/Poster/Poster.pptx
@@ -4,6 +4,9 @@
   <p:sldMasterIdLst>
     <p:sldMasterId id="2147483660" r:id="rId1"/>
   </p:sldMasterIdLst>
+  <p:notesMasterIdLst>
+    <p:notesMasterId r:id="rId3"/>
+  </p:notesMasterIdLst>
   <p:sldIdLst>
     <p:sldId id="256" r:id="rId2"/>
   </p:sldIdLst>
@@ -112,6 +115,439 @@
 </p:presentation>
 </file>
 
+<file path=ppt/notesMasters/notesMaster1.xml><?xml version="1.0" encoding="utf-8"?>
+<p:notesMaster xmlns:a="http://schemas.openxmlformats.org/drawingml/2006/main" xmlns:r="http://schemas.openxmlformats.org/officeDocument/2006/relationships" xmlns:p="http://schemas.openxmlformats.org/presentationml/2006/main">
+  <p:cSld>
+    <p:bg>
+      <p:bgRef idx="1001">
+        <a:schemeClr val="bg1"/>
+      </p:bgRef>
+    </p:bg>
+    <p:spTree>
+      <p:nvGrpSpPr>
+        <p:cNvPr id="1" name=""/>
+        <p:cNvGrpSpPr/>
+        <p:nvPr/>
+      </p:nvGrpSpPr>
+      <p:grpSpPr>
+        <a:xfrm>
+          <a:off x="0" y="0"/>
+          <a:ext cx="0" cy="0"/>
+          <a:chOff x="0" y="0"/>
+          <a:chExt cx="0" cy="0"/>
+        </a:xfrm>
+      </p:grpSpPr>
+      <p:sp>
+        <p:nvSpPr>
+          <p:cNvPr id="2" name="Header Placeholder 1"/>
+          <p:cNvSpPr>
+            <a:spLocks noGrp="1"/>
+          </p:cNvSpPr>
+          <p:nvPr>
+            <p:ph type="hdr" sz="quarter"/>
+          </p:nvPr>
+        </p:nvSpPr>
+        <p:spPr>
+          <a:xfrm>
+            <a:off x="0" y="0"/>
+            <a:ext cx="2971800" cy="458788"/>
+          </a:xfrm>
+          <a:prstGeom prst="rect">
+            <a:avLst/>
+          </a:prstGeom>
+        </p:spPr>
+        <p:txBody>
+          <a:bodyPr vert="horz" lIns="91440" tIns="45720" rIns="91440" bIns="45720" rtlCol="0"/>
+          <a:lstStyle>
+            <a:lvl1pPr algn="l">
+              <a:defRPr sz="1200"/>
+            </a:lvl1pPr>
+          </a:lstStyle>
+          <a:p>
+            <a:endParaRPr lang="en-US"/>
+          </a:p>
+        </p:txBody>
+      </p:sp>
+      <p:sp>
+        <p:nvSpPr>
+          <p:cNvPr id="3" name="Date Placeholder 2"/>
+          <p:cNvSpPr>
+            <a:spLocks noGrp="1"/>
+          </p:cNvSpPr>
+          <p:nvPr>
+            <p:ph type="dt" idx="1"/>
+          </p:nvPr>
+        </p:nvSpPr>
+        <p:spPr>
+          <a:xfrm>
+            <a:off x="3884613" y="0"/>
+            <a:ext cx="2971800" cy="458788"/>
+          </a:xfrm>
+          <a:prstGeom prst="rect">
+            <a:avLst/>
+          </a:prstGeom>
+        </p:spPr>
+        <p:txBody>
+          <a:bodyPr vert="horz" lIns="91440" tIns="45720" rIns="91440" bIns="45720" rtlCol="0"/>
+          <a:lstStyle>
+            <a:lvl1pPr algn="r">
+              <a:defRPr sz="1200"/>
+            </a:lvl1pPr>
+          </a:lstStyle>
+          <a:p>
+            <a:fld id="{D3783812-3155-4067-99AC-A792419B44FD}" type="datetimeFigureOut">
+              <a:rPr lang="en-US" smtClean="0"/>
+              <a:t>5/23/2024</a:t>
+            </a:fld>
+            <a:endParaRPr lang="en-US"/>
+          </a:p>
+        </p:txBody>
+      </p:sp>
+      <p:sp>
+        <p:nvSpPr>
+          <p:cNvPr id="4" name="Slide Image Placeholder 3"/>
+          <p:cNvSpPr>
+            <a:spLocks noGrp="1" noRot="1" noChangeAspect="1"/>
+          </p:cNvSpPr>
+          <p:nvPr>
+            <p:ph type="sldImg" idx="2"/>
+          </p:nvPr>
+        </p:nvSpPr>
+        <p:spPr>
+          <a:xfrm>
+            <a:off x="2271713" y="1143000"/>
+            <a:ext cx="2314575" cy="3086100"/>
+          </a:xfrm>
+          <a:prstGeom prst="rect">
+            <a:avLst/>
+          </a:prstGeom>
+          <a:noFill/>
+          <a:ln w="12700">
+            <a:solidFill>
+              <a:prstClr val="black"/>
+            </a:solidFill>
+          </a:ln>
+        </p:spPr>
+        <p:txBody>
+          <a:bodyPr vert="horz" lIns="91440" tIns="45720" rIns="91440" bIns="45720" rtlCol="0" anchor="ctr"/>
+          <a:lstStyle/>
+          <a:p>
+            <a:endParaRPr lang="en-US"/>
+          </a:p>
+        </p:txBody>
+      </p:sp>
+      <p:sp>
+        <p:nvSpPr>
+          <p:cNvPr id="5" name="Notes Placeholder 4"/>
+          <p:cNvSpPr>
+            <a:spLocks noGrp="1"/>
+          </p:cNvSpPr>
+          <p:nvPr>
+            <p:ph type="body" sz="quarter" idx="3"/>
+          </p:nvPr>
+        </p:nvSpPr>
+        <p:spPr>
+          <a:xfrm>
+            <a:off x="685800" y="4400550"/>
+            <a:ext cx="5486400" cy="3600450"/>
+          </a:xfrm>
+          <a:prstGeom prst="rect">
+            <a:avLst/>
+          </a:prstGeom>
+        </p:spPr>
+        <p:txBody>
+          <a:bodyPr vert="horz" lIns="91440" tIns="45720" rIns="91440" bIns="45720" rtlCol="0"/>
+          <a:lstStyle/>
+          <a:p>
+            <a:pPr lvl="0"/>
+            <a:r>
+              <a:rPr lang="en-US"/>
+              <a:t>Click to edit Master text styles</a:t>
+            </a:r>
+          </a:p>
+          <a:p>
+            <a:pPr lvl="1"/>
+            <a:r>
+              <a:rPr lang="en-US"/>
+              <a:t>Second level</a:t>
+            </a:r>
+          </a:p>
+          <a:p>
+            <a:pPr lvl="2"/>
+            <a:r>
+              <a:rPr lang="en-US"/>
+              <a:t>Third level</a:t>
+            </a:r>
+          </a:p>
+          <a:p>
+            <a:pPr lvl="3"/>
+            <a:r>
+              <a:rPr lang="en-US"/>
+              <a:t>Fourth level</a:t>
+            </a:r>
+          </a:p>
+          <a:p>
+            <a:pPr lvl="4"/>
+            <a:r>
+              <a:rPr lang="en-US"/>
+              <a:t>Fifth level</a:t>
+            </a:r>
+          </a:p>
+        </p:txBody>
+      </p:sp>
+      <p:sp>
+        <p:nvSpPr>
+          <p:cNvPr id="6" name="Footer Placeholder 5"/>
+          <p:cNvSpPr>
+            <a:spLocks noGrp="1"/>
+          </p:cNvSpPr>
+          <p:nvPr>
+            <p:ph type="ftr" sz="quarter" idx="4"/>
+          </p:nvPr>
+        </p:nvSpPr>
+        <p:spPr>
+          <a:xfrm>
+            <a:off x="0" y="8685213"/>
+            <a:ext cx="2971800" cy="458787"/>
+          </a:xfrm>
+          <a:prstGeom prst="rect">
+            <a:avLst/>
+          </a:prstGeom>
+        </p:spPr>
+        <p:txBody>
+          <a:bodyPr vert="horz" lIns="91440" tIns="45720" rIns="91440" bIns="45720" rtlCol="0" anchor="b"/>
+          <a:lstStyle>
+            <a:lvl1pPr algn="l">
+              <a:defRPr sz="1200"/>
+            </a:lvl1pPr>
+          </a:lstStyle>
+          <a:p>
+            <a:endParaRPr lang="en-US"/>
+          </a:p>
+        </p:txBody>
+      </p:sp>
+      <p:sp>
+        <p:nvSpPr>
+          <p:cNvPr id="7" name="Slide Number Placeholder 6"/>
+          <p:cNvSpPr>
+            <a:spLocks noGrp="1"/>
+          </p:cNvSpPr>
+          <p:nvPr>
+            <p:ph type="sldNum" sz="quarter" idx="5"/>
+          </p:nvPr>
+        </p:nvSpPr>
+        <p:spPr>
+          <a:xfrm>
+            <a:off x="3884613" y="8685213"/>
+            <a:ext cx="2971800" cy="458787"/>
+          </a:xfrm>
+          <a:prstGeom prst="rect">
+            <a:avLst/>
+          </a:prstGeom>
+        </p:spPr>
+        <p:txBody>
+          <a:bodyPr vert="horz" lIns="91440" tIns="45720" rIns="91440" bIns="45720" rtlCol="0" anchor="b"/>
+          <a:lstStyle>
+            <a:lvl1pPr algn="r">
+              <a:defRPr sz="1200"/>
+            </a:lvl1pPr>
+          </a:lstStyle>
+          <a:p>
+            <a:fld id="{70D89FED-1D52-48ED-BA2E-CB3809146CDF}" type="slidenum">
+              <a:rPr lang="en-US" smtClean="0"/>
+              <a:t>‹#›</a:t>
+            </a:fld>
+            <a:endParaRPr lang="en-US"/>
+          </a:p>
+        </p:txBody>
+      </p:sp>
+    </p:spTree>
+    <p:extLst>
+      <p:ext uri="{BB962C8B-B14F-4D97-AF65-F5344CB8AC3E}">
+        <p14:creationId xmlns:p14="http://schemas.microsoft.com/office/powerpoint/2010/main" val="2620338663"/>
+      </p:ext>
+    </p:extLst>
+  </p:cSld>
+  <p:clrMap bg1="lt1" tx1="dk1" bg2="lt2" tx2="dk2" accent1="accent1" accent2="accent2" accent3="accent3" accent4="accent4" accent5="accent5" accent6="accent6" hlink="hlink" folHlink="folHlink"/>
+  <p:notesStyle>
+    <a:lvl1pPr marL="0" algn="l" defTabSz="914400" rtl="0" eaLnBrk="1" latinLnBrk="0" hangingPunct="1">
+      <a:defRPr sz="1200" kern="1200">
+        <a:solidFill>
+          <a:schemeClr val="tx1"/>
+        </a:solidFill>
+        <a:latin typeface="+mn-lt"/>
+        <a:ea typeface="+mn-ea"/>
+        <a:cs typeface="+mn-cs"/>
+      </a:defRPr>
+    </a:lvl1pPr>
+    <a:lvl2pPr marL="457200" algn="l" defTabSz="914400" rtl="0" eaLnBrk="1" latinLnBrk="0" hangingPunct="1">
+      <a:defRPr sz="1200" kern="1200">
+        <a:solidFill>
+          <a:schemeClr val="tx1"/>
+        </a:solidFill>
+        <a:latin typeface="+mn-lt"/>
+        <a:ea typeface="+mn-ea"/>
+        <a:cs typeface="+mn-cs"/>
+      </a:defRPr>
+    </a:lvl2pPr>
+    <a:lvl3pPr marL="914400" algn="l" defTabSz="914400" rtl="0" eaLnBrk="1" latinLnBrk="0" hangingPunct="1">
+      <a:defRPr sz="1200" kern="1200">
+        <a:solidFill>
+          <a:schemeClr val="tx1"/>
+        </a:solidFill>
+        <a:latin typeface="+mn-lt"/>
+        <a:ea typeface="+mn-ea"/>
+        <a:cs typeface="+mn-cs"/>
+      </a:defRPr>
+    </a:lvl3pPr>
+    <a:lvl4pPr marL="1371600" algn="l" defTabSz="914400" rtl="0" eaLnBrk="1" latinLnBrk="0" hangingPunct="1">
+      <a:defRPr sz="1200" kern="1200">
+        <a:solidFill>
+          <a:schemeClr val="tx1"/>
+        </a:solidFill>
+        <a:latin typeface="+mn-lt"/>
+        <a:ea typeface="+mn-ea"/>
+        <a:cs typeface="+mn-cs"/>
+      </a:defRPr>
+    </a:lvl4pPr>
+    <a:lvl5pPr marL="1828800" algn="l" defTabSz="914400" rtl="0" eaLnBrk="1" latinLnBrk="0" hangingPunct="1">
+      <a:defRPr sz="1200" kern="1200">
+        <a:solidFill>
+          <a:schemeClr val="tx1"/>
+        </a:solidFill>
+        <a:latin typeface="+mn-lt"/>
+        <a:ea typeface="+mn-ea"/>
+        <a:cs typeface="+mn-cs"/>
+      </a:defRPr>
+    </a:lvl5pPr>
+    <a:lvl6pPr marL="2286000" algn="l" defTabSz="914400" rtl="0" eaLnBrk="1" latinLnBrk="0" hangingPunct="1">
+      <a:defRPr sz="1200" kern="1200">
+        <a:solidFill>
+          <a:schemeClr val="tx1"/>
+        </a:solidFill>
+        <a:latin typeface="+mn-lt"/>
+        <a:ea typeface="+mn-ea"/>
+        <a:cs typeface="+mn-cs"/>
+      </a:defRPr>
+    </a:lvl6pPr>
+    <a:lvl7pPr marL="2743200" algn="l" defTabSz="914400" rtl="0" eaLnBrk="1" latinLnBrk="0" hangingPunct="1">
+      <a:defRPr sz="1200" kern="1200">
+        <a:solidFill>
+          <a:schemeClr val="tx1"/>
+        </a:solidFill>
+        <a:latin typeface="+mn-lt"/>
+        <a:ea typeface="+mn-ea"/>
+        <a:cs typeface="+mn-cs"/>
+      </a:defRPr>
+    </a:lvl7pPr>
+    <a:lvl8pPr marL="3200400" algn="l" defTabSz="914400" rtl="0" eaLnBrk="1" latinLnBrk="0" hangingPunct="1">
+      <a:defRPr sz="1200" kern="1200">
+        <a:solidFill>
+          <a:schemeClr val="tx1"/>
+        </a:solidFill>
+        <a:latin typeface="+mn-lt"/>
+        <a:ea typeface="+mn-ea"/>
+        <a:cs typeface="+mn-cs"/>
+      </a:defRPr>
+    </a:lvl8pPr>
+    <a:lvl9pPr marL="3657600" algn="l" defTabSz="914400" rtl="0" eaLnBrk="1" latinLnBrk="0" hangingPunct="1">
+      <a:defRPr sz="1200" kern="1200">
+        <a:solidFill>
+          <a:schemeClr val="tx1"/>
+        </a:solidFill>
+        <a:latin typeface="+mn-lt"/>
+        <a:ea typeface="+mn-ea"/>
+        <a:cs typeface="+mn-cs"/>
+      </a:defRPr>
+    </a:lvl9pPr>
+  </p:notesStyle>
+</p:notesMaster>
+</file>
+
+<file path=ppt/notesSlides/notesSlide1.xml><?xml version="1.0" encoding="utf-8"?>
+<p:notes xmlns:a="http://schemas.openxmlformats.org/drawingml/2006/main" xmlns:r="http://schemas.openxmlformats.org/officeDocument/2006/relationships" xmlns:p="http://schemas.openxmlformats.org/presentationml/2006/main">
+  <p:cSld>
+    <p:spTree>
+      <p:nvGrpSpPr>
+        <p:cNvPr id="1" name=""/>
+        <p:cNvGrpSpPr/>
+        <p:nvPr/>
+      </p:nvGrpSpPr>
+      <p:grpSpPr>
+        <a:xfrm>
+          <a:off x="0" y="0"/>
+          <a:ext cx="0" cy="0"/>
+          <a:chOff x="0" y="0"/>
+          <a:chExt cx="0" cy="0"/>
+        </a:xfrm>
+      </p:grpSpPr>
+      <p:sp>
+        <p:nvSpPr>
+          <p:cNvPr id="2" name="Slide Image Placeholder 1"/>
+          <p:cNvSpPr>
+            <a:spLocks noGrp="1" noRot="1" noChangeAspect="1"/>
+          </p:cNvSpPr>
+          <p:nvPr>
+            <p:ph type="sldImg"/>
+          </p:nvPr>
+        </p:nvSpPr>
+        <p:spPr/>
+      </p:sp>
+      <p:sp>
+        <p:nvSpPr>
+          <p:cNvPr id="3" name="Notes Placeholder 2"/>
+          <p:cNvSpPr>
+            <a:spLocks noGrp="1"/>
+          </p:cNvSpPr>
+          <p:nvPr>
+            <p:ph type="body" idx="1"/>
+          </p:nvPr>
+        </p:nvSpPr>
+        <p:spPr/>
+        <p:txBody>
+          <a:bodyPr/>
+          <a:lstStyle/>
+          <a:p>
+            <a:endParaRPr lang="en-US" dirty="0"/>
+          </a:p>
+        </p:txBody>
+      </p:sp>
+      <p:sp>
+        <p:nvSpPr>
+          <p:cNvPr id="4" name="Slide Number Placeholder 3"/>
+          <p:cNvSpPr>
+            <a:spLocks noGrp="1"/>
+          </p:cNvSpPr>
+          <p:nvPr>
+            <p:ph type="sldNum" sz="quarter" idx="5"/>
+          </p:nvPr>
+        </p:nvSpPr>
+        <p:spPr/>
+        <p:txBody>
+          <a:bodyPr/>
+          <a:lstStyle/>
+          <a:p>
+            <a:fld id="{70D89FED-1D52-48ED-BA2E-CB3809146CDF}" type="slidenum">
+              <a:rPr lang="en-US" smtClean="0"/>
+              <a:t>1</a:t>
+            </a:fld>
+            <a:endParaRPr lang="en-US"/>
+          </a:p>
+        </p:txBody>
+      </p:sp>
+    </p:spTree>
+    <p:extLst>
+      <p:ext uri="{BB962C8B-B14F-4D97-AF65-F5344CB8AC3E}">
+        <p14:creationId xmlns:p14="http://schemas.microsoft.com/office/powerpoint/2010/main" val="2578986965"/>
+      </p:ext>
+    </p:extLst>
+  </p:cSld>
+  <p:clrMapOvr>
+    <a:masterClrMapping/>
+  </p:clrMapOvr>
+</p:notes>
+</file>
+
 <file path=ppt/slideLayouts/slideLayout1.xml><?xml version="1.0" encoding="utf-8"?>
 <p:sldLayout xmlns:a="http://schemas.openxmlformats.org/drawingml/2006/main" xmlns:r="http://schemas.openxmlformats.org/officeDocument/2006/relationships" xmlns:p="http://schemas.openxmlformats.org/presentationml/2006/main" type="title" preserve="1">
   <p:cSld name="Diapositive de titre">
@@ -243,7 +679,7 @@
           <a:p>
             <a:fld id="{70533FD3-F370-458C-BCE8-160857C0EEE2}" type="datetimeFigureOut">
               <a:rPr lang="fr-FR" smtClean="0"/>
-              <a:t>21/05/2024</a:t>
+              <a:t>23/05/2024</a:t>
             </a:fld>
             <a:endParaRPr lang="fr-FR"/>
           </a:p>
@@ -413,7 +849,7 @@
           <a:p>
             <a:fld id="{70533FD3-F370-458C-BCE8-160857C0EEE2}" type="datetimeFigureOut">
               <a:rPr lang="fr-FR" smtClean="0"/>
-              <a:t>21/05/2024</a:t>
+              <a:t>23/05/2024</a:t>
             </a:fld>
             <a:endParaRPr lang="fr-FR"/>
           </a:p>
@@ -593,7 +1029,7 @@
           <a:p>
             <a:fld id="{70533FD3-F370-458C-BCE8-160857C0EEE2}" type="datetimeFigureOut">
               <a:rPr lang="fr-FR" smtClean="0"/>
-              <a:t>21/05/2024</a:t>
+              <a:t>23/05/2024</a:t>
             </a:fld>
             <a:endParaRPr lang="fr-FR"/>
           </a:p>
@@ -763,7 +1199,7 @@
           <a:p>
             <a:fld id="{70533FD3-F370-458C-BCE8-160857C0EEE2}" type="datetimeFigureOut">
               <a:rPr lang="fr-FR" smtClean="0"/>
-              <a:t>21/05/2024</a:t>
+              <a:t>23/05/2024</a:t>
             </a:fld>
             <a:endParaRPr lang="fr-FR"/>
           </a:p>
@@ -1009,7 +1445,7 @@
           <a:p>
             <a:fld id="{70533FD3-F370-458C-BCE8-160857C0EEE2}" type="datetimeFigureOut">
               <a:rPr lang="fr-FR" smtClean="0"/>
-              <a:t>21/05/2024</a:t>
+              <a:t>23/05/2024</a:t>
             </a:fld>
             <a:endParaRPr lang="fr-FR"/>
           </a:p>
@@ -1241,7 +1677,7 @@
           <a:p>
             <a:fld id="{70533FD3-F370-458C-BCE8-160857C0EEE2}" type="datetimeFigureOut">
               <a:rPr lang="fr-FR" smtClean="0"/>
-              <a:t>21/05/2024</a:t>
+              <a:t>23/05/2024</a:t>
             </a:fld>
             <a:endParaRPr lang="fr-FR"/>
           </a:p>
@@ -1608,7 +2044,7 @@
           <a:p>
             <a:fld id="{70533FD3-F370-458C-BCE8-160857C0EEE2}" type="datetimeFigureOut">
               <a:rPr lang="fr-FR" smtClean="0"/>
-              <a:t>21/05/2024</a:t>
+              <a:t>23/05/2024</a:t>
             </a:fld>
             <a:endParaRPr lang="fr-FR"/>
           </a:p>
@@ -1726,7 +2162,7 @@
           <a:p>
             <a:fld id="{70533FD3-F370-458C-BCE8-160857C0EEE2}" type="datetimeFigureOut">
               <a:rPr lang="fr-FR" smtClean="0"/>
-              <a:t>21/05/2024</a:t>
+              <a:t>23/05/2024</a:t>
             </a:fld>
             <a:endParaRPr lang="fr-FR"/>
           </a:p>
@@ -1821,7 +2257,7 @@
           <a:p>
             <a:fld id="{70533FD3-F370-458C-BCE8-160857C0EEE2}" type="datetimeFigureOut">
               <a:rPr lang="fr-FR" smtClean="0"/>
-              <a:t>21/05/2024</a:t>
+              <a:t>23/05/2024</a:t>
             </a:fld>
             <a:endParaRPr lang="fr-FR"/>
           </a:p>
@@ -2098,7 +2534,7 @@
           <a:p>
             <a:fld id="{70533FD3-F370-458C-BCE8-160857C0EEE2}" type="datetimeFigureOut">
               <a:rPr lang="fr-FR" smtClean="0"/>
-              <a:t>21/05/2024</a:t>
+              <a:t>23/05/2024</a:t>
             </a:fld>
             <a:endParaRPr lang="fr-FR"/>
           </a:p>
@@ -2355,7 +2791,7 @@
           <a:p>
             <a:fld id="{70533FD3-F370-458C-BCE8-160857C0EEE2}" type="datetimeFigureOut">
               <a:rPr lang="fr-FR" smtClean="0"/>
-              <a:t>21/05/2024</a:t>
+              <a:t>23/05/2024</a:t>
             </a:fld>
             <a:endParaRPr lang="fr-FR"/>
           </a:p>
@@ -2568,7 +3004,7 @@
           <a:p>
             <a:fld id="{70533FD3-F370-458C-BCE8-160857C0EEE2}" type="datetimeFigureOut">
               <a:rPr lang="fr-FR" smtClean="0"/>
-              <a:t>21/05/2024</a:t>
+              <a:t>23/05/2024</a:t>
             </a:fld>
             <a:endParaRPr lang="fr-FR"/>
           </a:p>
@@ -3100,7 +3536,7 @@
                 </a:solidFill>
                 <a:latin typeface="Gill Sans Nova" panose="020B0602020104020203" pitchFamily="34" charset="0"/>
               </a:rPr>
-              <a:t>In presence of unavoidable input phase aberrations, the system is not able to perfectly cancel the star light. By performing many observations, we obtain some intensity distribution intensity at the kernels output.</a:t>
+              <a:t>In the presence of unavoidable input phase aberrations, the system is not able to perfectly cancel the star light. By performing many observations, we obtain some intensity distribution intensity at the kernels’ output.</a:t>
             </a:r>
           </a:p>
           <a:p>
@@ -3333,7 +3769,7 @@
                 </a:solidFill>
                 <a:latin typeface="Gill Sans Nova" panose="020B0602020104020203" pitchFamily="34" charset="0"/>
               </a:rPr>
-              <a:t>The presence of an exoplanet in the field of view result in a shift of the distribution. The brighter the planet, the more pronounced the shift will be. When one increase the contrast, both distributions quickly become hard to distinguish. One then study different statistical (Fig. 11) tests to determine the one offering the best detection reliability.</a:t>
+              <a:t>The presence of an exoplanet in the field of view results in a shift of the distribution. The brighter the planet, the more pronounced the shift will be. When one increases the contrast, both distributions quickly become hard to distinguish. We then study different statistical (Fig. 11) tests to determine the one offering the best detection reliability.</a:t>
             </a:r>
             <a:endParaRPr lang="en-US" sz="3000" dirty="0">
               <a:solidFill>
@@ -3363,8 +3799,8 @@
             <a:chExt cx="31514388" cy="29425807"/>
           </a:xfrm>
         </p:grpSpPr>
-        <mc:AlternateContent xmlns:mc="http://schemas.openxmlformats.org/markup-compatibility/2006" xmlns:a14="http://schemas.microsoft.com/office/drawing/2010/main">
-          <mc:Choice Requires="a14">
+        <mc:AlternateContent xmlns:mc="http://schemas.openxmlformats.org/markup-compatibility/2006">
+          <mc:Choice xmlns:a14="http://schemas.microsoft.com/office/drawing/2010/main" Requires="a14">
             <p:sp>
               <p:nvSpPr>
                 <p:cNvPr id="5" name="Rectangle : coins arrondis 4">
@@ -3381,8 +3817,8 @@
               </p:nvSpPr>
               <p:spPr>
                 <a:xfrm>
-                  <a:off x="442451" y="25439655"/>
-                  <a:ext cx="10064094" cy="7047091"/>
+                  <a:off x="442451" y="25439656"/>
+                  <a:ext cx="10064094" cy="6386544"/>
                 </a:xfrm>
                 <a:prstGeom prst="roundRect">
                   <a:avLst>
@@ -3487,7 +3923,7 @@
                       </a:solidFill>
                       <a:latin typeface="Gill Sans Nova" panose="020B0602020104020203" pitchFamily="34" charset="0"/>
                     </a:rPr>
-                    <a:t>Coming from telecom technologies, the thermo-optic phase shifters consist in heating a fiber core using an electrode to increase the optical index and then induce an artificial </a:t>
+                    <a:t>Coming from telecom technologies, the thermo-optic phase shifters consist of heating a fiber core using an electrode to increase the optical index and thus induce an artificial </a:t>
                   </a:r>
                   <a:r>
                     <a:rPr lang="en-US" sz="3000" b="1" dirty="0">
@@ -3658,7 +4094,7 @@
               </p:txBody>
             </p:sp>
           </mc:Choice>
-          <mc:Fallback xmlns="">
+          <mc:Fallback>
             <p:sp>
               <p:nvSpPr>
                 <p:cNvPr id="5" name="Rectangle : coins arrondis 4">
@@ -3675,8 +4111,8 @@
               </p:nvSpPr>
               <p:spPr>
                 <a:xfrm>
-                  <a:off x="442451" y="25439655"/>
-                  <a:ext cx="10064094" cy="7047091"/>
+                  <a:off x="442451" y="25439656"/>
+                  <a:ext cx="10064094" cy="6386544"/>
                 </a:xfrm>
                 <a:prstGeom prst="roundRect">
                   <a:avLst>
@@ -3684,7 +4120,7 @@
                   </a:avLst>
                 </a:prstGeom>
                 <a:blipFill>
-                  <a:blip r:embed="rId2"/>
+                  <a:blip r:embed="rId3"/>
                   <a:stretch>
                     <a:fillRect/>
                   </a:stretch>
@@ -3867,7 +4303,7 @@
                           <a:latin typeface="Gill Sans Nova" panose="020B0602020104020203" pitchFamily="34" charset="0"/>
                           <a:cs typeface="Aharoni" panose="020F0502020204030204" pitchFamily="2" charset="-79"/>
                         </a:rPr>
-                        <a:t>This poster present a thesis that aim to enhance nulling interferometry for exoplanet detection using a four-telescope architecture named Kernel-</a:t>
+                        <a:t>This poster presents a thesis that aims to enhance nulling interferometry for exoplanet detection using a four-telescope architecture named Kernel-</a:t>
                       </a:r>
                       <a:r>
                         <a:rPr lang="en-US" sz="3000" dirty="0" err="1">
@@ -3887,7 +4323,7 @@
                           <a:latin typeface="Gill Sans Nova" panose="020B0602020104020203" pitchFamily="34" charset="0"/>
                           <a:cs typeface="Aharoni" panose="020F0502020204030204" pitchFamily="2" charset="-79"/>
                         </a:rPr>
-                        <a:t>. By integrating 14 active phase shifters, we aim to mitigate phase aberrations caused by manufacturing defects.  A first objective is to develop a technique that allow to find the good shifts to inject to optimize the component performances. A second step consists in analyzing intensity distributions produced and applying statistical tests and machine learning to extract valuable information. This poster present the preliminary results.</a:t>
+                        <a:t>. By integrating 14 active phase shifters, we aim to mitigate phase aberrations caused by manufacturing defects.  A first objective is to develop a technique that allows to find the best shifts to inject to optimize the component performance. A second step consists of analyzing intensity distributions produced and applying statistical tests and machine learning to extract valuable information. This poster presents the preliminary results.</a:t>
                       </a:r>
                     </a:p>
                   </p:txBody>
@@ -3985,7 +4421,7 @@
                               </a:solidFill>
                               <a:latin typeface="Gill Sans Nova" panose="020B0602020104020203" pitchFamily="34" charset="0"/>
                             </a:rPr>
-                            <a:t>To find the best phase shifts to introduce, I proposed an algorithm inspired from dichotomy and gradient descent that accepts or rejects steps in the parameter space according to the bright </a:t>
+                            <a:t>To find the best phase shifts to introduce, I proposed an algorithm inspired by dichotomy and gradient descent that accepts or rejects steps in the parameter space according to the bright </a:t>
                           </a:r>
                           <a14:m>
                             <m:oMath xmlns:m="http://schemas.openxmlformats.org/officeDocument/2006/math">
@@ -4589,7 +5025,7 @@
                           </a:avLst>
                         </a:prstGeom>
                         <a:blipFill>
-                          <a:blip r:embed="rId3"/>
+                          <a:blip r:embed="rId4"/>
                           <a:stretch>
                             <a:fillRect/>
                           </a:stretch>
@@ -4740,7 +5176,7 @@
                           <a:ea typeface="+mn-ea"/>
                           <a:cs typeface="+mn-cs"/>
                         </a:rPr>
-                        <a:t>Taking advantage of the earth rotation</a:t>
+                        <a:t>Taking advantage of the Earth’s rotation</a:t>
                       </a:r>
                       <a:r>
                         <a:rPr lang="en-US" sz="3000" dirty="0">
@@ -4749,7 +5185,7 @@
                           </a:solidFill>
                           <a:latin typeface="Gill Sans Nova" panose="020B0602020104020203" pitchFamily="34" charset="0"/>
                         </a:rPr>
-                        <a:t>, the kernel distribution will shift according to a known modulation. For each kernel output, one fit this modulation to the data points, giving the position and contrast of the potential object. By averaging all these parameter and computing a global fit, we can then see if this last one is well correlated to each kernel modulation.</a:t>
+                        <a:t>, the kernel distribution will shift according to a known modulation (Fig. 3). For each kernel output, one fits this modulation to the data points, giving the position and contrast of the potential object. By averaging all these parameters and computing a global fit, we can then see if this latter is well correlated with each kernel modulation.</a:t>
                       </a:r>
                       <a:endParaRPr lang="en-US" sz="3000" dirty="0">
                         <a:solidFill>
@@ -4931,7 +5367,7 @@
                         </a:solidFill>
                         <a:latin typeface="Gill Sans Nova" panose="020B0602020104020203" pitchFamily="34" charset="0"/>
                       </a:rPr>
-                      <a:t>This technique consist in taking advantage of the angular separation and the coherence properties of the light to destroy the star light without destroying the one coming from the planet. Our approach</a:t>
+                      <a:t>This technique consists in taking advantage of the angular separation and the coherence properties of the light to destroy the star light without destroying the one coming from the planet. Our approach</a:t>
                     </a:r>
                   </a:p>
                   <a:p>
@@ -4957,7 +5393,7 @@
                         </a:solidFill>
                         <a:latin typeface="Gill Sans Nova" panose="020B0602020104020203" pitchFamily="34" charset="0"/>
                       </a:rPr>
-                      <a:t>enhance this principle by</a:t>
+                      <a:t>enhances this principle by</a:t>
                     </a:r>
                   </a:p>
                   <a:p>
@@ -5228,8 +5664,8 @@
                 </p:txBody>
               </p:sp>
             </p:grpSp>
-            <mc:AlternateContent xmlns:mc="http://schemas.openxmlformats.org/markup-compatibility/2006" xmlns:a14="http://schemas.microsoft.com/office/drawing/2010/main">
-              <mc:Choice Requires="a14">
+            <mc:AlternateContent xmlns:mc="http://schemas.openxmlformats.org/markup-compatibility/2006">
+              <mc:Choice xmlns:a14="http://schemas.microsoft.com/office/drawing/2010/main" Requires="a14">
                 <p:sp>
                   <p:nvSpPr>
                     <p:cNvPr id="31" name="Rectangle : coins arrondis 30">
@@ -5386,7 +5822,7 @@
                           </a:solidFill>
                           <a:latin typeface="Gill Sans Nova" panose="020B0602020104020203" pitchFamily="34" charset="0"/>
                         </a:rPr>
-                        <a:t> results are mitigated by the persistent sensibility to high order phase aberration. A contrast of </a:t>
+                        <a:t> results are mitigated by the persistent sensitivity to high order phase aberration. A contrast of </a:t>
                       </a:r>
                       <a14:m>
                         <m:oMath xmlns:m="http://schemas.openxmlformats.org/officeDocument/2006/math">
@@ -5448,7 +5884,7 @@
                           <a:uFillTx/>
                           <a:latin typeface="Gill Sans Nova" panose="020B0602020104020203" pitchFamily="34" charset="0"/>
                         </a:rPr>
-                        <a:t> require an </a:t>
+                        <a:t> requires an </a:t>
                       </a:r>
                       <a:r>
                         <a:rPr kumimoji="0" lang="en-US" sz="3000" b="1" i="0" u="none" strike="noStrike" kern="1200" cap="none" spc="0" normalizeH="0" baseline="0" noProof="0" dirty="0">
@@ -5478,7 +5914,7 @@
                           <a:uFillTx/>
                           <a:latin typeface="Gill Sans Nova" panose="020B0602020104020203" pitchFamily="34" charset="0"/>
                         </a:rPr>
-                        <a:t> correction that bring phase aberrations below </a:t>
+                        <a:t> correction that brings phase aberrations below </a:t>
                       </a:r>
                       <a14:m>
                         <m:oMath xmlns:m="http://schemas.openxmlformats.org/officeDocument/2006/math">
@@ -5581,7 +6017,7 @@
                           </a:solidFill>
                           <a:latin typeface="Gill Sans Nova" panose="020B0602020104020203" pitchFamily="34" charset="0"/>
                         </a:rPr>
-                        <a:t>Also, three</a:t>
+                        <a:t>Also, the </a:t>
                       </a:r>
                       <a:r>
                         <a:rPr kumimoji="0" lang="en-US" sz="3000" b="0" i="0" u="none" strike="noStrike" kern="1200" cap="none" spc="0" normalizeH="0" noProof="0" dirty="0">
@@ -5596,7 +6032,7 @@
                           <a:uFillTx/>
                           <a:latin typeface="Gill Sans Nova" panose="020B0602020104020203" pitchFamily="34" charset="0"/>
                         </a:rPr>
-                        <a:t> of the main prospects will consist to </a:t>
+                        <a:t>prospects will consist of </a:t>
                       </a:r>
                       <a:r>
                         <a:rPr lang="en-US" sz="3000" dirty="0">
@@ -5605,7 +6041,7 @@
                           </a:solidFill>
                           <a:latin typeface="Gill Sans Nova" panose="020B0602020104020203" pitchFamily="34" charset="0"/>
                         </a:rPr>
-                        <a:t>deeply investigate which is the best estimator, </a:t>
+                        <a:t>deeply investigating which is the best test statistic (and consider new ones), </a:t>
                       </a:r>
                       <a:r>
                         <a:rPr kumimoji="0" lang="en-US" sz="3000" b="0" i="0" u="none" strike="noStrike" kern="1200" cap="none" spc="0" normalizeH="0" noProof="0" dirty="0">
@@ -5620,7 +6056,7 @@
                           <a:uFillTx/>
                           <a:latin typeface="Gill Sans Nova" panose="020B0602020104020203" pitchFamily="34" charset="0"/>
                         </a:rPr>
-                        <a:t>make these simulations chromatic and confirm these results on a test bed.</a:t>
+                        <a:t>making these simulations chromatic and confirming these results on a test bed.</a:t>
                       </a:r>
                       <a:endParaRPr kumimoji="0" lang="en-US" sz="3000" b="0" i="0" u="none" strike="noStrike" kern="1200" cap="none" spc="0" normalizeH="0" baseline="0" noProof="0" dirty="0">
                         <a:ln>
@@ -5638,7 +6074,7 @@
                   </p:txBody>
                 </p:sp>
               </mc:Choice>
-              <mc:Fallback xmlns="">
+              <mc:Fallback>
                 <p:sp>
                   <p:nvSpPr>
                     <p:cNvPr id="31" name="Rectangle : coins arrondis 30">
@@ -5664,7 +6100,7 @@
                       </a:avLst>
                     </a:prstGeom>
                     <a:blipFill>
-                      <a:blip r:embed="rId4"/>
+                      <a:blip r:embed="rId5"/>
                       <a:stretch>
                         <a:fillRect/>
                       </a:stretch>
@@ -5705,8 +6141,8 @@
             </p:nvSpPr>
             <p:spPr>
               <a:xfrm>
-                <a:off x="400085" y="32932800"/>
-                <a:ext cx="10064094" cy="5752898"/>
+                <a:off x="400085" y="32272256"/>
+                <a:ext cx="10064094" cy="6413442"/>
               </a:xfrm>
               <a:prstGeom prst="roundRect">
                 <a:avLst>
@@ -5767,7 +6203,7 @@
                     </a:solidFill>
                     <a:latin typeface="Gill Sans Nova" panose="020B0602020104020203" pitchFamily="34" charset="0"/>
                   </a:rPr>
-                  <a:t>The idea of our architecture is to combine the nulling interferometry with the phase shifter technologies to make an active optical component that can be calibrated to compensate the phase aberration induced by the manufacturing defects.</a:t>
+                  <a:t>The idea of our architecture is to combine the nulling interferometry with the phase shifter technology to make an active optical component that can be calibrated to compensate the phase aberration induced by manufacturing defects.</a:t>
                 </a:r>
               </a:p>
             </p:txBody>
@@ -6199,7 +6635,7 @@
         </p:nvGrpSpPr>
         <p:grpSpPr>
           <a:xfrm>
-            <a:off x="1504335" y="6309202"/>
+            <a:off x="1504335" y="6411621"/>
             <a:ext cx="29231304" cy="2633337"/>
             <a:chOff x="1916576" y="5806722"/>
             <a:chExt cx="26383063" cy="2376750"/>
@@ -6220,7 +6656,7 @@
             <p:nvPr/>
           </p:nvPicPr>
           <p:blipFill>
-            <a:blip r:embed="rId5">
+            <a:blip r:embed="rId6">
               <a:extLst>
                 <a:ext uri="{28A0092B-C50C-407E-A947-70E740481C1C}">
                   <a14:useLocalDpi xmlns:a14="http://schemas.microsoft.com/office/drawing/2010/main" val="0"/>
@@ -6256,7 +6692,7 @@
             <p:nvPr/>
           </p:nvPicPr>
           <p:blipFill>
-            <a:blip r:embed="rId6">
+            <a:blip r:embed="rId7">
               <a:extLst>
                 <a:ext uri="{28A0092B-C50C-407E-A947-70E740481C1C}">
                   <a14:useLocalDpi xmlns:a14="http://schemas.microsoft.com/office/drawing/2010/main" val="0"/>
@@ -6292,7 +6728,7 @@
             <p:nvPr/>
           </p:nvPicPr>
           <p:blipFill>
-            <a:blip r:embed="rId7">
+            <a:blip r:embed="rId8">
               <a:extLst>
                 <a:ext uri="{28A0092B-C50C-407E-A947-70E740481C1C}">
                   <a14:useLocalDpi xmlns:a14="http://schemas.microsoft.com/office/drawing/2010/main" val="0"/>
@@ -6328,7 +6764,7 @@
             <p:nvPr/>
           </p:nvPicPr>
           <p:blipFill>
-            <a:blip r:embed="rId8">
+            <a:blip r:embed="rId9">
               <a:extLst>
                 <a:ext uri="{28A0092B-C50C-407E-A947-70E740481C1C}">
                   <a14:useLocalDpi xmlns:a14="http://schemas.microsoft.com/office/drawing/2010/main" val="0"/>
@@ -6385,7 +6821,7 @@
             <p:nvPr/>
           </p:nvPicPr>
           <p:blipFill>
-            <a:blip r:embed="rId9">
+            <a:blip r:embed="rId10">
               <a:extLst>
                 <a:ext uri="{28A0092B-C50C-407E-A947-70E740481C1C}">
                   <a14:useLocalDpi xmlns:a14="http://schemas.microsoft.com/office/drawing/2010/main" val="0"/>
@@ -6445,7 +6881,7 @@
                   </a:solidFill>
                   <a:latin typeface="Gill Sans Nova" panose="020B0602020104020203" pitchFamily="34" charset="0"/>
                 </a:rPr>
-                <a:t>Figure 2: Concept of nulling. The signals are placed in phase opposition to destroy the on-axis source and let pass the light from nearby objects</a:t>
+                <a:t>Figure 2: Concept of nulling. The signals are placed in phase opposition to destroy the on-axis source and let the light from nearby objects</a:t>
               </a:r>
             </a:p>
           </p:txBody>
@@ -6465,7 +6901,7 @@
         </p:nvGrpSpPr>
         <p:grpSpPr>
           <a:xfrm>
-            <a:off x="1323722" y="30004298"/>
+            <a:off x="1366088" y="29238923"/>
             <a:ext cx="8216820" cy="2260271"/>
             <a:chOff x="22824491" y="33574643"/>
             <a:chExt cx="8216820" cy="2260271"/>
@@ -6486,7 +6922,7 @@
             <p:nvPr/>
           </p:nvPicPr>
           <p:blipFill>
-            <a:blip r:embed="rId10">
+            <a:blip r:embed="rId11">
               <a:extLst>
                 <a:ext uri="{28A0092B-C50C-407E-A947-70E740481C1C}">
                   <a14:useLocalDpi xmlns:a14="http://schemas.microsoft.com/office/drawing/2010/main" val="0"/>
@@ -6587,7 +7023,7 @@
             <p:nvPr/>
           </p:nvPicPr>
           <p:blipFill>
-            <a:blip r:embed="rId11"/>
+            <a:blip r:embed="rId12"/>
             <a:stretch>
               <a:fillRect/>
             </a:stretch>
@@ -6685,7 +7121,7 @@
           <p:nvPr/>
         </p:nvPicPr>
         <p:blipFill>
-          <a:blip r:embed="rId12">
+          <a:blip r:embed="rId13">
             <a:extLst>
               <a:ext uri="{28A0092B-C50C-407E-A947-70E740481C1C}">
                 <a14:useLocalDpi xmlns:a14="http://schemas.microsoft.com/office/drawing/2010/main" val="0"/>
@@ -6720,10 +7156,10 @@
         </p:nvGrpSpPr>
         <p:grpSpPr>
           <a:xfrm>
-            <a:off x="788938" y="36042873"/>
-            <a:ext cx="8771563" cy="2347261"/>
-            <a:chOff x="11437327" y="17790873"/>
-            <a:chExt cx="8771563" cy="2347261"/>
+            <a:off x="773712" y="35347334"/>
+            <a:ext cx="8786790" cy="3100283"/>
+            <a:chOff x="11422101" y="17095334"/>
+            <a:chExt cx="8786790" cy="3100283"/>
           </a:xfrm>
         </p:grpSpPr>
         <p:pic>
@@ -6741,15 +7177,15 @@
             <p:nvPr/>
           </p:nvPicPr>
           <p:blipFill>
-            <a:blip r:embed="rId13"/>
+            <a:blip r:embed="rId14"/>
             <a:stretch>
               <a:fillRect/>
             </a:stretch>
           </p:blipFill>
           <p:spPr>
             <a:xfrm>
-              <a:off x="17147059" y="17790873"/>
-              <a:ext cx="3061831" cy="2347261"/>
+              <a:off x="16164797" y="17095334"/>
+              <a:ext cx="4044094" cy="3100283"/>
             </a:xfrm>
             <a:prstGeom prst="rect">
               <a:avLst/>
@@ -6770,8 +7206,8 @@
           </p:nvSpPr>
           <p:spPr>
             <a:xfrm>
-              <a:off x="11437327" y="18207201"/>
-              <a:ext cx="5640120" cy="1569660"/>
+              <a:off x="11422101" y="17756125"/>
+              <a:ext cx="4522991" cy="1938992"/>
             </a:xfrm>
             <a:prstGeom prst="rect">
               <a:avLst/>
@@ -6794,7 +7230,7 @@
                   </a:solidFill>
                   <a:latin typeface="Gill Sans Nova" panose="020B0602020104020203" pitchFamily="34" charset="0"/>
                 </a:rPr>
-                <a:t>Figure 5: Picture of the waffle that contain several prototype architectures of Kernel-</a:t>
+                <a:t>Figure 5: Picture of the wafer that contains several prototype architectures of Kernel-</a:t>
               </a:r>
               <a:r>
                 <a:rPr lang="en-US" sz="2400" dirty="0" err="1">
@@ -6879,7 +7315,7 @@
               <p:nvPr/>
             </p:nvPicPr>
             <p:blipFill>
-              <a:blip r:embed="rId14"/>
+              <a:blip r:embed="rId15"/>
               <a:stretch>
                 <a:fillRect/>
               </a:stretch>
@@ -6909,7 +7345,7 @@
               <p:nvPr/>
             </p:nvPicPr>
             <p:blipFill>
-              <a:blip r:embed="rId15"/>
+              <a:blip r:embed="rId16"/>
               <a:stretch>
                 <a:fillRect/>
               </a:stretch>
@@ -6964,7 +7400,7 @@
                   </a:solidFill>
                   <a:latin typeface="Gill Sans Nova" panose="020B0602020104020203" pitchFamily="34" charset="0"/>
                 </a:rPr>
-                <a:t>Figure 6: phase and amplitude of the 4 input signals on the 6 dark outputs before (top) and after (bottom) the calibration process</a:t>
+                <a:t>Figure 6: Phase and amplitude of the 4 input signals on the 6 dark outputs before (top) and after (bottom) the calibration process</a:t>
               </a:r>
             </a:p>
           </p:txBody>
@@ -7107,7 +7543,7 @@
                 </a:solidFill>
                 <a:latin typeface="Gill Sans Nova" panose="020B0602020104020203" pitchFamily="34" charset="0"/>
               </a:rPr>
-              <a:t>By weighting the kernel transmission map by the output intensity and integrating it over the parallactic angle, we can dress a map of the source of input light. By cumulating the 3 maps, one can constrain precisely which part of the sky contributed the most to the data we have. Thus, this process reveal the approximative object location, spreaded by the input phase aberrations.</a:t>
+              <a:t>By weighting the kernel transmission map by the output intensity and integrating it over the parallactic angle, we can create a map of the source of input light. By combining the 3 maps, one can constrain precisely which part of the sky contributed the most to the data we have. Thus, this process reveals the approximative object location, spread by the input phase aberrations.</a:t>
             </a:r>
             <a:endParaRPr kumimoji="0" lang="en-US" sz="3000" b="0" i="0" u="none" strike="noStrike" kern="1200" cap="none" spc="0" normalizeH="0" baseline="0" noProof="0" dirty="0">
               <a:ln>
@@ -7169,7 +7605,7 @@
             <p:nvPr/>
           </p:nvPicPr>
           <p:blipFill>
-            <a:blip r:embed="rId16"/>
+            <a:blip r:embed="rId17"/>
             <a:stretch>
               <a:fillRect/>
             </a:stretch>
@@ -7184,8 +7620,8 @@
             </a:prstGeom>
           </p:spPr>
         </p:pic>
-        <mc:AlternateContent xmlns:mc="http://schemas.openxmlformats.org/markup-compatibility/2006">
-          <mc:Choice xmlns:a14="http://schemas.microsoft.com/office/drawing/2010/main" Requires="a14">
+        <mc:AlternateContent xmlns:mc="http://schemas.openxmlformats.org/markup-compatibility/2006" xmlns:a14="http://schemas.microsoft.com/office/drawing/2010/main">
+          <mc:Choice Requires="a14">
             <p:sp>
               <p:nvSpPr>
                 <p:cNvPr id="71" name="ZoneTexte 70">
@@ -7369,7 +7805,7 @@
               </p:txBody>
             </p:sp>
           </mc:Choice>
-          <mc:Fallback>
+          <mc:Fallback xmlns="">
             <p:sp>
               <p:nvSpPr>
                 <p:cNvPr id="71" name="ZoneTexte 70">
@@ -7393,7 +7829,7 @@
                   <a:avLst/>
                 </a:prstGeom>
                 <a:blipFill>
-                  <a:blip r:embed="rId17"/>
+                  <a:blip r:embed="rId18"/>
                   <a:stretch>
                     <a:fillRect l="-958" t="-4061" r="-1915" b="-10660"/>
                   </a:stretch>
@@ -7450,7 +7886,7 @@
             <p:nvPr/>
           </p:nvPicPr>
           <p:blipFill rotWithShape="1">
-            <a:blip r:embed="rId18"/>
+            <a:blip r:embed="rId19"/>
             <a:srcRect r="50887"/>
             <a:stretch/>
           </p:blipFill>
@@ -7479,7 +7915,7 @@
           <p:spPr>
             <a:xfrm>
               <a:off x="16421587" y="34620397"/>
-              <a:ext cx="4895649" cy="1638532"/>
+              <a:ext cx="4895649" cy="2024069"/>
             </a:xfrm>
             <a:prstGeom prst="rect">
               <a:avLst/>
@@ -7526,7 +7962,7 @@
                   </a:solidFill>
                   <a:latin typeface="Gill Sans Nova" panose="020B0602020104020203" pitchFamily="34" charset="0"/>
                 </a:rPr>
-                <a:t> test to compare the detection performance of different estimators according to the probability of false alarm.</a:t>
+                <a:t> test to compare the detection performance of different test statistics according to the probability of false alarm of these tests.</a:t>
               </a:r>
             </a:p>
           </p:txBody>
@@ -7567,7 +8003,7 @@
             <p:nvPr/>
           </p:nvPicPr>
           <p:blipFill>
-            <a:blip r:embed="rId19"/>
+            <a:blip r:embed="rId20"/>
             <a:stretch>
               <a:fillRect/>
             </a:stretch>
@@ -7662,7 +8098,7 @@
             <p:nvPr/>
           </p:nvPicPr>
           <p:blipFill>
-            <a:blip r:embed="rId20"/>
+            <a:blip r:embed="rId21"/>
             <a:stretch>
               <a:fillRect/>
             </a:stretch>
@@ -7757,7 +8193,7 @@
             <p:nvPr/>
           </p:nvPicPr>
           <p:blipFill>
-            <a:blip r:embed="rId21"/>
+            <a:blip r:embed="rId22"/>
             <a:stretch>
               <a:fillRect/>
             </a:stretch>
@@ -7811,7 +8247,7 @@
                   </a:solidFill>
                   <a:latin typeface="Gill Sans Nova" panose="020B0602020104020203" pitchFamily="34" charset="0"/>
                 </a:rPr>
-                <a:t>Figure 7: Evolution of kernel distribution spread according to the input phase aberrations.</a:t>
+                <a:t>Figure 7: Evolution of kernel distribution spread in relation to the input phase aberrations.</a:t>
               </a:r>
             </a:p>
           </p:txBody>
@@ -8337,7 +8773,7 @@
                     </a:solidFill>
                     <a:latin typeface="Gill Sans Nova" panose="020B0602020104020203" pitchFamily="34" charset="0"/>
                   </a:rPr>
-                  <a:t> for the help on the presentations. This thesis is made possible by the PHOTONICS project of the PEPR ORIGINS and Thales </a:t>
+                  <a:t> for the help with the presentations. This thesis is made possible by the PHOTONICS project of the PEPR ORIGINS and Thales </a:t>
                 </a:r>
                 <a:r>
                   <a:rPr lang="en-US" sz="3000" dirty="0" err="1">
@@ -8664,7 +9100,7 @@
           <p:spPr>
             <a:xfrm>
               <a:off x="4351253" y="21747975"/>
-              <a:ext cx="6348021" cy="2677656"/>
+              <a:ext cx="6348021" cy="3046988"/>
             </a:xfrm>
             <a:prstGeom prst="rect">
               <a:avLst/>
@@ -8711,7 +9147,7 @@
                   </a:solidFill>
                   <a:latin typeface="Gill Sans Nova" panose="020B0602020104020203" pitchFamily="34" charset="0"/>
                 </a:rPr>
-                <a:t>. The transmission zones and blind bands are directly derived from the telescopes position. By rotating the baseline, we can get a modulated signal from which we can precisely constrain the planet position. (cf. “Parallactic diversity” block)</a:t>
+                <a:t>. The transmission zones and blind bands are directly derived from the telescopes’ positions. By rotating the baseline, we can get a modulated signal from which we can precisely constrain the planet position. (cf. “Parallactic diversity” block)</a:t>
               </a:r>
             </a:p>
           </p:txBody>
@@ -8731,7 +9167,7 @@
             <p:nvPr/>
           </p:nvPicPr>
           <p:blipFill>
-            <a:blip r:embed="rId22"/>
+            <a:blip r:embed="rId23"/>
             <a:stretch>
               <a:fillRect/>
             </a:stretch>
@@ -9073,4 +9509,319 @@
     </a:ext>
   </a:extLst>
 </a:theme>
+</file>
+
+<file path=ppt/theme/theme2.xml><?xml version="1.0" encoding="utf-8"?>
+<a:theme xmlns:a="http://schemas.openxmlformats.org/drawingml/2006/main" name="Office Theme">
+  <a:themeElements>
+    <a:clrScheme name="Office">
+      <a:dk1>
+        <a:sysClr val="windowText" lastClr="000000"/>
+      </a:dk1>
+      <a:lt1>
+        <a:sysClr val="window" lastClr="FFFFFF"/>
+      </a:lt1>
+      <a:dk2>
+        <a:srgbClr val="0E2841"/>
+      </a:dk2>
+      <a:lt2>
+        <a:srgbClr val="E8E8E8"/>
+      </a:lt2>
+      <a:accent1>
+        <a:srgbClr val="156082"/>
+      </a:accent1>
+      <a:accent2>
+        <a:srgbClr val="E97132"/>
+      </a:accent2>
+      <a:accent3>
+        <a:srgbClr val="196B24"/>
+      </a:accent3>
+      <a:accent4>
+        <a:srgbClr val="0F9ED5"/>
+      </a:accent4>
+      <a:accent5>
+        <a:srgbClr val="A02B93"/>
+      </a:accent5>
+      <a:accent6>
+        <a:srgbClr val="4EA72E"/>
+      </a:accent6>
+      <a:hlink>
+        <a:srgbClr val="467886"/>
+      </a:hlink>
+      <a:folHlink>
+        <a:srgbClr val="96607D"/>
+      </a:folHlink>
+    </a:clrScheme>
+    <a:fontScheme name="Office">
+      <a:majorFont>
+        <a:latin typeface="Aptos Display" panose="02110004020202020204"/>
+        <a:ea typeface=""/>
+        <a:cs typeface=""/>
+        <a:font script="Jpan" typeface="游ゴシック Light"/>
+        <a:font script="Hang" typeface="맑은 고딕"/>
+        <a:font script="Hans" typeface="等线 Light"/>
+        <a:font script="Hant" typeface="新細明體"/>
+        <a:font script="Arab" typeface="Times New Roman"/>
+        <a:font script="Hebr" typeface="Times New Roman"/>
+        <a:font script="Thai" typeface="Angsana New"/>
+        <a:font script="Ethi" typeface="Nyala"/>
+        <a:font script="Beng" typeface="Vrinda"/>
+        <a:font script="Gujr" typeface="Shruti"/>
+        <a:font script="Khmr" typeface="MoolBoran"/>
+        <a:font script="Knda" typeface="Tunga"/>
+        <a:font script="Guru" typeface="Raavi"/>
+        <a:font script="Cans" typeface="Euphemia"/>
+        <a:font script="Cher" typeface="Plantagenet Cherokee"/>
+        <a:font script="Yiii" typeface="Microsoft Yi Baiti"/>
+        <a:font script="Tibt" typeface="Microsoft Himalaya"/>
+        <a:font script="Thaa" typeface="MV Boli"/>
+        <a:font script="Deva" typeface="Mangal"/>
+        <a:font script="Telu" typeface="Gautami"/>
+        <a:font script="Taml" typeface="Latha"/>
+        <a:font script="Syrc" typeface="Estrangelo Edessa"/>
+        <a:font script="Orya" typeface="Kalinga"/>
+        <a:font script="Mlym" typeface="Kartika"/>
+        <a:font script="Laoo" typeface="DokChampa"/>
+        <a:font script="Sinh" typeface="Iskoola Pota"/>
+        <a:font script="Mong" typeface="Mongolian Baiti"/>
+        <a:font script="Viet" typeface="Times New Roman"/>
+        <a:font script="Uigh" typeface="Microsoft Uighur"/>
+        <a:font script="Geor" typeface="Sylfaen"/>
+        <a:font script="Armn" typeface="Arial"/>
+        <a:font script="Bugi" typeface="Leelawadee UI"/>
+        <a:font script="Bopo" typeface="Microsoft JhengHei"/>
+        <a:font script="Java" typeface="Javanese Text"/>
+        <a:font script="Lisu" typeface="Segoe UI"/>
+        <a:font script="Mymr" typeface="Myanmar Text"/>
+        <a:font script="Nkoo" typeface="Ebrima"/>
+        <a:font script="Olck" typeface="Nirmala UI"/>
+        <a:font script="Osma" typeface="Ebrima"/>
+        <a:font script="Phag" typeface="Phagspa"/>
+        <a:font script="Syrn" typeface="Estrangelo Edessa"/>
+        <a:font script="Syrj" typeface="Estrangelo Edessa"/>
+        <a:font script="Syre" typeface="Estrangelo Edessa"/>
+        <a:font script="Sora" typeface="Nirmala UI"/>
+        <a:font script="Tale" typeface="Microsoft Tai Le"/>
+        <a:font script="Talu" typeface="Microsoft New Tai Lue"/>
+        <a:font script="Tfng" typeface="Ebrima"/>
+      </a:majorFont>
+      <a:minorFont>
+        <a:latin typeface="Aptos" panose="02110004020202020204"/>
+        <a:ea typeface=""/>
+        <a:cs typeface=""/>
+        <a:font script="Jpan" typeface="游ゴシック"/>
+        <a:font script="Hang" typeface="맑은 고딕"/>
+        <a:font script="Hans" typeface="等线"/>
+        <a:font script="Hant" typeface="新細明體"/>
+        <a:font script="Arab" typeface="Arial"/>
+        <a:font script="Hebr" typeface="Arial"/>
+        <a:font script="Thai" typeface="Cordia New"/>
+        <a:font script="Ethi" typeface="Nyala"/>
+        <a:font script="Beng" typeface="Vrinda"/>
+        <a:font script="Gujr" typeface="Shruti"/>
+        <a:font script="Khmr" typeface="DaunPenh"/>
+        <a:font script="Knda" typeface="Tunga"/>
+        <a:font script="Guru" typeface="Raavi"/>
+        <a:font script="Cans" typeface="Euphemia"/>
+        <a:font script="Cher" typeface="Plantagenet Cherokee"/>
+        <a:font script="Yiii" typeface="Microsoft Yi Baiti"/>
+        <a:font script="Tibt" typeface="Microsoft Himalaya"/>
+        <a:font script="Thaa" typeface="MV Boli"/>
+        <a:font script="Deva" typeface="Mangal"/>
+        <a:font script="Telu" typeface="Gautami"/>
+        <a:font script="Taml" typeface="Latha"/>
+        <a:font script="Syrc" typeface="Estrangelo Edessa"/>
+        <a:font script="Orya" typeface="Kalinga"/>
+        <a:font script="Mlym" typeface="Kartika"/>
+        <a:font script="Laoo" typeface="DokChampa"/>
+        <a:font script="Sinh" typeface="Iskoola Pota"/>
+        <a:font script="Mong" typeface="Mongolian Baiti"/>
+        <a:font script="Viet" typeface="Arial"/>
+        <a:font script="Uigh" typeface="Microsoft Uighur"/>
+        <a:font script="Geor" typeface="Sylfaen"/>
+        <a:font script="Armn" typeface="Arial"/>
+        <a:font script="Bugi" typeface="Leelawadee UI"/>
+        <a:font script="Bopo" typeface="Microsoft JhengHei"/>
+        <a:font script="Java" typeface="Javanese Text"/>
+        <a:font script="Lisu" typeface="Segoe UI"/>
+        <a:font script="Mymr" typeface="Myanmar Text"/>
+        <a:font script="Nkoo" typeface="Ebrima"/>
+        <a:font script="Olck" typeface="Nirmala UI"/>
+        <a:font script="Osma" typeface="Ebrima"/>
+        <a:font script="Phag" typeface="Phagspa"/>
+        <a:font script="Syrn" typeface="Estrangelo Edessa"/>
+        <a:font script="Syrj" typeface="Estrangelo Edessa"/>
+        <a:font script="Syre" typeface="Estrangelo Edessa"/>
+        <a:font script="Sora" typeface="Nirmala UI"/>
+        <a:font script="Tale" typeface="Microsoft Tai Le"/>
+        <a:font script="Talu" typeface="Microsoft New Tai Lue"/>
+        <a:font script="Tfng" typeface="Ebrima"/>
+      </a:minorFont>
+    </a:fontScheme>
+    <a:fmtScheme name="Office">
+      <a:fillStyleLst>
+        <a:solidFill>
+          <a:schemeClr val="phClr"/>
+        </a:solidFill>
+        <a:gradFill rotWithShape="1">
+          <a:gsLst>
+            <a:gs pos="0">
+              <a:schemeClr val="phClr">
+                <a:lumMod val="110000"/>
+                <a:satMod val="105000"/>
+                <a:tint val="67000"/>
+              </a:schemeClr>
+            </a:gs>
+            <a:gs pos="50000">
+              <a:schemeClr val="phClr">
+                <a:lumMod val="105000"/>
+                <a:satMod val="103000"/>
+                <a:tint val="73000"/>
+              </a:schemeClr>
+            </a:gs>
+            <a:gs pos="100000">
+              <a:schemeClr val="phClr">
+                <a:lumMod val="105000"/>
+                <a:satMod val="109000"/>
+                <a:tint val="81000"/>
+              </a:schemeClr>
+            </a:gs>
+          </a:gsLst>
+          <a:lin ang="5400000" scaled="0"/>
+        </a:gradFill>
+        <a:gradFill rotWithShape="1">
+          <a:gsLst>
+            <a:gs pos="0">
+              <a:schemeClr val="phClr">
+                <a:satMod val="103000"/>
+                <a:lumMod val="102000"/>
+                <a:tint val="94000"/>
+              </a:schemeClr>
+            </a:gs>
+            <a:gs pos="50000">
+              <a:schemeClr val="phClr">
+                <a:satMod val="110000"/>
+                <a:lumMod val="100000"/>
+                <a:shade val="100000"/>
+              </a:schemeClr>
+            </a:gs>
+            <a:gs pos="100000">
+              <a:schemeClr val="phClr">
+                <a:lumMod val="99000"/>
+                <a:satMod val="120000"/>
+                <a:shade val="78000"/>
+              </a:schemeClr>
+            </a:gs>
+          </a:gsLst>
+          <a:lin ang="5400000" scaled="0"/>
+        </a:gradFill>
+      </a:fillStyleLst>
+      <a:lnStyleLst>
+        <a:ln w="12700" cap="flat" cmpd="sng" algn="ctr">
+          <a:solidFill>
+            <a:schemeClr val="phClr"/>
+          </a:solidFill>
+          <a:prstDash val="solid"/>
+          <a:miter lim="800000"/>
+        </a:ln>
+        <a:ln w="19050" cap="flat" cmpd="sng" algn="ctr">
+          <a:solidFill>
+            <a:schemeClr val="phClr"/>
+          </a:solidFill>
+          <a:prstDash val="solid"/>
+          <a:miter lim="800000"/>
+        </a:ln>
+        <a:ln w="25400" cap="flat" cmpd="sng" algn="ctr">
+          <a:solidFill>
+            <a:schemeClr val="phClr"/>
+          </a:solidFill>
+          <a:prstDash val="solid"/>
+          <a:miter lim="800000"/>
+        </a:ln>
+      </a:lnStyleLst>
+      <a:effectStyleLst>
+        <a:effectStyle>
+          <a:effectLst/>
+        </a:effectStyle>
+        <a:effectStyle>
+          <a:effectLst/>
+        </a:effectStyle>
+        <a:effectStyle>
+          <a:effectLst>
+            <a:outerShdw blurRad="57150" dist="19050" dir="5400000" algn="ctr" rotWithShape="0">
+              <a:srgbClr val="000000">
+                <a:alpha val="63000"/>
+              </a:srgbClr>
+            </a:outerShdw>
+          </a:effectLst>
+        </a:effectStyle>
+      </a:effectStyleLst>
+      <a:bgFillStyleLst>
+        <a:solidFill>
+          <a:schemeClr val="phClr"/>
+        </a:solidFill>
+        <a:solidFill>
+          <a:schemeClr val="phClr">
+            <a:tint val="95000"/>
+            <a:satMod val="170000"/>
+          </a:schemeClr>
+        </a:solidFill>
+        <a:gradFill rotWithShape="1">
+          <a:gsLst>
+            <a:gs pos="0">
+              <a:schemeClr val="phClr">
+                <a:tint val="93000"/>
+                <a:satMod val="150000"/>
+                <a:shade val="98000"/>
+                <a:lumMod val="102000"/>
+              </a:schemeClr>
+            </a:gs>
+            <a:gs pos="50000">
+              <a:schemeClr val="phClr">
+                <a:tint val="98000"/>
+                <a:satMod val="130000"/>
+                <a:shade val="90000"/>
+                <a:lumMod val="103000"/>
+              </a:schemeClr>
+            </a:gs>
+            <a:gs pos="100000">
+              <a:schemeClr val="phClr">
+                <a:shade val="63000"/>
+                <a:satMod val="120000"/>
+              </a:schemeClr>
+            </a:gs>
+          </a:gsLst>
+          <a:lin ang="5400000" scaled="0"/>
+        </a:gradFill>
+      </a:bgFillStyleLst>
+    </a:fmtScheme>
+  </a:themeElements>
+  <a:objectDefaults>
+    <a:lnDef>
+      <a:spPr/>
+      <a:bodyPr/>
+      <a:lstStyle/>
+      <a:style>
+        <a:lnRef idx="2">
+          <a:schemeClr val="accent1"/>
+        </a:lnRef>
+        <a:fillRef idx="0">
+          <a:schemeClr val="accent1"/>
+        </a:fillRef>
+        <a:effectRef idx="1">
+          <a:schemeClr val="accent1"/>
+        </a:effectRef>
+        <a:fontRef idx="minor">
+          <a:schemeClr val="tx1"/>
+        </a:fontRef>
+      </a:style>
+    </a:lnDef>
+  </a:objectDefaults>
+  <a:extraClrSchemeLst/>
+  <a:extLst>
+    <a:ext uri="{05A4C25C-085E-4340-85A3-A5531E510DB2}">
+      <thm15:themeFamily xmlns:thm15="http://schemas.microsoft.com/office/thememl/2012/main" name="Office Theme" id="{2E142A2C-CD16-42D6-873A-C26D2A0506FA}" vid="{1BDDFF52-6CD6-40A5-AB3C-68EB2F1E4D0A}"/>
+    </a:ext>
+  </a:extLst>
+</a:theme>
 </file>
</xml_diff>